<commit_message>
Tweak CUDA intro slides
</commit_message>
<xml_diff>
--- a/lectures/1-CUDA-Introduction-1.pptx
+++ b/lectures/1-CUDA-Introduction-1.pptx
@@ -581,7 +581,7 @@
           </a:ln>
           <a:extLst>
             <a:ext uri="{909E8E84-426E-40dd-AFC4-6F175D3DCCD1}">
-              <a14:hiddenFill xmlns:a14="http://schemas.microsoft.com/office/drawing/2010/main" xmlns="">
+              <a14:hiddenFill xmlns="" xmlns:a14="http://schemas.microsoft.com/office/drawing/2010/main">
                 <a:solidFill>
                   <a:srgbClr val="FFFFFF"/>
                 </a:solidFill>
@@ -938,12 +938,29 @@
           <a:lstStyle/>
           <a:p>
             <a:r>
-              <a:rPr lang="en-US" dirty="0" smtClean="0"/>
-              <a:t>More recent – WebCL</a:t>
-            </a:r>
-            <a:r>
               <a:rPr lang="en-US" baseline="0" dirty="0" smtClean="0"/>
-              <a:t>.  Compute shaders have been in Direct3D for a while.</a:t>
+              <a:t>Compute </a:t>
+            </a:r>
+            <a:r>
+              <a:rPr lang="en-US" baseline="0" dirty="0" smtClean="0"/>
+              <a:t>shaders have been in Direct3D for a while</a:t>
+            </a:r>
+            <a:r>
+              <a:rPr lang="en-US" baseline="0" dirty="0" smtClean="0"/>
+              <a:t>.</a:t>
+            </a:r>
+          </a:p>
+          <a:p>
+            <a:endParaRPr lang="en-US" baseline="0" dirty="0" smtClean="0"/>
+          </a:p>
+          <a:p>
+            <a:r>
+              <a:rPr lang="en-US" baseline="0" dirty="0" err="1" smtClean="0"/>
+              <a:t>WebCL</a:t>
+            </a:r>
+            <a:r>
+              <a:rPr lang="en-US" baseline="0" dirty="0" smtClean="0"/>
+              <a:t> never caught on.</a:t>
             </a:r>
             <a:endParaRPr lang="en-US" dirty="0"/>
           </a:p>
@@ -982,6 +999,113 @@
     <p:extLst>
       <p:ext uri="{BB962C8B-B14F-4D97-AF65-F5344CB8AC3E}">
         <p14:creationId xmlns:p14="http://schemas.microsoft.com/office/powerpoint/2010/main" val="2591843080"/>
+      </p:ext>
+    </p:extLst>
+  </p:cSld>
+  <p:clrMapOvr>
+    <a:masterClrMapping/>
+  </p:clrMapOvr>
+</p:notes>
+</file>
+
+<file path=ppt/notesSlides/notesSlide10.xml><?xml version="1.0" encoding="utf-8"?>
+<p:notes xmlns:a="http://schemas.openxmlformats.org/drawingml/2006/main" xmlns:r="http://schemas.openxmlformats.org/officeDocument/2006/relationships" xmlns:p="http://schemas.openxmlformats.org/presentationml/2006/main">
+  <p:cSld>
+    <p:spTree>
+      <p:nvGrpSpPr>
+        <p:cNvPr id="1" name=""/>
+        <p:cNvGrpSpPr/>
+        <p:nvPr/>
+      </p:nvGrpSpPr>
+      <p:grpSpPr>
+        <a:xfrm>
+          <a:off x="0" y="0"/>
+          <a:ext cx="0" cy="0"/>
+          <a:chOff x="0" y="0"/>
+          <a:chExt cx="0" cy="0"/>
+        </a:xfrm>
+      </p:grpSpPr>
+      <p:sp>
+        <p:nvSpPr>
+          <p:cNvPr id="2" name="Slide Image Placeholder 1"/>
+          <p:cNvSpPr>
+            <a:spLocks noGrp="1" noRot="1" noChangeAspect="1"/>
+          </p:cNvSpPr>
+          <p:nvPr>
+            <p:ph type="sldImg"/>
+          </p:nvPr>
+        </p:nvSpPr>
+        <p:spPr/>
+      </p:sp>
+      <p:sp>
+        <p:nvSpPr>
+          <p:cNvPr id="3" name="Notes Placeholder 2"/>
+          <p:cNvSpPr>
+            <a:spLocks noGrp="1"/>
+          </p:cNvSpPr>
+          <p:nvPr>
+            <p:ph type="body" idx="1"/>
+          </p:nvPr>
+        </p:nvSpPr>
+        <p:spPr/>
+        <p:txBody>
+          <a:bodyPr/>
+          <a:lstStyle/>
+          <a:p>
+            <a:r>
+              <a:rPr lang="en-US" dirty="0" smtClean="0"/>
+              <a:t>Global memory access</a:t>
+            </a:r>
+          </a:p>
+          <a:p>
+            <a:endParaRPr lang="en-US" dirty="0" smtClean="0"/>
+          </a:p>
+          <a:p>
+            <a:r>
+              <a:rPr lang="en-US" dirty="0" smtClean="0"/>
+              <a:t>Matrix size is limited by </a:t>
+            </a:r>
+            <a:r>
+              <a:rPr lang="en-US" smtClean="0"/>
+              <a:t>block size</a:t>
+            </a:r>
+            <a:endParaRPr lang="en-US"/>
+          </a:p>
+        </p:txBody>
+      </p:sp>
+      <p:sp>
+        <p:nvSpPr>
+          <p:cNvPr id="4" name="Slide Number Placeholder 3"/>
+          <p:cNvSpPr>
+            <a:spLocks noGrp="1"/>
+          </p:cNvSpPr>
+          <p:nvPr>
+            <p:ph type="sldNum" sz="quarter" idx="10"/>
+          </p:nvPr>
+        </p:nvSpPr>
+        <p:spPr/>
+        <p:txBody>
+          <a:bodyPr/>
+          <a:lstStyle/>
+          <a:p>
+            <a:pPr>
+              <a:defRPr/>
+            </a:pPr>
+            <a:fld id="{142DFF84-32C4-4278-B979-9D6DC1A53C0D}" type="slidenum">
+              <a:rPr lang="en-US" smtClean="0"/>
+              <a:pPr>
+                <a:defRPr/>
+              </a:pPr>
+              <a:t>49</a:t>
+            </a:fld>
+            <a:endParaRPr lang="en-US"/>
+          </a:p>
+        </p:txBody>
+      </p:sp>
+    </p:spTree>
+    <p:extLst>
+      <p:ext uri="{BB962C8B-B14F-4D97-AF65-F5344CB8AC3E}">
+        <p14:creationId xmlns:p14="http://schemas.microsoft.com/office/powerpoint/2010/main" val="2617528927"/>
       </p:ext>
     </p:extLst>
   </p:cSld>
@@ -1023,14 +1147,14 @@
           <a:ln/>
           <a:extLst>
             <a:ext uri="{909E8E84-426E-40dd-AFC4-6F175D3DCCD1}">
-              <a14:hiddenFill xmlns:a14="http://schemas.microsoft.com/office/drawing/2010/main" xmlns="">
+              <a14:hiddenFill xmlns="" xmlns:a14="http://schemas.microsoft.com/office/drawing/2010/main">
                 <a:solidFill>
                   <a:srgbClr val="FFFFFF"/>
                 </a:solidFill>
               </a14:hiddenFill>
             </a:ext>
             <a:ext uri="{91240B29-F687-4f45-9708-019B960494DF}">
-              <a14:hiddenLine xmlns:a14="http://schemas.microsoft.com/office/drawing/2010/main" xmlns="" w="9525">
+              <a14:hiddenLine xmlns="" xmlns:a14="http://schemas.microsoft.com/office/drawing/2010/main" w="9525">
                 <a:solidFill>
                   <a:srgbClr val="000000"/>
                 </a:solidFill>
@@ -1180,14 +1304,14 @@
           <a:ln/>
           <a:extLst>
             <a:ext uri="{909E8E84-426E-40dd-AFC4-6F175D3DCCD1}">
-              <a14:hiddenFill xmlns:a14="http://schemas.microsoft.com/office/drawing/2010/main" xmlns="">
+              <a14:hiddenFill xmlns="" xmlns:a14="http://schemas.microsoft.com/office/drawing/2010/main">
                 <a:solidFill>
                   <a:srgbClr val="FFFFFF"/>
                 </a:solidFill>
               </a14:hiddenFill>
             </a:ext>
             <a:ext uri="{91240B29-F687-4f45-9708-019B960494DF}">
-              <a14:hiddenLine xmlns:a14="http://schemas.microsoft.com/office/drawing/2010/main" xmlns="" w="9525">
+              <a14:hiddenLine xmlns="" xmlns:a14="http://schemas.microsoft.com/office/drawing/2010/main" w="9525">
                 <a:solidFill>
                   <a:srgbClr val="000000"/>
                 </a:solidFill>
@@ -1254,14 +1378,14 @@
           <a:ln/>
           <a:extLst>
             <a:ext uri="{909E8E84-426E-40dd-AFC4-6F175D3DCCD1}">
-              <a14:hiddenFill xmlns:a14="http://schemas.microsoft.com/office/drawing/2010/main" xmlns="">
+              <a14:hiddenFill xmlns="" xmlns:a14="http://schemas.microsoft.com/office/drawing/2010/main">
                 <a:solidFill>
                   <a:srgbClr val="FFFFFF"/>
                 </a:solidFill>
               </a14:hiddenFill>
             </a:ext>
             <a:ext uri="{91240B29-F687-4f45-9708-019B960494DF}">
-              <a14:hiddenLine xmlns:a14="http://schemas.microsoft.com/office/drawing/2010/main" xmlns="" w="9525">
+              <a14:hiddenLine xmlns="" xmlns:a14="http://schemas.microsoft.com/office/drawing/2010/main" w="9525">
                 <a:solidFill>
                   <a:srgbClr val="000000"/>
                 </a:solidFill>
@@ -1411,14 +1535,14 @@
           <a:ln/>
           <a:extLst>
             <a:ext uri="{909E8E84-426E-40dd-AFC4-6F175D3DCCD1}">
-              <a14:hiddenFill xmlns:a14="http://schemas.microsoft.com/office/drawing/2010/main" xmlns="">
+              <a14:hiddenFill xmlns="" xmlns:a14="http://schemas.microsoft.com/office/drawing/2010/main">
                 <a:solidFill>
                   <a:srgbClr val="FFFFFF"/>
                 </a:solidFill>
               </a14:hiddenFill>
             </a:ext>
             <a:ext uri="{91240B29-F687-4f45-9708-019B960494DF}">
-              <a14:hiddenLine xmlns:a14="http://schemas.microsoft.com/office/drawing/2010/main" xmlns="" w="9525">
+              <a14:hiddenLine xmlns="" xmlns:a14="http://schemas.microsoft.com/office/drawing/2010/main" w="9525">
                 <a:solidFill>
                   <a:srgbClr val="000000"/>
                 </a:solidFill>
@@ -1482,14 +1606,14 @@
           <a:ln/>
           <a:extLst>
             <a:ext uri="{909E8E84-426E-40dd-AFC4-6F175D3DCCD1}">
-              <a14:hiddenFill xmlns:a14="http://schemas.microsoft.com/office/drawing/2010/main" xmlns="">
+              <a14:hiddenFill xmlns="" xmlns:a14="http://schemas.microsoft.com/office/drawing/2010/main">
                 <a:solidFill>
                   <a:srgbClr val="FFFFFF"/>
                 </a:solidFill>
               </a14:hiddenFill>
             </a:ext>
             <a:ext uri="{91240B29-F687-4f45-9708-019B960494DF}">
-              <a14:hiddenLine xmlns:a14="http://schemas.microsoft.com/office/drawing/2010/main" xmlns="" w="9525">
+              <a14:hiddenLine xmlns="" xmlns:a14="http://schemas.microsoft.com/office/drawing/2010/main" w="9525">
                 <a:solidFill>
                   <a:srgbClr val="000000"/>
                 </a:solidFill>
@@ -1639,14 +1763,14 @@
           <a:ln/>
           <a:extLst>
             <a:ext uri="{909E8E84-426E-40dd-AFC4-6F175D3DCCD1}">
-              <a14:hiddenFill xmlns:a14="http://schemas.microsoft.com/office/drawing/2010/main" xmlns="">
+              <a14:hiddenFill xmlns="" xmlns:a14="http://schemas.microsoft.com/office/drawing/2010/main">
                 <a:solidFill>
                   <a:srgbClr val="FFFFFF"/>
                 </a:solidFill>
               </a14:hiddenFill>
             </a:ext>
             <a:ext uri="{91240B29-F687-4f45-9708-019B960494DF}">
-              <a14:hiddenLine xmlns:a14="http://schemas.microsoft.com/office/drawing/2010/main" xmlns="" w="9525">
+              <a14:hiddenLine xmlns="" xmlns:a14="http://schemas.microsoft.com/office/drawing/2010/main" w="9525">
                 <a:solidFill>
                   <a:srgbClr val="000000"/>
                 </a:solidFill>
@@ -1679,237 +1803,6 @@
 </file>
 
 <file path=ppt/notesSlides/notesSlide5.xml><?xml version="1.0" encoding="utf-8"?>
-<p:notes xmlns:a="http://schemas.openxmlformats.org/drawingml/2006/main" xmlns:r="http://schemas.openxmlformats.org/officeDocument/2006/relationships" xmlns:p="http://schemas.openxmlformats.org/presentationml/2006/main">
-  <p:cSld>
-    <p:spTree>
-      <p:nvGrpSpPr>
-        <p:cNvPr id="1" name=""/>
-        <p:cNvGrpSpPr/>
-        <p:nvPr/>
-      </p:nvGrpSpPr>
-      <p:grpSpPr>
-        <a:xfrm>
-          <a:off x="0" y="0"/>
-          <a:ext cx="0" cy="0"/>
-          <a:chOff x="0" y="0"/>
-          <a:chExt cx="0" cy="0"/>
-        </a:xfrm>
-      </p:grpSpPr>
-      <p:sp>
-        <p:nvSpPr>
-          <p:cNvPr id="78850" name="Rectangle 7"/>
-          <p:cNvSpPr>
-            <a:spLocks noGrp="1" noChangeArrowheads="1"/>
-          </p:cNvSpPr>
-          <p:nvPr>
-            <p:ph type="sldNum" sz="quarter" idx="5"/>
-          </p:nvPr>
-        </p:nvSpPr>
-        <p:spPr>
-          <a:noFill/>
-          <a:ln/>
-          <a:extLst>
-            <a:ext uri="{909E8E84-426E-40dd-AFC4-6F175D3DCCD1}">
-              <a14:hiddenFill xmlns:a14="http://schemas.microsoft.com/office/drawing/2010/main" xmlns="">
-                <a:solidFill>
-                  <a:srgbClr val="FFFFFF"/>
-                </a:solidFill>
-              </a14:hiddenFill>
-            </a:ext>
-            <a:ext uri="{91240B29-F687-4f45-9708-019B960494DF}">
-              <a14:hiddenLine xmlns:a14="http://schemas.microsoft.com/office/drawing/2010/main" xmlns="" w="9525">
-                <a:solidFill>
-                  <a:srgbClr val="000000"/>
-                </a:solidFill>
-                <a:miter lim="800000"/>
-                <a:headEnd/>
-                <a:tailEnd/>
-              </a14:hiddenLine>
-            </a:ext>
-          </a:extLst>
-        </p:spPr>
-        <p:txBody>
-          <a:bodyPr/>
-          <a:lstStyle>
-            <a:lvl1pPr defTabSz="966788">
-              <a:defRPr>
-                <a:solidFill>
-                  <a:schemeClr val="tx1"/>
-                </a:solidFill>
-                <a:latin typeface="Arial" charset="0"/>
-              </a:defRPr>
-            </a:lvl1pPr>
-            <a:lvl2pPr marL="742950" indent="-285750" defTabSz="966788">
-              <a:defRPr>
-                <a:solidFill>
-                  <a:schemeClr val="tx1"/>
-                </a:solidFill>
-                <a:latin typeface="Arial" charset="0"/>
-              </a:defRPr>
-            </a:lvl2pPr>
-            <a:lvl3pPr marL="1143000" indent="-228600" defTabSz="966788">
-              <a:defRPr>
-                <a:solidFill>
-                  <a:schemeClr val="tx1"/>
-                </a:solidFill>
-                <a:latin typeface="Arial" charset="0"/>
-              </a:defRPr>
-            </a:lvl3pPr>
-            <a:lvl4pPr marL="1600200" indent="-228600" defTabSz="966788">
-              <a:defRPr>
-                <a:solidFill>
-                  <a:schemeClr val="tx1"/>
-                </a:solidFill>
-                <a:latin typeface="Arial" charset="0"/>
-              </a:defRPr>
-            </a:lvl4pPr>
-            <a:lvl5pPr marL="2057400" indent="-228600" defTabSz="966788">
-              <a:defRPr>
-                <a:solidFill>
-                  <a:schemeClr val="tx1"/>
-                </a:solidFill>
-                <a:latin typeface="Arial" charset="0"/>
-              </a:defRPr>
-            </a:lvl5pPr>
-            <a:lvl6pPr marL="2514600" indent="-228600" defTabSz="966788" eaLnBrk="0" fontAlgn="base" hangingPunct="0">
-              <a:spcBef>
-                <a:spcPct val="0"/>
-              </a:spcBef>
-              <a:spcAft>
-                <a:spcPct val="0"/>
-              </a:spcAft>
-              <a:defRPr>
-                <a:solidFill>
-                  <a:schemeClr val="tx1"/>
-                </a:solidFill>
-                <a:latin typeface="Arial" charset="0"/>
-              </a:defRPr>
-            </a:lvl6pPr>
-            <a:lvl7pPr marL="2971800" indent="-228600" defTabSz="966788" eaLnBrk="0" fontAlgn="base" hangingPunct="0">
-              <a:spcBef>
-                <a:spcPct val="0"/>
-              </a:spcBef>
-              <a:spcAft>
-                <a:spcPct val="0"/>
-              </a:spcAft>
-              <a:defRPr>
-                <a:solidFill>
-                  <a:schemeClr val="tx1"/>
-                </a:solidFill>
-                <a:latin typeface="Arial" charset="0"/>
-              </a:defRPr>
-            </a:lvl7pPr>
-            <a:lvl8pPr marL="3429000" indent="-228600" defTabSz="966788" eaLnBrk="0" fontAlgn="base" hangingPunct="0">
-              <a:spcBef>
-                <a:spcPct val="0"/>
-              </a:spcBef>
-              <a:spcAft>
-                <a:spcPct val="0"/>
-              </a:spcAft>
-              <a:defRPr>
-                <a:solidFill>
-                  <a:schemeClr val="tx1"/>
-                </a:solidFill>
-                <a:latin typeface="Arial" charset="0"/>
-              </a:defRPr>
-            </a:lvl8pPr>
-            <a:lvl9pPr marL="3886200" indent="-228600" defTabSz="966788" eaLnBrk="0" fontAlgn="base" hangingPunct="0">
-              <a:spcBef>
-                <a:spcPct val="0"/>
-              </a:spcBef>
-              <a:spcAft>
-                <a:spcPct val="0"/>
-              </a:spcAft>
-              <a:defRPr>
-                <a:solidFill>
-                  <a:schemeClr val="tx1"/>
-                </a:solidFill>
-                <a:latin typeface="Arial" charset="0"/>
-              </a:defRPr>
-            </a:lvl9pPr>
-          </a:lstStyle>
-          <a:p>
-            <a:fld id="{72F5F1C7-A09F-4017-A115-81454FF963A8}" type="slidenum">
-              <a:rPr lang="en-US" smtClean="0"/>
-              <a:pPr/>
-              <a:t>19</a:t>
-            </a:fld>
-            <a:endParaRPr lang="en-US" smtClean="0"/>
-          </a:p>
-        </p:txBody>
-      </p:sp>
-      <p:sp>
-        <p:nvSpPr>
-          <p:cNvPr id="78851" name="Rectangle 2"/>
-          <p:cNvSpPr>
-            <a:spLocks noGrp="1" noRot="1" noChangeAspect="1" noChangeArrowheads="1" noTextEdit="1"/>
-          </p:cNvSpPr>
-          <p:nvPr>
-            <p:ph type="sldImg"/>
-          </p:nvPr>
-        </p:nvSpPr>
-        <p:spPr>
-          <a:ln/>
-        </p:spPr>
-      </p:sp>
-      <p:sp>
-        <p:nvSpPr>
-          <p:cNvPr id="78852" name="Rectangle 3"/>
-          <p:cNvSpPr>
-            <a:spLocks noGrp="1" noChangeArrowheads="1"/>
-          </p:cNvSpPr>
-          <p:nvPr>
-            <p:ph type="body" idx="1"/>
-          </p:nvPr>
-        </p:nvSpPr>
-        <p:spPr>
-          <a:noFill/>
-          <a:ln/>
-          <a:extLst>
-            <a:ext uri="{909E8E84-426E-40dd-AFC4-6F175D3DCCD1}">
-              <a14:hiddenFill xmlns:a14="http://schemas.microsoft.com/office/drawing/2010/main" xmlns="">
-                <a:solidFill>
-                  <a:srgbClr val="FFFFFF"/>
-                </a:solidFill>
-              </a14:hiddenFill>
-            </a:ext>
-            <a:ext uri="{91240B29-F687-4f45-9708-019B960494DF}">
-              <a14:hiddenLine xmlns:a14="http://schemas.microsoft.com/office/drawing/2010/main" xmlns="" w="9525">
-                <a:solidFill>
-                  <a:srgbClr val="000000"/>
-                </a:solidFill>
-                <a:miter lim="800000"/>
-                <a:headEnd/>
-                <a:tailEnd/>
-              </a14:hiddenLine>
-            </a:ext>
-          </a:extLst>
-        </p:spPr>
-        <p:txBody>
-          <a:bodyPr/>
-          <a:lstStyle/>
-          <a:p>
-            <a:r>
-              <a:rPr lang="en-US" smtClean="0"/>
-              <a:t>Scheduled by the CUDA runtime</a:t>
-            </a:r>
-          </a:p>
-        </p:txBody>
-      </p:sp>
-    </p:spTree>
-    <p:extLst>
-      <p:ext uri="{BB962C8B-B14F-4D97-AF65-F5344CB8AC3E}">
-        <p14:creationId xmlns:p14="http://schemas.microsoft.com/office/powerpoint/2010/main" val="2671896068"/>
-      </p:ext>
-    </p:extLst>
-  </p:cSld>
-  <p:clrMapOvr>
-    <a:masterClrMapping/>
-  </p:clrMapOvr>
-</p:notes>
-</file>
-
-<file path=ppt/notesSlides/notesSlide6.xml><?xml version="1.0" encoding="utf-8"?>
 <p:notes xmlns:a="http://schemas.openxmlformats.org/drawingml/2006/main" xmlns:r="http://schemas.openxmlformats.org/officeDocument/2006/relationships" xmlns:p="http://schemas.openxmlformats.org/presentationml/2006/main">
   <p:cSld>
     <p:spTree>
@@ -1955,7 +1848,7 @@
           <a:p>
             <a:r>
               <a:rPr lang="en-US" dirty="0" smtClean="0"/>
-              <a:t>Or 999 adds depending on the code.</a:t>
+              <a:t>Using 2D so does not need to explicitly compute 1D thread ID from x and y</a:t>
             </a:r>
             <a:endParaRPr lang="en-US" dirty="0"/>
           </a:p>
@@ -1984,7 +1877,7 @@
               <a:pPr>
                 <a:defRPr/>
               </a:pPr>
-              <a:t>34</a:t>
+              <a:t>12</a:t>
             </a:fld>
             <a:endParaRPr lang="en-US"/>
           </a:p>
@@ -1993,7 +1886,238 @@
     </p:spTree>
     <p:extLst>
       <p:ext uri="{BB962C8B-B14F-4D97-AF65-F5344CB8AC3E}">
-        <p14:creationId xmlns:p14="http://schemas.microsoft.com/office/powerpoint/2010/main" val="3109228687"/>
+        <p14:creationId xmlns:p14="http://schemas.microsoft.com/office/powerpoint/2010/main" val="1407825897"/>
+      </p:ext>
+    </p:extLst>
+  </p:cSld>
+  <p:clrMapOvr>
+    <a:masterClrMapping/>
+  </p:clrMapOvr>
+</p:notes>
+</file>
+
+<file path=ppt/notesSlides/notesSlide6.xml><?xml version="1.0" encoding="utf-8"?>
+<p:notes xmlns:a="http://schemas.openxmlformats.org/drawingml/2006/main" xmlns:r="http://schemas.openxmlformats.org/officeDocument/2006/relationships" xmlns:p="http://schemas.openxmlformats.org/presentationml/2006/main">
+  <p:cSld>
+    <p:spTree>
+      <p:nvGrpSpPr>
+        <p:cNvPr id="1" name=""/>
+        <p:cNvGrpSpPr/>
+        <p:nvPr/>
+      </p:nvGrpSpPr>
+      <p:grpSpPr>
+        <a:xfrm>
+          <a:off x="0" y="0"/>
+          <a:ext cx="0" cy="0"/>
+          <a:chOff x="0" y="0"/>
+          <a:chExt cx="0" cy="0"/>
+        </a:xfrm>
+      </p:grpSpPr>
+      <p:sp>
+        <p:nvSpPr>
+          <p:cNvPr id="78850" name="Rectangle 7"/>
+          <p:cNvSpPr>
+            <a:spLocks noGrp="1" noChangeArrowheads="1"/>
+          </p:cNvSpPr>
+          <p:nvPr>
+            <p:ph type="sldNum" sz="quarter" idx="5"/>
+          </p:nvPr>
+        </p:nvSpPr>
+        <p:spPr>
+          <a:noFill/>
+          <a:ln/>
+          <a:extLst>
+            <a:ext uri="{909E8E84-426E-40dd-AFC4-6F175D3DCCD1}">
+              <a14:hiddenFill xmlns="" xmlns:a14="http://schemas.microsoft.com/office/drawing/2010/main">
+                <a:solidFill>
+                  <a:srgbClr val="FFFFFF"/>
+                </a:solidFill>
+              </a14:hiddenFill>
+            </a:ext>
+            <a:ext uri="{91240B29-F687-4f45-9708-019B960494DF}">
+              <a14:hiddenLine xmlns="" xmlns:a14="http://schemas.microsoft.com/office/drawing/2010/main" w="9525">
+                <a:solidFill>
+                  <a:srgbClr val="000000"/>
+                </a:solidFill>
+                <a:miter lim="800000"/>
+                <a:headEnd/>
+                <a:tailEnd/>
+              </a14:hiddenLine>
+            </a:ext>
+          </a:extLst>
+        </p:spPr>
+        <p:txBody>
+          <a:bodyPr/>
+          <a:lstStyle>
+            <a:lvl1pPr defTabSz="966788">
+              <a:defRPr>
+                <a:solidFill>
+                  <a:schemeClr val="tx1"/>
+                </a:solidFill>
+                <a:latin typeface="Arial" charset="0"/>
+              </a:defRPr>
+            </a:lvl1pPr>
+            <a:lvl2pPr marL="742950" indent="-285750" defTabSz="966788">
+              <a:defRPr>
+                <a:solidFill>
+                  <a:schemeClr val="tx1"/>
+                </a:solidFill>
+                <a:latin typeface="Arial" charset="0"/>
+              </a:defRPr>
+            </a:lvl2pPr>
+            <a:lvl3pPr marL="1143000" indent="-228600" defTabSz="966788">
+              <a:defRPr>
+                <a:solidFill>
+                  <a:schemeClr val="tx1"/>
+                </a:solidFill>
+                <a:latin typeface="Arial" charset="0"/>
+              </a:defRPr>
+            </a:lvl3pPr>
+            <a:lvl4pPr marL="1600200" indent="-228600" defTabSz="966788">
+              <a:defRPr>
+                <a:solidFill>
+                  <a:schemeClr val="tx1"/>
+                </a:solidFill>
+                <a:latin typeface="Arial" charset="0"/>
+              </a:defRPr>
+            </a:lvl4pPr>
+            <a:lvl5pPr marL="2057400" indent="-228600" defTabSz="966788">
+              <a:defRPr>
+                <a:solidFill>
+                  <a:schemeClr val="tx1"/>
+                </a:solidFill>
+                <a:latin typeface="Arial" charset="0"/>
+              </a:defRPr>
+            </a:lvl5pPr>
+            <a:lvl6pPr marL="2514600" indent="-228600" defTabSz="966788" eaLnBrk="0" fontAlgn="base" hangingPunct="0">
+              <a:spcBef>
+                <a:spcPct val="0"/>
+              </a:spcBef>
+              <a:spcAft>
+                <a:spcPct val="0"/>
+              </a:spcAft>
+              <a:defRPr>
+                <a:solidFill>
+                  <a:schemeClr val="tx1"/>
+                </a:solidFill>
+                <a:latin typeface="Arial" charset="0"/>
+              </a:defRPr>
+            </a:lvl6pPr>
+            <a:lvl7pPr marL="2971800" indent="-228600" defTabSz="966788" eaLnBrk="0" fontAlgn="base" hangingPunct="0">
+              <a:spcBef>
+                <a:spcPct val="0"/>
+              </a:spcBef>
+              <a:spcAft>
+                <a:spcPct val="0"/>
+              </a:spcAft>
+              <a:defRPr>
+                <a:solidFill>
+                  <a:schemeClr val="tx1"/>
+                </a:solidFill>
+                <a:latin typeface="Arial" charset="0"/>
+              </a:defRPr>
+            </a:lvl7pPr>
+            <a:lvl8pPr marL="3429000" indent="-228600" defTabSz="966788" eaLnBrk="0" fontAlgn="base" hangingPunct="0">
+              <a:spcBef>
+                <a:spcPct val="0"/>
+              </a:spcBef>
+              <a:spcAft>
+                <a:spcPct val="0"/>
+              </a:spcAft>
+              <a:defRPr>
+                <a:solidFill>
+                  <a:schemeClr val="tx1"/>
+                </a:solidFill>
+                <a:latin typeface="Arial" charset="0"/>
+              </a:defRPr>
+            </a:lvl8pPr>
+            <a:lvl9pPr marL="3886200" indent="-228600" defTabSz="966788" eaLnBrk="0" fontAlgn="base" hangingPunct="0">
+              <a:spcBef>
+                <a:spcPct val="0"/>
+              </a:spcBef>
+              <a:spcAft>
+                <a:spcPct val="0"/>
+              </a:spcAft>
+              <a:defRPr>
+                <a:solidFill>
+                  <a:schemeClr val="tx1"/>
+                </a:solidFill>
+                <a:latin typeface="Arial" charset="0"/>
+              </a:defRPr>
+            </a:lvl9pPr>
+          </a:lstStyle>
+          <a:p>
+            <a:fld id="{72F5F1C7-A09F-4017-A115-81454FF963A8}" type="slidenum">
+              <a:rPr lang="en-US" smtClean="0"/>
+              <a:pPr/>
+              <a:t>19</a:t>
+            </a:fld>
+            <a:endParaRPr lang="en-US" smtClean="0"/>
+          </a:p>
+        </p:txBody>
+      </p:sp>
+      <p:sp>
+        <p:nvSpPr>
+          <p:cNvPr id="78851" name="Rectangle 2"/>
+          <p:cNvSpPr>
+            <a:spLocks noGrp="1" noRot="1" noChangeAspect="1" noChangeArrowheads="1" noTextEdit="1"/>
+          </p:cNvSpPr>
+          <p:nvPr>
+            <p:ph type="sldImg"/>
+          </p:nvPr>
+        </p:nvSpPr>
+        <p:spPr>
+          <a:ln/>
+        </p:spPr>
+      </p:sp>
+      <p:sp>
+        <p:nvSpPr>
+          <p:cNvPr id="78852" name="Rectangle 3"/>
+          <p:cNvSpPr>
+            <a:spLocks noGrp="1" noChangeArrowheads="1"/>
+          </p:cNvSpPr>
+          <p:nvPr>
+            <p:ph type="body" idx="1"/>
+          </p:nvPr>
+        </p:nvSpPr>
+        <p:spPr>
+          <a:noFill/>
+          <a:ln/>
+          <a:extLst>
+            <a:ext uri="{909E8E84-426E-40dd-AFC4-6F175D3DCCD1}">
+              <a14:hiddenFill xmlns="" xmlns:a14="http://schemas.microsoft.com/office/drawing/2010/main">
+                <a:solidFill>
+                  <a:srgbClr val="FFFFFF"/>
+                </a:solidFill>
+              </a14:hiddenFill>
+            </a:ext>
+            <a:ext uri="{91240B29-F687-4f45-9708-019B960494DF}">
+              <a14:hiddenLine xmlns="" xmlns:a14="http://schemas.microsoft.com/office/drawing/2010/main" w="9525">
+                <a:solidFill>
+                  <a:srgbClr val="000000"/>
+                </a:solidFill>
+                <a:miter lim="800000"/>
+                <a:headEnd/>
+                <a:tailEnd/>
+              </a14:hiddenLine>
+            </a:ext>
+          </a:extLst>
+        </p:spPr>
+        <p:txBody>
+          <a:bodyPr/>
+          <a:lstStyle/>
+          <a:p>
+            <a:r>
+              <a:rPr lang="en-US" smtClean="0"/>
+              <a:t>Scheduled by the CUDA runtime</a:t>
+            </a:r>
+          </a:p>
+        </p:txBody>
+      </p:sp>
+    </p:spTree>
+    <p:extLst>
+      <p:ext uri="{BB962C8B-B14F-4D97-AF65-F5344CB8AC3E}">
+        <p14:creationId xmlns:p14="http://schemas.microsoft.com/office/powerpoint/2010/main" val="2671896068"/>
       </p:ext>
     </p:extLst>
   </p:cSld>
@@ -2049,7 +2173,7 @@
           <a:p>
             <a:r>
               <a:rPr lang="en-US" dirty="0" smtClean="0"/>
-              <a:t>Row major.  The inner most loop goes across a row of M, and down a row of N.</a:t>
+              <a:t>Or 999 adds depending on the code.</a:t>
             </a:r>
             <a:endParaRPr lang="en-US" dirty="0"/>
           </a:p>
@@ -2078,7 +2202,7 @@
               <a:pPr>
                 <a:defRPr/>
               </a:pPr>
-              <a:t>35</a:t>
+              <a:t>34</a:t>
             </a:fld>
             <a:endParaRPr lang="en-US"/>
           </a:p>
@@ -2087,7 +2211,7 @@
     </p:spTree>
     <p:extLst>
       <p:ext uri="{BB962C8B-B14F-4D97-AF65-F5344CB8AC3E}">
-        <p14:creationId xmlns:p14="http://schemas.microsoft.com/office/powerpoint/2010/main" val="2523012080"/>
+        <p14:creationId xmlns:p14="http://schemas.microsoft.com/office/powerpoint/2010/main" val="3109228687"/>
       </p:ext>
     </p:extLst>
   </p:cSld>
@@ -2143,22 +2267,17 @@
           <a:p>
             <a:r>
               <a:rPr lang="en-US" dirty="0" smtClean="0"/>
-              <a:t>Global memory access</a:t>
-            </a:r>
-          </a:p>
-          <a:p>
-            <a:endParaRPr lang="en-US" dirty="0" smtClean="0"/>
-          </a:p>
-          <a:p>
+              <a:t>Row major.  The inner most loop goes across a row of M, and down a </a:t>
+            </a:r>
             <a:r>
               <a:rPr lang="en-US" dirty="0" smtClean="0"/>
-              <a:t>Matrix size is limited by </a:t>
-            </a:r>
-            <a:r>
-              <a:rPr lang="en-US" smtClean="0"/>
-              <a:t>block size</a:t>
-            </a:r>
-            <a:endParaRPr lang="en-US"/>
+              <a:t>column of </a:t>
+            </a:r>
+            <a:r>
+              <a:rPr lang="en-US" dirty="0" smtClean="0"/>
+              <a:t>N.</a:t>
+            </a:r>
+            <a:endParaRPr lang="en-US" dirty="0"/>
           </a:p>
         </p:txBody>
       </p:sp>
@@ -2185,7 +2304,7 @@
               <a:pPr>
                 <a:defRPr/>
               </a:pPr>
-              <a:t>49</a:t>
+              <a:t>35</a:t>
             </a:fld>
             <a:endParaRPr lang="en-US"/>
           </a:p>
@@ -2194,7 +2313,121 @@
     </p:spTree>
     <p:extLst>
       <p:ext uri="{BB962C8B-B14F-4D97-AF65-F5344CB8AC3E}">
-        <p14:creationId xmlns:p14="http://schemas.microsoft.com/office/powerpoint/2010/main" val="2617528927"/>
+        <p14:creationId xmlns:p14="http://schemas.microsoft.com/office/powerpoint/2010/main" val="2523012080"/>
+      </p:ext>
+    </p:extLst>
+  </p:cSld>
+  <p:clrMapOvr>
+    <a:masterClrMapping/>
+  </p:clrMapOvr>
+</p:notes>
+</file>
+
+<file path=ppt/notesSlides/notesSlide9.xml><?xml version="1.0" encoding="utf-8"?>
+<p:notes xmlns:a="http://schemas.openxmlformats.org/drawingml/2006/main" xmlns:r="http://schemas.openxmlformats.org/officeDocument/2006/relationships" xmlns:p="http://schemas.openxmlformats.org/presentationml/2006/main">
+  <p:cSld>
+    <p:spTree>
+      <p:nvGrpSpPr>
+        <p:cNvPr id="1" name=""/>
+        <p:cNvGrpSpPr/>
+        <p:nvPr/>
+      </p:nvGrpSpPr>
+      <p:grpSpPr>
+        <a:xfrm>
+          <a:off x="0" y="0"/>
+          <a:ext cx="0" cy="0"/>
+          <a:chOff x="0" y="0"/>
+          <a:chExt cx="0" cy="0"/>
+        </a:xfrm>
+      </p:grpSpPr>
+      <p:sp>
+        <p:nvSpPr>
+          <p:cNvPr id="2" name="Slide Image Placeholder 1"/>
+          <p:cNvSpPr>
+            <a:spLocks noGrp="1" noRot="1" noChangeAspect="1"/>
+          </p:cNvSpPr>
+          <p:nvPr>
+            <p:ph type="sldImg"/>
+          </p:nvPr>
+        </p:nvSpPr>
+        <p:spPr/>
+      </p:sp>
+      <p:sp>
+        <p:nvSpPr>
+          <p:cNvPr id="3" name="Notes Placeholder 2"/>
+          <p:cNvSpPr>
+            <a:spLocks noGrp="1"/>
+          </p:cNvSpPr>
+          <p:nvPr>
+            <p:ph type="body" idx="1"/>
+          </p:nvPr>
+        </p:nvSpPr>
+        <p:spPr/>
+        <p:txBody>
+          <a:bodyPr/>
+          <a:lstStyle/>
+          <a:p>
+            <a:r>
+              <a:rPr lang="en-US" dirty="0" smtClean="0"/>
+              <a:t>Error in </a:t>
+            </a:r>
+            <a:r>
+              <a:rPr lang="en-US" dirty="0" err="1" smtClean="0"/>
+              <a:t>cudaMalloc</a:t>
+            </a:r>
+            <a:r>
+              <a:rPr lang="en-US" dirty="0" smtClean="0"/>
+              <a:t> calls: should pass</a:t>
+            </a:r>
+            <a:r>
+              <a:rPr lang="en-US" baseline="0" dirty="0" smtClean="0"/>
+              <a:t> address of point, e.g., “(void *)&amp;</a:t>
+            </a:r>
+            <a:r>
+              <a:rPr lang="en-US" baseline="0" dirty="0" err="1" smtClean="0"/>
+              <a:t>Md</a:t>
+            </a:r>
+            <a:r>
+              <a:rPr lang="en-US" baseline="0" dirty="0" smtClean="0"/>
+              <a:t>”</a:t>
+            </a:r>
+            <a:endParaRPr lang="en-US" dirty="0"/>
+          </a:p>
+        </p:txBody>
+      </p:sp>
+      <p:sp>
+        <p:nvSpPr>
+          <p:cNvPr id="4" name="Slide Number Placeholder 3"/>
+          <p:cNvSpPr>
+            <a:spLocks noGrp="1"/>
+          </p:cNvSpPr>
+          <p:nvPr>
+            <p:ph type="sldNum" sz="quarter" idx="10"/>
+          </p:nvPr>
+        </p:nvSpPr>
+        <p:spPr/>
+        <p:txBody>
+          <a:bodyPr/>
+          <a:lstStyle/>
+          <a:p>
+            <a:pPr>
+              <a:defRPr/>
+            </a:pPr>
+            <a:fld id="{142DFF84-32C4-4278-B979-9D6DC1A53C0D}" type="slidenum">
+              <a:rPr lang="en-US" smtClean="0"/>
+              <a:pPr>
+                <a:defRPr/>
+              </a:pPr>
+              <a:t>38</a:t>
+            </a:fld>
+            <a:endParaRPr lang="en-US"/>
+          </a:p>
+        </p:txBody>
+      </p:sp>
+    </p:spTree>
+    <p:extLst>
+      <p:ext uri="{BB962C8B-B14F-4D97-AF65-F5344CB8AC3E}">
+        <p14:creationId xmlns:p14="http://schemas.microsoft.com/office/powerpoint/2010/main" val="2737187805"/>
       </p:ext>
     </p:extLst>
   </p:cSld>
@@ -2269,7 +2502,7 @@
             </a:ln>
             <a:extLst>
               <a:ext uri="{91240B29-F687-4f45-9708-019B960494DF}">
-                <a14:hiddenLine xmlns:a14="http://schemas.microsoft.com/office/drawing/2010/main" xmlns="" w="9525">
+                <a14:hiddenLine xmlns="" xmlns:a14="http://schemas.microsoft.com/office/drawing/2010/main" w="9525">
                   <a:solidFill>
                     <a:srgbClr val="000000"/>
                   </a:solidFill>
@@ -2315,7 +2548,7 @@
             </a:ln>
             <a:extLst>
               <a:ext uri="{91240B29-F687-4f45-9708-019B960494DF}">
-                <a14:hiddenLine xmlns:a14="http://schemas.microsoft.com/office/drawing/2010/main" xmlns="" w="9525">
+                <a14:hiddenLine xmlns="" xmlns:a14="http://schemas.microsoft.com/office/drawing/2010/main" w="9525">
                   <a:solidFill>
                     <a:srgbClr val="000000"/>
                   </a:solidFill>
@@ -2377,7 +2610,7 @@
               </a:ln>
               <a:extLst>
                 <a:ext uri="{91240B29-F687-4f45-9708-019B960494DF}">
-                  <a14:hiddenLine xmlns:a14="http://schemas.microsoft.com/office/drawing/2010/main" xmlns="" w="9525">
+                  <a14:hiddenLine xmlns="" xmlns:a14="http://schemas.microsoft.com/office/drawing/2010/main" w="9525">
                     <a:solidFill>
                       <a:srgbClr val="000000"/>
                     </a:solidFill>
@@ -2423,7 +2656,7 @@
               </a:ln>
               <a:extLst>
                 <a:ext uri="{91240B29-F687-4f45-9708-019B960494DF}">
-                  <a14:hiddenLine xmlns:a14="http://schemas.microsoft.com/office/drawing/2010/main" xmlns="" w="9525">
+                  <a14:hiddenLine xmlns="" xmlns:a14="http://schemas.microsoft.com/office/drawing/2010/main" w="9525">
                     <a:solidFill>
                       <a:srgbClr val="000000"/>
                     </a:solidFill>
@@ -2469,7 +2702,7 @@
               </a:ln>
               <a:extLst>
                 <a:ext uri="{91240B29-F687-4f45-9708-019B960494DF}">
-                  <a14:hiddenLine xmlns:a14="http://schemas.microsoft.com/office/drawing/2010/main" xmlns="" w="9525">
+                  <a14:hiddenLine xmlns="" xmlns:a14="http://schemas.microsoft.com/office/drawing/2010/main" w="9525">
                     <a:solidFill>
                       <a:srgbClr val="000000"/>
                     </a:solidFill>
@@ -2515,7 +2748,7 @@
               </a:ln>
               <a:extLst>
                 <a:ext uri="{91240B29-F687-4f45-9708-019B960494DF}">
-                  <a14:hiddenLine xmlns:a14="http://schemas.microsoft.com/office/drawing/2010/main" xmlns="" w="9525">
+                  <a14:hiddenLine xmlns="" xmlns:a14="http://schemas.microsoft.com/office/drawing/2010/main" w="9525">
                     <a:solidFill>
                       <a:srgbClr val="000000"/>
                     </a:solidFill>
@@ -2561,7 +2794,7 @@
               </a:ln>
               <a:extLst>
                 <a:ext uri="{91240B29-F687-4f45-9708-019B960494DF}">
-                  <a14:hiddenLine xmlns:a14="http://schemas.microsoft.com/office/drawing/2010/main" xmlns="" w="9525">
+                  <a14:hiddenLine xmlns="" xmlns:a14="http://schemas.microsoft.com/office/drawing/2010/main" w="9525">
                     <a:solidFill>
                       <a:srgbClr val="000000"/>
                     </a:solidFill>
@@ -2607,7 +2840,7 @@
               </a:ln>
               <a:extLst>
                 <a:ext uri="{91240B29-F687-4f45-9708-019B960494DF}">
-                  <a14:hiddenLine xmlns:a14="http://schemas.microsoft.com/office/drawing/2010/main" xmlns="" w="9525">
+                  <a14:hiddenLine xmlns="" xmlns:a14="http://schemas.microsoft.com/office/drawing/2010/main" w="9525">
                     <a:solidFill>
                       <a:srgbClr val="000000"/>
                     </a:solidFill>
@@ -2653,7 +2886,7 @@
               </a:ln>
               <a:extLst>
                 <a:ext uri="{91240B29-F687-4f45-9708-019B960494DF}">
-                  <a14:hiddenLine xmlns:a14="http://schemas.microsoft.com/office/drawing/2010/main" xmlns="" w="9525">
+                  <a14:hiddenLine xmlns="" xmlns:a14="http://schemas.microsoft.com/office/drawing/2010/main" w="9525">
                     <a:solidFill>
                       <a:srgbClr val="000000"/>
                     </a:solidFill>
@@ -2699,7 +2932,7 @@
               </a:ln>
               <a:extLst>
                 <a:ext uri="{91240B29-F687-4f45-9708-019B960494DF}">
-                  <a14:hiddenLine xmlns:a14="http://schemas.microsoft.com/office/drawing/2010/main" xmlns="" w="9525">
+                  <a14:hiddenLine xmlns="" xmlns:a14="http://schemas.microsoft.com/office/drawing/2010/main" w="9525">
                     <a:solidFill>
                       <a:srgbClr val="000000"/>
                     </a:solidFill>
@@ -2745,7 +2978,7 @@
               </a:ln>
               <a:extLst>
                 <a:ext uri="{91240B29-F687-4f45-9708-019B960494DF}">
-                  <a14:hiddenLine xmlns:a14="http://schemas.microsoft.com/office/drawing/2010/main" xmlns="" w="9525">
+                  <a14:hiddenLine xmlns="" xmlns:a14="http://schemas.microsoft.com/office/drawing/2010/main" w="9525">
                     <a:solidFill>
                       <a:srgbClr val="000000"/>
                     </a:solidFill>
@@ -2791,7 +3024,7 @@
               </a:ln>
               <a:extLst>
                 <a:ext uri="{91240B29-F687-4f45-9708-019B960494DF}">
-                  <a14:hiddenLine xmlns:a14="http://schemas.microsoft.com/office/drawing/2010/main" xmlns="" w="9525">
+                  <a14:hiddenLine xmlns="" xmlns:a14="http://schemas.microsoft.com/office/drawing/2010/main" w="9525">
                     <a:solidFill>
                       <a:srgbClr val="000000"/>
                     </a:solidFill>
@@ -5591,7 +5824,7 @@
             </a:ln>
             <a:extLst>
               <a:ext uri="{91240B29-F687-4f45-9708-019B960494DF}">
-                <a14:hiddenLine xmlns:a14="http://schemas.microsoft.com/office/drawing/2010/main" xmlns="" w="9525">
+                <a14:hiddenLine xmlns="" xmlns:a14="http://schemas.microsoft.com/office/drawing/2010/main" w="9525">
                   <a:solidFill>
                     <a:srgbClr val="000000"/>
                   </a:solidFill>
@@ -5645,7 +5878,7 @@
             </a:ln>
             <a:extLst>
               <a:ext uri="{91240B29-F687-4f45-9708-019B960494DF}">
-                <a14:hiddenLine xmlns:a14="http://schemas.microsoft.com/office/drawing/2010/main" xmlns="" w="9525">
+                <a14:hiddenLine xmlns="" xmlns:a14="http://schemas.microsoft.com/office/drawing/2010/main" w="9525">
                   <a:solidFill>
                     <a:srgbClr val="000000"/>
                   </a:solidFill>
@@ -5691,7 +5924,7 @@
             </a:ln>
             <a:extLst>
               <a:ext uri="{91240B29-F687-4f45-9708-019B960494DF}">
-                <a14:hiddenLine xmlns:a14="http://schemas.microsoft.com/office/drawing/2010/main" xmlns="" w="9525">
+                <a14:hiddenLine xmlns="" xmlns:a14="http://schemas.microsoft.com/office/drawing/2010/main" w="9525">
                   <a:solidFill>
                     <a:srgbClr val="000000"/>
                   </a:solidFill>
@@ -5739,7 +5972,7 @@
             </a:ln>
             <a:extLst>
               <a:ext uri="{91240B29-F687-4f45-9708-019B960494DF}">
-                <a14:hiddenLine xmlns:a14="http://schemas.microsoft.com/office/drawing/2010/main" xmlns="" w="9525">
+                <a14:hiddenLine xmlns="" xmlns:a14="http://schemas.microsoft.com/office/drawing/2010/main" w="9525">
                   <a:solidFill>
                     <a:srgbClr val="000000"/>
                   </a:solidFill>
@@ -5787,7 +6020,7 @@
             </a:ln>
             <a:extLst>
               <a:ext uri="{91240B29-F687-4f45-9708-019B960494DF}">
-                <a14:hiddenLine xmlns:a14="http://schemas.microsoft.com/office/drawing/2010/main" xmlns="" w="9525">
+                <a14:hiddenLine xmlns="" xmlns:a14="http://schemas.microsoft.com/office/drawing/2010/main" w="9525">
                   <a:solidFill>
                     <a:srgbClr val="000000"/>
                   </a:solidFill>
@@ -5835,7 +6068,7 @@
             </a:ln>
             <a:extLst>
               <a:ext uri="{91240B29-F687-4f45-9708-019B960494DF}">
-                <a14:hiddenLine xmlns:a14="http://schemas.microsoft.com/office/drawing/2010/main" xmlns="" w="9525">
+                <a14:hiddenLine xmlns="" xmlns:a14="http://schemas.microsoft.com/office/drawing/2010/main" w="9525">
                   <a:solidFill>
                     <a:srgbClr val="000000"/>
                   </a:solidFill>
@@ -5883,7 +6116,7 @@
             </a:ln>
             <a:extLst>
               <a:ext uri="{91240B29-F687-4f45-9708-019B960494DF}">
-                <a14:hiddenLine xmlns:a14="http://schemas.microsoft.com/office/drawing/2010/main" xmlns="" w="9525">
+                <a14:hiddenLine xmlns="" xmlns:a14="http://schemas.microsoft.com/office/drawing/2010/main" w="9525">
                   <a:solidFill>
                     <a:srgbClr val="000000"/>
                   </a:solidFill>
@@ -5929,7 +6162,7 @@
             </a:ln>
             <a:extLst>
               <a:ext uri="{91240B29-F687-4f45-9708-019B960494DF}">
-                <a14:hiddenLine xmlns:a14="http://schemas.microsoft.com/office/drawing/2010/main" xmlns="" w="9525">
+                <a14:hiddenLine xmlns="" xmlns:a14="http://schemas.microsoft.com/office/drawing/2010/main" w="9525">
                   <a:solidFill>
                     <a:srgbClr val="000000"/>
                   </a:solidFill>
@@ -5977,7 +6210,7 @@
             </a:ln>
             <a:extLst>
               <a:ext uri="{91240B29-F687-4f45-9708-019B960494DF}">
-                <a14:hiddenLine xmlns:a14="http://schemas.microsoft.com/office/drawing/2010/main" xmlns="" w="9525">
+                <a14:hiddenLine xmlns="" xmlns:a14="http://schemas.microsoft.com/office/drawing/2010/main" w="9525">
                   <a:solidFill>
                     <a:srgbClr val="000000"/>
                   </a:solidFill>
@@ -6026,14 +6259,14 @@
           </a:ln>
           <a:extLst>
             <a:ext uri="{909E8E84-426E-40dd-AFC4-6F175D3DCCD1}">
-              <a14:hiddenFill xmlns:a14="http://schemas.microsoft.com/office/drawing/2010/main" xmlns="">
+              <a14:hiddenFill xmlns="" xmlns:a14="http://schemas.microsoft.com/office/drawing/2010/main">
                 <a:solidFill>
                   <a:srgbClr val="FFFFFF"/>
                 </a:solidFill>
               </a14:hiddenFill>
             </a:ext>
             <a:ext uri="{91240B29-F687-4f45-9708-019B960494DF}">
-              <a14:hiddenLine xmlns:a14="http://schemas.microsoft.com/office/drawing/2010/main" xmlns="" w="9525">
+              <a14:hiddenLine xmlns="" xmlns:a14="http://schemas.microsoft.com/office/drawing/2010/main" w="9525">
                 <a:solidFill>
                   <a:srgbClr val="000000"/>
                 </a:solidFill>
@@ -6084,14 +6317,14 @@
           </a:ln>
           <a:extLst>
             <a:ext uri="{909E8E84-426E-40dd-AFC4-6F175D3DCCD1}">
-              <a14:hiddenFill xmlns:a14="http://schemas.microsoft.com/office/drawing/2010/main" xmlns="">
+              <a14:hiddenFill xmlns="" xmlns:a14="http://schemas.microsoft.com/office/drawing/2010/main">
                 <a:solidFill>
                   <a:srgbClr val="FFFFFF"/>
                 </a:solidFill>
               </a14:hiddenFill>
             </a:ext>
             <a:ext uri="{91240B29-F687-4f45-9708-019B960494DF}">
-              <a14:hiddenLine xmlns:a14="http://schemas.microsoft.com/office/drawing/2010/main" xmlns="" w="9525">
+              <a14:hiddenLine xmlns="" xmlns:a14="http://schemas.microsoft.com/office/drawing/2010/main" w="9525">
                 <a:solidFill>
                   <a:srgbClr val="000000"/>
                 </a:solidFill>
@@ -6705,13 +6938,8 @@
             </a:pPr>
             <a:r>
               <a:rPr lang="en-US" dirty="0" smtClean="0"/>
-              <a:t>CIS 565 - Fall </a:t>
-            </a:r>
-            <a:r>
-              <a:rPr lang="en-US" dirty="0" smtClean="0"/>
-              <a:t>2016</a:t>
-            </a:r>
-            <a:endParaRPr lang="en-US" dirty="0" smtClean="0"/>
+              <a:t>CIS 565 - Fall 2016</a:t>
+            </a:r>
           </a:p>
         </p:txBody>
       </p:sp>
@@ -6913,7 +7141,7 @@
               </a:ln>
               <a:extLst>
                 <a:ext uri="{909E8E84-426E-40dd-AFC4-6F175D3DCCD1}">
-                  <a14:hiddenFill xmlns:a14="http://schemas.microsoft.com/office/drawing/2010/main" xmlns="">
+                  <a14:hiddenFill xmlns="" xmlns:a14="http://schemas.microsoft.com/office/drawing/2010/main">
                     <a:solidFill>
                       <a:srgbClr val="FFFFFF"/>
                     </a:solidFill>
@@ -6956,7 +7184,7 @@
               </a:ln>
               <a:extLst>
                 <a:ext uri="{909E8E84-426E-40dd-AFC4-6F175D3DCCD1}">
-                  <a14:hiddenFill xmlns:a14="http://schemas.microsoft.com/office/drawing/2010/main" xmlns="">
+                  <a14:hiddenFill xmlns="" xmlns:a14="http://schemas.microsoft.com/office/drawing/2010/main">
                     <a:noFill/>
                   </a14:hiddenFill>
                 </a:ext>
@@ -6997,7 +7225,7 @@
               </a:ln>
               <a:extLst>
                 <a:ext uri="{909E8E84-426E-40dd-AFC4-6F175D3DCCD1}">
-                  <a14:hiddenFill xmlns:a14="http://schemas.microsoft.com/office/drawing/2010/main" xmlns="">
+                  <a14:hiddenFill xmlns="" xmlns:a14="http://schemas.microsoft.com/office/drawing/2010/main">
                     <a:noFill/>
                   </a14:hiddenFill>
                 </a:ext>
@@ -7038,7 +7266,7 @@
               </a:ln>
               <a:extLst>
                 <a:ext uri="{909E8E84-426E-40dd-AFC4-6F175D3DCCD1}">
-                  <a14:hiddenFill xmlns:a14="http://schemas.microsoft.com/office/drawing/2010/main" xmlns="">
+                  <a14:hiddenFill xmlns="" xmlns:a14="http://schemas.microsoft.com/office/drawing/2010/main">
                     <a:noFill/>
                   </a14:hiddenFill>
                 </a:ext>
@@ -7079,7 +7307,7 @@
               </a:ln>
               <a:extLst>
                 <a:ext uri="{909E8E84-426E-40dd-AFC4-6F175D3DCCD1}">
-                  <a14:hiddenFill xmlns:a14="http://schemas.microsoft.com/office/drawing/2010/main" xmlns="">
+                  <a14:hiddenFill xmlns="" xmlns:a14="http://schemas.microsoft.com/office/drawing/2010/main">
                     <a:noFill/>
                   </a14:hiddenFill>
                 </a:ext>
@@ -7120,7 +7348,7 @@
               </a:ln>
               <a:extLst>
                 <a:ext uri="{909E8E84-426E-40dd-AFC4-6F175D3DCCD1}">
-                  <a14:hiddenFill xmlns:a14="http://schemas.microsoft.com/office/drawing/2010/main" xmlns="">
+                  <a14:hiddenFill xmlns="" xmlns:a14="http://schemas.microsoft.com/office/drawing/2010/main">
                     <a:noFill/>
                   </a14:hiddenFill>
                 </a:ext>
@@ -7161,7 +7389,7 @@
               </a:ln>
               <a:extLst>
                 <a:ext uri="{909E8E84-426E-40dd-AFC4-6F175D3DCCD1}">
-                  <a14:hiddenFill xmlns:a14="http://schemas.microsoft.com/office/drawing/2010/main" xmlns="">
+                  <a14:hiddenFill xmlns="" xmlns:a14="http://schemas.microsoft.com/office/drawing/2010/main">
                     <a:noFill/>
                   </a14:hiddenFill>
                 </a:ext>
@@ -7202,7 +7430,7 @@
               </a:ln>
               <a:extLst>
                 <a:ext uri="{909E8E84-426E-40dd-AFC4-6F175D3DCCD1}">
-                  <a14:hiddenFill xmlns:a14="http://schemas.microsoft.com/office/drawing/2010/main" xmlns="">
+                  <a14:hiddenFill xmlns="" xmlns:a14="http://schemas.microsoft.com/office/drawing/2010/main">
                     <a:noFill/>
                   </a14:hiddenFill>
                 </a:ext>
@@ -7260,7 +7488,7 @@
               </a:ln>
               <a:extLst>
                 <a:ext uri="{909E8E84-426E-40dd-AFC4-6F175D3DCCD1}">
-                  <a14:hiddenFill xmlns:a14="http://schemas.microsoft.com/office/drawing/2010/main" xmlns="">
+                  <a14:hiddenFill xmlns="" xmlns:a14="http://schemas.microsoft.com/office/drawing/2010/main">
                     <a:solidFill>
                       <a:srgbClr val="FFFFFF"/>
                     </a:solidFill>
@@ -7303,7 +7531,7 @@
               </a:ln>
               <a:extLst>
                 <a:ext uri="{909E8E84-426E-40dd-AFC4-6F175D3DCCD1}">
-                  <a14:hiddenFill xmlns:a14="http://schemas.microsoft.com/office/drawing/2010/main" xmlns="">
+                  <a14:hiddenFill xmlns="" xmlns:a14="http://schemas.microsoft.com/office/drawing/2010/main">
                     <a:noFill/>
                   </a14:hiddenFill>
                 </a:ext>
@@ -7344,7 +7572,7 @@
               </a:ln>
               <a:extLst>
                 <a:ext uri="{909E8E84-426E-40dd-AFC4-6F175D3DCCD1}">
-                  <a14:hiddenFill xmlns:a14="http://schemas.microsoft.com/office/drawing/2010/main" xmlns="">
+                  <a14:hiddenFill xmlns="" xmlns:a14="http://schemas.microsoft.com/office/drawing/2010/main">
                     <a:noFill/>
                   </a14:hiddenFill>
                 </a:ext>
@@ -7385,7 +7613,7 @@
               </a:ln>
               <a:extLst>
                 <a:ext uri="{909E8E84-426E-40dd-AFC4-6F175D3DCCD1}">
-                  <a14:hiddenFill xmlns:a14="http://schemas.microsoft.com/office/drawing/2010/main" xmlns="">
+                  <a14:hiddenFill xmlns="" xmlns:a14="http://schemas.microsoft.com/office/drawing/2010/main">
                     <a:noFill/>
                   </a14:hiddenFill>
                 </a:ext>
@@ -7426,7 +7654,7 @@
               </a:ln>
               <a:extLst>
                 <a:ext uri="{909E8E84-426E-40dd-AFC4-6F175D3DCCD1}">
-                  <a14:hiddenFill xmlns:a14="http://schemas.microsoft.com/office/drawing/2010/main" xmlns="">
+                  <a14:hiddenFill xmlns="" xmlns:a14="http://schemas.microsoft.com/office/drawing/2010/main">
                     <a:noFill/>
                   </a14:hiddenFill>
                 </a:ext>
@@ -7467,7 +7695,7 @@
               </a:ln>
               <a:extLst>
                 <a:ext uri="{909E8E84-426E-40dd-AFC4-6F175D3DCCD1}">
-                  <a14:hiddenFill xmlns:a14="http://schemas.microsoft.com/office/drawing/2010/main" xmlns="">
+                  <a14:hiddenFill xmlns="" xmlns:a14="http://schemas.microsoft.com/office/drawing/2010/main">
                     <a:noFill/>
                   </a14:hiddenFill>
                 </a:ext>
@@ -7508,7 +7736,7 @@
               </a:ln>
               <a:extLst>
                 <a:ext uri="{909E8E84-426E-40dd-AFC4-6F175D3DCCD1}">
-                  <a14:hiddenFill xmlns:a14="http://schemas.microsoft.com/office/drawing/2010/main" xmlns="">
+                  <a14:hiddenFill xmlns="" xmlns:a14="http://schemas.microsoft.com/office/drawing/2010/main">
                     <a:noFill/>
                   </a14:hiddenFill>
                 </a:ext>
@@ -7549,7 +7777,7 @@
               </a:ln>
               <a:extLst>
                 <a:ext uri="{909E8E84-426E-40dd-AFC4-6F175D3DCCD1}">
-                  <a14:hiddenFill xmlns:a14="http://schemas.microsoft.com/office/drawing/2010/main" xmlns="">
+                  <a14:hiddenFill xmlns="" xmlns:a14="http://schemas.microsoft.com/office/drawing/2010/main">
                     <a:noFill/>
                   </a14:hiddenFill>
                 </a:ext>
@@ -7590,7 +7818,7 @@
               </a:ln>
               <a:extLst>
                 <a:ext uri="{909E8E84-426E-40dd-AFC4-6F175D3DCCD1}">
-                  <a14:hiddenFill xmlns:a14="http://schemas.microsoft.com/office/drawing/2010/main" xmlns="">
+                  <a14:hiddenFill xmlns="" xmlns:a14="http://schemas.microsoft.com/office/drawing/2010/main">
                     <a:noFill/>
                   </a14:hiddenFill>
                 </a:ext>
@@ -7631,7 +7859,7 @@
               </a:ln>
               <a:extLst>
                 <a:ext uri="{909E8E84-426E-40dd-AFC4-6F175D3DCCD1}">
-                  <a14:hiddenFill xmlns:a14="http://schemas.microsoft.com/office/drawing/2010/main" xmlns="">
+                  <a14:hiddenFill xmlns="" xmlns:a14="http://schemas.microsoft.com/office/drawing/2010/main">
                     <a:noFill/>
                   </a14:hiddenFill>
                 </a:ext>
@@ -7672,7 +7900,7 @@
               </a:ln>
               <a:extLst>
                 <a:ext uri="{909E8E84-426E-40dd-AFC4-6F175D3DCCD1}">
-                  <a14:hiddenFill xmlns:a14="http://schemas.microsoft.com/office/drawing/2010/main" xmlns="">
+                  <a14:hiddenFill xmlns="" xmlns:a14="http://schemas.microsoft.com/office/drawing/2010/main">
                     <a:noFill/>
                   </a14:hiddenFill>
                 </a:ext>
@@ -7713,7 +7941,7 @@
               </a:ln>
               <a:extLst>
                 <a:ext uri="{909E8E84-426E-40dd-AFC4-6F175D3DCCD1}">
-                  <a14:hiddenFill xmlns:a14="http://schemas.microsoft.com/office/drawing/2010/main" xmlns="">
+                  <a14:hiddenFill xmlns="" xmlns:a14="http://schemas.microsoft.com/office/drawing/2010/main">
                     <a:noFill/>
                   </a14:hiddenFill>
                 </a:ext>
@@ -7754,7 +7982,7 @@
               </a:ln>
               <a:extLst>
                 <a:ext uri="{909E8E84-426E-40dd-AFC4-6F175D3DCCD1}">
-                  <a14:hiddenFill xmlns:a14="http://schemas.microsoft.com/office/drawing/2010/main" xmlns="">
+                  <a14:hiddenFill xmlns="" xmlns:a14="http://schemas.microsoft.com/office/drawing/2010/main">
                     <a:noFill/>
                   </a14:hiddenFill>
                 </a:ext>
@@ -7795,7 +8023,7 @@
               </a:ln>
               <a:extLst>
                 <a:ext uri="{909E8E84-426E-40dd-AFC4-6F175D3DCCD1}">
-                  <a14:hiddenFill xmlns:a14="http://schemas.microsoft.com/office/drawing/2010/main" xmlns="">
+                  <a14:hiddenFill xmlns="" xmlns:a14="http://schemas.microsoft.com/office/drawing/2010/main">
                     <a:noFill/>
                   </a14:hiddenFill>
                 </a:ext>
@@ -7836,7 +8064,7 @@
               </a:ln>
               <a:extLst>
                 <a:ext uri="{909E8E84-426E-40dd-AFC4-6F175D3DCCD1}">
-                  <a14:hiddenFill xmlns:a14="http://schemas.microsoft.com/office/drawing/2010/main" xmlns="">
+                  <a14:hiddenFill xmlns="" xmlns:a14="http://schemas.microsoft.com/office/drawing/2010/main">
                     <a:noFill/>
                   </a14:hiddenFill>
                 </a:ext>
@@ -7878,7 +8106,7 @@
             </a:ln>
             <a:extLst>
               <a:ext uri="{909E8E84-426E-40dd-AFC4-6F175D3DCCD1}">
-                <a14:hiddenFill xmlns:a14="http://schemas.microsoft.com/office/drawing/2010/main" xmlns="">
+                <a14:hiddenFill xmlns="" xmlns:a14="http://schemas.microsoft.com/office/drawing/2010/main">
                   <a:solidFill>
                     <a:srgbClr val="FFFFFF"/>
                   </a:solidFill>
@@ -7921,7 +8149,7 @@
             </a:ln>
             <a:extLst>
               <a:ext uri="{909E8E84-426E-40dd-AFC4-6F175D3DCCD1}">
-                <a14:hiddenFill xmlns:a14="http://schemas.microsoft.com/office/drawing/2010/main" xmlns="">
+                <a14:hiddenFill xmlns="" xmlns:a14="http://schemas.microsoft.com/office/drawing/2010/main">
                   <a:noFill/>
                 </a14:hiddenFill>
               </a:ext>
@@ -7962,7 +8190,7 @@
             </a:ln>
             <a:extLst>
               <a:ext uri="{909E8E84-426E-40dd-AFC4-6F175D3DCCD1}">
-                <a14:hiddenFill xmlns:a14="http://schemas.microsoft.com/office/drawing/2010/main" xmlns="">
+                <a14:hiddenFill xmlns="" xmlns:a14="http://schemas.microsoft.com/office/drawing/2010/main">
                   <a:noFill/>
                 </a14:hiddenFill>
               </a:ext>
@@ -8003,7 +8231,7 @@
             </a:ln>
             <a:extLst>
               <a:ext uri="{909E8E84-426E-40dd-AFC4-6F175D3DCCD1}">
-                <a14:hiddenFill xmlns:a14="http://schemas.microsoft.com/office/drawing/2010/main" xmlns="">
+                <a14:hiddenFill xmlns="" xmlns:a14="http://schemas.microsoft.com/office/drawing/2010/main">
                   <a:noFill/>
                 </a14:hiddenFill>
               </a:ext>
@@ -8044,7 +8272,7 @@
             </a:ln>
             <a:extLst>
               <a:ext uri="{909E8E84-426E-40dd-AFC4-6F175D3DCCD1}">
-                <a14:hiddenFill xmlns:a14="http://schemas.microsoft.com/office/drawing/2010/main" xmlns="">
+                <a14:hiddenFill xmlns="" xmlns:a14="http://schemas.microsoft.com/office/drawing/2010/main">
                   <a:noFill/>
                 </a14:hiddenFill>
               </a:ext>
@@ -8085,7 +8313,7 @@
             </a:ln>
             <a:extLst>
               <a:ext uri="{909E8E84-426E-40dd-AFC4-6F175D3DCCD1}">
-                <a14:hiddenFill xmlns:a14="http://schemas.microsoft.com/office/drawing/2010/main" xmlns="">
+                <a14:hiddenFill xmlns="" xmlns:a14="http://schemas.microsoft.com/office/drawing/2010/main">
                   <a:noFill/>
                 </a14:hiddenFill>
               </a:ext>
@@ -8126,7 +8354,7 @@
             </a:ln>
             <a:extLst>
               <a:ext uri="{909E8E84-426E-40dd-AFC4-6F175D3DCCD1}">
-                <a14:hiddenFill xmlns:a14="http://schemas.microsoft.com/office/drawing/2010/main" xmlns="">
+                <a14:hiddenFill xmlns="" xmlns:a14="http://schemas.microsoft.com/office/drawing/2010/main">
                   <a:noFill/>
                 </a14:hiddenFill>
               </a:ext>
@@ -8167,7 +8395,7 @@
             </a:ln>
             <a:extLst>
               <a:ext uri="{909E8E84-426E-40dd-AFC4-6F175D3DCCD1}">
-                <a14:hiddenFill xmlns:a14="http://schemas.microsoft.com/office/drawing/2010/main" xmlns="">
+                <a14:hiddenFill xmlns="" xmlns:a14="http://schemas.microsoft.com/office/drawing/2010/main">
                   <a:noFill/>
                 </a14:hiddenFill>
               </a:ext>
@@ -8208,7 +8436,7 @@
             </a:ln>
             <a:extLst>
               <a:ext uri="{909E8E84-426E-40dd-AFC4-6F175D3DCCD1}">
-                <a14:hiddenFill xmlns:a14="http://schemas.microsoft.com/office/drawing/2010/main" xmlns="">
+                <a14:hiddenFill xmlns="" xmlns:a14="http://schemas.microsoft.com/office/drawing/2010/main">
                   <a:noFill/>
                 </a14:hiddenFill>
               </a:ext>
@@ -8249,7 +8477,7 @@
             </a:ln>
             <a:extLst>
               <a:ext uri="{909E8E84-426E-40dd-AFC4-6F175D3DCCD1}">
-                <a14:hiddenFill xmlns:a14="http://schemas.microsoft.com/office/drawing/2010/main" xmlns="">
+                <a14:hiddenFill xmlns="" xmlns:a14="http://schemas.microsoft.com/office/drawing/2010/main">
                   <a:noFill/>
                 </a14:hiddenFill>
               </a:ext>
@@ -8290,7 +8518,7 @@
             </a:ln>
             <a:extLst>
               <a:ext uri="{909E8E84-426E-40dd-AFC4-6F175D3DCCD1}">
-                <a14:hiddenFill xmlns:a14="http://schemas.microsoft.com/office/drawing/2010/main" xmlns="">
+                <a14:hiddenFill xmlns="" xmlns:a14="http://schemas.microsoft.com/office/drawing/2010/main">
                   <a:noFill/>
                 </a14:hiddenFill>
               </a:ext>
@@ -8331,7 +8559,7 @@
             </a:ln>
             <a:extLst>
               <a:ext uri="{909E8E84-426E-40dd-AFC4-6F175D3DCCD1}">
-                <a14:hiddenFill xmlns:a14="http://schemas.microsoft.com/office/drawing/2010/main" xmlns="">
+                <a14:hiddenFill xmlns="" xmlns:a14="http://schemas.microsoft.com/office/drawing/2010/main">
                   <a:noFill/>
                 </a14:hiddenFill>
               </a:ext>
@@ -8372,7 +8600,7 @@
             </a:ln>
             <a:extLst>
               <a:ext uri="{909E8E84-426E-40dd-AFC4-6F175D3DCCD1}">
-                <a14:hiddenFill xmlns:a14="http://schemas.microsoft.com/office/drawing/2010/main" xmlns="">
+                <a14:hiddenFill xmlns="" xmlns:a14="http://schemas.microsoft.com/office/drawing/2010/main">
                   <a:noFill/>
                 </a14:hiddenFill>
               </a:ext>
@@ -8413,7 +8641,7 @@
             </a:ln>
             <a:extLst>
               <a:ext uri="{909E8E84-426E-40dd-AFC4-6F175D3DCCD1}">
-                <a14:hiddenFill xmlns:a14="http://schemas.microsoft.com/office/drawing/2010/main" xmlns="">
+                <a14:hiddenFill xmlns="" xmlns:a14="http://schemas.microsoft.com/office/drawing/2010/main">
                   <a:noFill/>
                 </a14:hiddenFill>
               </a:ext>
@@ -8454,7 +8682,7 @@
             </a:ln>
             <a:extLst>
               <a:ext uri="{909E8E84-426E-40dd-AFC4-6F175D3DCCD1}">
-                <a14:hiddenFill xmlns:a14="http://schemas.microsoft.com/office/drawing/2010/main" xmlns="">
+                <a14:hiddenFill xmlns="" xmlns:a14="http://schemas.microsoft.com/office/drawing/2010/main">
                   <a:noFill/>
                 </a14:hiddenFill>
               </a:ext>
@@ -8495,7 +8723,7 @@
             </a:ln>
             <a:extLst>
               <a:ext uri="{909E8E84-426E-40dd-AFC4-6F175D3DCCD1}">
-                <a14:hiddenFill xmlns:a14="http://schemas.microsoft.com/office/drawing/2010/main" xmlns="">
+                <a14:hiddenFill xmlns="" xmlns:a14="http://schemas.microsoft.com/office/drawing/2010/main">
                   <a:noFill/>
                 </a14:hiddenFill>
               </a:ext>
@@ -8536,7 +8764,7 @@
             </a:ln>
             <a:extLst>
               <a:ext uri="{909E8E84-426E-40dd-AFC4-6F175D3DCCD1}">
-                <a14:hiddenFill xmlns:a14="http://schemas.microsoft.com/office/drawing/2010/main" xmlns="">
+                <a14:hiddenFill xmlns="" xmlns:a14="http://schemas.microsoft.com/office/drawing/2010/main">
                   <a:noFill/>
                 </a14:hiddenFill>
               </a:ext>
@@ -8577,7 +8805,7 @@
             </a:ln>
             <a:extLst>
               <a:ext uri="{909E8E84-426E-40dd-AFC4-6F175D3DCCD1}">
-                <a14:hiddenFill xmlns:a14="http://schemas.microsoft.com/office/drawing/2010/main" xmlns="">
+                <a14:hiddenFill xmlns="" xmlns:a14="http://schemas.microsoft.com/office/drawing/2010/main">
                   <a:noFill/>
                 </a14:hiddenFill>
               </a:ext>
@@ -8618,7 +8846,7 @@
             </a:ln>
             <a:extLst>
               <a:ext uri="{909E8E84-426E-40dd-AFC4-6F175D3DCCD1}">
-                <a14:hiddenFill xmlns:a14="http://schemas.microsoft.com/office/drawing/2010/main" xmlns="">
+                <a14:hiddenFill xmlns="" xmlns:a14="http://schemas.microsoft.com/office/drawing/2010/main">
                   <a:noFill/>
                 </a14:hiddenFill>
               </a:ext>
@@ -8659,7 +8887,7 @@
             </a:ln>
             <a:extLst>
               <a:ext uri="{909E8E84-426E-40dd-AFC4-6F175D3DCCD1}">
-                <a14:hiddenFill xmlns:a14="http://schemas.microsoft.com/office/drawing/2010/main" xmlns="">
+                <a14:hiddenFill xmlns="" xmlns:a14="http://schemas.microsoft.com/office/drawing/2010/main">
                   <a:noFill/>
                 </a14:hiddenFill>
               </a:ext>
@@ -8700,7 +8928,7 @@
             </a:ln>
             <a:extLst>
               <a:ext uri="{909E8E84-426E-40dd-AFC4-6F175D3DCCD1}">
-                <a14:hiddenFill xmlns:a14="http://schemas.microsoft.com/office/drawing/2010/main" xmlns="">
+                <a14:hiddenFill xmlns="" xmlns:a14="http://schemas.microsoft.com/office/drawing/2010/main">
                   <a:noFill/>
                 </a14:hiddenFill>
               </a:ext>
@@ -8741,7 +8969,7 @@
             </a:ln>
             <a:extLst>
               <a:ext uri="{909E8E84-426E-40dd-AFC4-6F175D3DCCD1}">
-                <a14:hiddenFill xmlns:a14="http://schemas.microsoft.com/office/drawing/2010/main" xmlns="">
+                <a14:hiddenFill xmlns="" xmlns:a14="http://schemas.microsoft.com/office/drawing/2010/main">
                   <a:noFill/>
                 </a14:hiddenFill>
               </a:ext>
@@ -8782,7 +9010,7 @@
             </a:ln>
             <a:extLst>
               <a:ext uri="{909E8E84-426E-40dd-AFC4-6F175D3DCCD1}">
-                <a14:hiddenFill xmlns:a14="http://schemas.microsoft.com/office/drawing/2010/main" xmlns="">
+                <a14:hiddenFill xmlns="" xmlns:a14="http://schemas.microsoft.com/office/drawing/2010/main">
                   <a:noFill/>
                 </a14:hiddenFill>
               </a:ext>
@@ -8823,7 +9051,7 @@
             </a:ln>
             <a:extLst>
               <a:ext uri="{909E8E84-426E-40dd-AFC4-6F175D3DCCD1}">
-                <a14:hiddenFill xmlns:a14="http://schemas.microsoft.com/office/drawing/2010/main" xmlns="">
+                <a14:hiddenFill xmlns="" xmlns:a14="http://schemas.microsoft.com/office/drawing/2010/main">
                   <a:noFill/>
                 </a14:hiddenFill>
               </a:ext>
@@ -8864,7 +9092,7 @@
             </a:ln>
             <a:extLst>
               <a:ext uri="{909E8E84-426E-40dd-AFC4-6F175D3DCCD1}">
-                <a14:hiddenFill xmlns:a14="http://schemas.microsoft.com/office/drawing/2010/main" xmlns="">
+                <a14:hiddenFill xmlns="" xmlns:a14="http://schemas.microsoft.com/office/drawing/2010/main">
                   <a:noFill/>
                 </a14:hiddenFill>
               </a:ext>
@@ -8905,7 +9133,7 @@
             </a:ln>
             <a:extLst>
               <a:ext uri="{909E8E84-426E-40dd-AFC4-6F175D3DCCD1}">
-                <a14:hiddenFill xmlns:a14="http://schemas.microsoft.com/office/drawing/2010/main" xmlns="">
+                <a14:hiddenFill xmlns="" xmlns:a14="http://schemas.microsoft.com/office/drawing/2010/main">
                   <a:noFill/>
                 </a14:hiddenFill>
               </a:ext>
@@ -8946,7 +9174,7 @@
             </a:ln>
             <a:extLst>
               <a:ext uri="{909E8E84-426E-40dd-AFC4-6F175D3DCCD1}">
-                <a14:hiddenFill xmlns:a14="http://schemas.microsoft.com/office/drawing/2010/main" xmlns="">
+                <a14:hiddenFill xmlns="" xmlns:a14="http://schemas.microsoft.com/office/drawing/2010/main">
                   <a:noFill/>
                 </a14:hiddenFill>
               </a:ext>
@@ -8987,7 +9215,7 @@
             </a:ln>
             <a:extLst>
               <a:ext uri="{909E8E84-426E-40dd-AFC4-6F175D3DCCD1}">
-                <a14:hiddenFill xmlns:a14="http://schemas.microsoft.com/office/drawing/2010/main" xmlns="">
+                <a14:hiddenFill xmlns="" xmlns:a14="http://schemas.microsoft.com/office/drawing/2010/main">
                   <a:noFill/>
                 </a14:hiddenFill>
               </a:ext>
@@ -9028,7 +9256,7 @@
             </a:ln>
             <a:extLst>
               <a:ext uri="{909E8E84-426E-40dd-AFC4-6F175D3DCCD1}">
-                <a14:hiddenFill xmlns:a14="http://schemas.microsoft.com/office/drawing/2010/main" xmlns="">
+                <a14:hiddenFill xmlns="" xmlns:a14="http://schemas.microsoft.com/office/drawing/2010/main">
                   <a:noFill/>
                 </a14:hiddenFill>
               </a:ext>
@@ -9069,7 +9297,7 @@
             </a:ln>
             <a:extLst>
               <a:ext uri="{909E8E84-426E-40dd-AFC4-6F175D3DCCD1}">
-                <a14:hiddenFill xmlns:a14="http://schemas.microsoft.com/office/drawing/2010/main" xmlns="">
+                <a14:hiddenFill xmlns="" xmlns:a14="http://schemas.microsoft.com/office/drawing/2010/main">
                   <a:noFill/>
                 </a14:hiddenFill>
               </a:ext>
@@ -9110,7 +9338,7 @@
             </a:ln>
             <a:extLst>
               <a:ext uri="{909E8E84-426E-40dd-AFC4-6F175D3DCCD1}">
-                <a14:hiddenFill xmlns:a14="http://schemas.microsoft.com/office/drawing/2010/main" xmlns="">
+                <a14:hiddenFill xmlns="" xmlns:a14="http://schemas.microsoft.com/office/drawing/2010/main">
                   <a:noFill/>
                 </a14:hiddenFill>
               </a:ext>
@@ -9151,7 +9379,7 @@
             </a:ln>
             <a:extLst>
               <a:ext uri="{909E8E84-426E-40dd-AFC4-6F175D3DCCD1}">
-                <a14:hiddenFill xmlns:a14="http://schemas.microsoft.com/office/drawing/2010/main" xmlns="">
+                <a14:hiddenFill xmlns="" xmlns:a14="http://schemas.microsoft.com/office/drawing/2010/main">
                   <a:noFill/>
                 </a14:hiddenFill>
               </a:ext>
@@ -9192,7 +9420,7 @@
             </a:ln>
             <a:extLst>
               <a:ext uri="{909E8E84-426E-40dd-AFC4-6F175D3DCCD1}">
-                <a14:hiddenFill xmlns:a14="http://schemas.microsoft.com/office/drawing/2010/main" xmlns="">
+                <a14:hiddenFill xmlns="" xmlns:a14="http://schemas.microsoft.com/office/drawing/2010/main">
                   <a:noFill/>
                 </a14:hiddenFill>
               </a:ext>
@@ -9233,7 +9461,7 @@
             </a:ln>
             <a:extLst>
               <a:ext uri="{909E8E84-426E-40dd-AFC4-6F175D3DCCD1}">
-                <a14:hiddenFill xmlns:a14="http://schemas.microsoft.com/office/drawing/2010/main" xmlns="">
+                <a14:hiddenFill xmlns="" xmlns:a14="http://schemas.microsoft.com/office/drawing/2010/main">
                   <a:noFill/>
                 </a14:hiddenFill>
               </a:ext>
@@ -9274,7 +9502,7 @@
             </a:ln>
             <a:extLst>
               <a:ext uri="{909E8E84-426E-40dd-AFC4-6F175D3DCCD1}">
-                <a14:hiddenFill xmlns:a14="http://schemas.microsoft.com/office/drawing/2010/main" xmlns="">
+                <a14:hiddenFill xmlns="" xmlns:a14="http://schemas.microsoft.com/office/drawing/2010/main">
                   <a:noFill/>
                 </a14:hiddenFill>
               </a:ext>
@@ -9315,7 +9543,7 @@
             </a:ln>
             <a:extLst>
               <a:ext uri="{909E8E84-426E-40dd-AFC4-6F175D3DCCD1}">
-                <a14:hiddenFill xmlns:a14="http://schemas.microsoft.com/office/drawing/2010/main" xmlns="">
+                <a14:hiddenFill xmlns="" xmlns:a14="http://schemas.microsoft.com/office/drawing/2010/main">
                   <a:noFill/>
                 </a14:hiddenFill>
               </a:ext>
@@ -9646,7 +9874,7 @@
           <p:nvPr/>
         </p:nvPicPr>
         <p:blipFill>
-          <a:blip r:embed="rId2">
+          <a:blip r:embed="rId3">
             <a:extLst>
               <a:ext uri="{28A0092B-C50C-407E-A947-70E740481C1C}">
                 <a14:useLocalDpi xmlns:a14="http://schemas.microsoft.com/office/drawing/2010/main" val="0"/>
@@ -9672,14 +9900,14 @@
           </a:ln>
           <a:extLst>
             <a:ext uri="{909E8E84-426E-40dd-AFC4-6F175D3DCCD1}">
-              <a14:hiddenFill xmlns:a14="http://schemas.microsoft.com/office/drawing/2010/main" xmlns="">
+              <a14:hiddenFill xmlns="" xmlns:a14="http://schemas.microsoft.com/office/drawing/2010/main">
                 <a:solidFill>
                   <a:srgbClr val="FFFFFF"/>
                 </a:solidFill>
               </a14:hiddenFill>
             </a:ext>
             <a:ext uri="{91240B29-F687-4f45-9708-019B960494DF}">
-              <a14:hiddenLine xmlns:a14="http://schemas.microsoft.com/office/drawing/2010/main" xmlns="" w="9525">
+              <a14:hiddenLine xmlns="" xmlns:a14="http://schemas.microsoft.com/office/drawing/2010/main" w="9525">
                 <a:solidFill>
                   <a:srgbClr val="000000"/>
                 </a:solidFill>
@@ -9734,7 +9962,7 @@
             </a:ln>
             <a:extLst>
               <a:ext uri="{909E8E84-426E-40dd-AFC4-6F175D3DCCD1}">
-                <a14:hiddenFill xmlns:a14="http://schemas.microsoft.com/office/drawing/2010/main" xmlns="">
+                <a14:hiddenFill xmlns="" xmlns:a14="http://schemas.microsoft.com/office/drawing/2010/main">
                   <a:solidFill>
                     <a:srgbClr val="FFFFFF"/>
                   </a:solidFill>
@@ -9884,7 +10112,7 @@
             </a:ln>
             <a:extLst>
               <a:ext uri="{909E8E84-426E-40dd-AFC4-6F175D3DCCD1}">
-                <a14:hiddenFill xmlns:a14="http://schemas.microsoft.com/office/drawing/2010/main" xmlns="">
+                <a14:hiddenFill xmlns="" xmlns:a14="http://schemas.microsoft.com/office/drawing/2010/main">
                   <a:solidFill>
                     <a:srgbClr val="FFFFFF"/>
                   </a:solidFill>
@@ -9933,7 +10161,7 @@
             </a:ln>
             <a:extLst>
               <a:ext uri="{909E8E84-426E-40dd-AFC4-6F175D3DCCD1}">
-                <a14:hiddenFill xmlns:a14="http://schemas.microsoft.com/office/drawing/2010/main" xmlns="">
+                <a14:hiddenFill xmlns="" xmlns:a14="http://schemas.microsoft.com/office/drawing/2010/main">
                   <a:noFill/>
                 </a14:hiddenFill>
               </a:ext>
@@ -9984,7 +10212,7 @@
             </a:ln>
             <a:extLst>
               <a:ext uri="{909E8E84-426E-40dd-AFC4-6F175D3DCCD1}">
-                <a14:hiddenFill xmlns:a14="http://schemas.microsoft.com/office/drawing/2010/main" xmlns="">
+                <a14:hiddenFill xmlns="" xmlns:a14="http://schemas.microsoft.com/office/drawing/2010/main">
                   <a:solidFill>
                     <a:srgbClr val="FFFFFF"/>
                   </a:solidFill>
@@ -10134,7 +10362,7 @@
             </a:ln>
             <a:extLst>
               <a:ext uri="{909E8E84-426E-40dd-AFC4-6F175D3DCCD1}">
-                <a14:hiddenFill xmlns:a14="http://schemas.microsoft.com/office/drawing/2010/main" xmlns="">
+                <a14:hiddenFill xmlns="" xmlns:a14="http://schemas.microsoft.com/office/drawing/2010/main">
                   <a:solidFill>
                     <a:srgbClr val="FFFFFF"/>
                   </a:solidFill>
@@ -10184,7 +10412,7 @@
             </a:ln>
             <a:extLst>
               <a:ext uri="{909E8E84-426E-40dd-AFC4-6F175D3DCCD1}">
-                <a14:hiddenFill xmlns:a14="http://schemas.microsoft.com/office/drawing/2010/main" xmlns="">
+                <a14:hiddenFill xmlns="" xmlns:a14="http://schemas.microsoft.com/office/drawing/2010/main">
                   <a:noFill/>
                 </a14:hiddenFill>
               </a:ext>
@@ -10235,7 +10463,7 @@
             </a:ln>
             <a:extLst>
               <a:ext uri="{909E8E84-426E-40dd-AFC4-6F175D3DCCD1}">
-                <a14:hiddenFill xmlns:a14="http://schemas.microsoft.com/office/drawing/2010/main" xmlns="">
+                <a14:hiddenFill xmlns="" xmlns:a14="http://schemas.microsoft.com/office/drawing/2010/main">
                   <a:solidFill>
                     <a:srgbClr val="FFFFFF"/>
                   </a:solidFill>
@@ -10385,7 +10613,7 @@
             </a:ln>
             <a:extLst>
               <a:ext uri="{909E8E84-426E-40dd-AFC4-6F175D3DCCD1}">
-                <a14:hiddenFill xmlns:a14="http://schemas.microsoft.com/office/drawing/2010/main" xmlns="">
+                <a14:hiddenFill xmlns="" xmlns:a14="http://schemas.microsoft.com/office/drawing/2010/main">
                   <a:solidFill>
                     <a:srgbClr val="FFFFFF"/>
                   </a:solidFill>
@@ -10435,7 +10663,7 @@
             </a:ln>
             <a:extLst>
               <a:ext uri="{909E8E84-426E-40dd-AFC4-6F175D3DCCD1}">
-                <a14:hiddenFill xmlns:a14="http://schemas.microsoft.com/office/drawing/2010/main" xmlns="">
+                <a14:hiddenFill xmlns="" xmlns:a14="http://schemas.microsoft.com/office/drawing/2010/main">
                   <a:noFill/>
                 </a14:hiddenFill>
               </a:ext>
@@ -10665,7 +10893,12 @@
             <p:ph type="body" idx="1"/>
           </p:nvPr>
         </p:nvSpPr>
-        <p:spPr/>
+        <p:spPr>
+          <a:xfrm>
+            <a:off x="457200" y="1981200"/>
+            <a:ext cx="8458200" cy="3886200"/>
+          </a:xfrm>
+        </p:spPr>
         <p:txBody>
           <a:bodyPr/>
           <a:lstStyle/>
@@ -10693,15 +10926,11 @@
             <a:pPr lvl="2"/>
             <a:r>
               <a:rPr lang="en-US" dirty="0" smtClean="0"/>
-              <a:t>Fermi and </a:t>
-            </a:r>
-            <a:r>
-              <a:rPr lang="en-US" dirty="0" err="1" smtClean="0"/>
-              <a:t>Kepler</a:t>
+              <a:t>Fermi, Kepler, Maxwell, Pascal:  </a:t>
             </a:r>
             <a:r>
               <a:rPr lang="en-US" dirty="0" smtClean="0"/>
-              <a:t>:  Up to 1024 threads</a:t>
+              <a:t>Up to 1024 threads</a:t>
             </a:r>
           </a:p>
           <a:p>
@@ -10784,7 +11013,12 @@
             <p:ph type="body" idx="1"/>
           </p:nvPr>
         </p:nvSpPr>
-        <p:spPr/>
+        <p:spPr>
+          <a:xfrm>
+            <a:off x="457200" y="1981200"/>
+            <a:ext cx="8610600" cy="3886200"/>
+          </a:xfrm>
+        </p:spPr>
         <p:txBody>
           <a:bodyPr/>
           <a:lstStyle/>
@@ -10811,23 +11045,19 @@
           <a:p>
             <a:pPr lvl="2"/>
             <a:r>
+              <a:rPr lang="en-US" dirty="0"/>
+              <a:t>Fermi, Kepler, Maxwell, Pascal:  Up to 1024 threads</a:t>
+            </a:r>
+          </a:p>
+          <a:p>
+            <a:pPr lvl="1"/>
+            <a:r>
               <a:rPr lang="en-US" dirty="0" smtClean="0"/>
-              <a:t>Fermi and </a:t>
-            </a:r>
-            <a:r>
-              <a:rPr lang="en-US" dirty="0" err="1" smtClean="0"/>
-              <a:t>Kepler</a:t>
+              <a:t>Reside </a:t>
             </a:r>
             <a:r>
               <a:rPr lang="en-US" dirty="0" smtClean="0"/>
-              <a:t>:  Up to 1024 threads</a:t>
-            </a:r>
-          </a:p>
-          <a:p>
-            <a:pPr lvl="1"/>
-            <a:r>
-              <a:rPr lang="en-US" dirty="0" smtClean="0"/>
-              <a:t>Reside on same processor core</a:t>
+              <a:t>on same processor core</a:t>
             </a:r>
           </a:p>
           <a:p>
@@ -10850,7 +11080,7 @@
         <p:spPr bwMode="auto">
           <a:xfrm>
             <a:off x="0" y="6553200"/>
-            <a:ext cx="9144000" cy="276225"/>
+            <a:ext cx="9144000" cy="246221"/>
           </a:xfrm>
           <a:prstGeom prst="rect">
             <a:avLst/>
@@ -10861,14 +11091,14 @@
           </a:ln>
           <a:extLst>
             <a:ext uri="{909E8E84-426E-40dd-AFC4-6F175D3DCCD1}">
-              <a14:hiddenFill xmlns:a14="http://schemas.microsoft.com/office/drawing/2010/main" xmlns="">
+              <a14:hiddenFill xmlns="" xmlns:a14="http://schemas.microsoft.com/office/drawing/2010/main">
                 <a:solidFill>
                   <a:srgbClr val="FFFFFF"/>
                 </a:solidFill>
               </a14:hiddenFill>
             </a:ext>
             <a:ext uri="{91240B29-F687-4f45-9708-019B960494DF}">
-              <a14:hiddenLine xmlns:a14="http://schemas.microsoft.com/office/drawing/2010/main" xmlns="" w="9525">
+              <a14:hiddenLine xmlns="" xmlns:a14="http://schemas.microsoft.com/office/drawing/2010/main" w="9525">
                 <a:solidFill>
                   <a:srgbClr val="000000"/>
                 </a:solidFill>
@@ -10984,7 +11214,7 @@
           <a:p>
             <a:pPr algn="r"/>
             <a:r>
-              <a:rPr lang="en-US" sz="1200"/>
+              <a:rPr lang="en-US" sz="1000" dirty="0"/>
               <a:t>Image from:  http://courses.engr.illinois.edu/ece498/al/textbook/Chapter2-CudaProgrammingModel.pdf </a:t>
             </a:r>
           </a:p>
@@ -11013,7 +11243,7 @@
         </p:blipFill>
         <p:spPr bwMode="auto">
           <a:xfrm>
-            <a:off x="6934200" y="3581400"/>
+            <a:off x="6934200" y="3943350"/>
             <a:ext cx="1733550" cy="2533650"/>
           </a:xfrm>
           <a:prstGeom prst="rect">
@@ -11025,14 +11255,14 @@
           </a:ln>
           <a:extLst>
             <a:ext uri="{909E8E84-426E-40dd-AFC4-6F175D3DCCD1}">
-              <a14:hiddenFill xmlns:a14="http://schemas.microsoft.com/office/drawing/2010/main" xmlns="">
+              <a14:hiddenFill xmlns="" xmlns:a14="http://schemas.microsoft.com/office/drawing/2010/main">
                 <a:solidFill>
                   <a:srgbClr val="FFFFFF"/>
                 </a:solidFill>
               </a14:hiddenFill>
             </a:ext>
             <a:ext uri="{91240B29-F687-4f45-9708-019B960494DF}">
-              <a14:hiddenLine xmlns:a14="http://schemas.microsoft.com/office/drawing/2010/main" xmlns="" w="9525">
+              <a14:hiddenLine xmlns="" xmlns:a14="http://schemas.microsoft.com/office/drawing/2010/main" w="9525">
                 <a:solidFill>
                   <a:srgbClr val="000000"/>
                 </a:solidFill>
@@ -11313,14 +11543,14 @@
             </a:ln>
             <a:extLst>
               <a:ext uri="{909E8E84-426E-40dd-AFC4-6F175D3DCCD1}">
-                <a14:hiddenFill xmlns:a14="http://schemas.microsoft.com/office/drawing/2010/main" xmlns="">
+                <a14:hiddenFill xmlns="" xmlns:a14="http://schemas.microsoft.com/office/drawing/2010/main">
                   <a:solidFill>
                     <a:srgbClr val="FFFFFF"/>
                   </a:solidFill>
                 </a14:hiddenFill>
               </a:ext>
               <a:ext uri="{91240B29-F687-4f45-9708-019B960494DF}">
-                <a14:hiddenLine xmlns:a14="http://schemas.microsoft.com/office/drawing/2010/main" xmlns="" w="9525">
+                <a14:hiddenLine xmlns="" xmlns:a14="http://schemas.microsoft.com/office/drawing/2010/main" w="9525">
                   <a:solidFill>
                     <a:srgbClr val="000000"/>
                   </a:solidFill>
@@ -11367,14 +11597,14 @@
             </a:ln>
             <a:extLst>
               <a:ext uri="{909E8E84-426E-40dd-AFC4-6F175D3DCCD1}">
-                <a14:hiddenFill xmlns:a14="http://schemas.microsoft.com/office/drawing/2010/main" xmlns="">
+                <a14:hiddenFill xmlns="" xmlns:a14="http://schemas.microsoft.com/office/drawing/2010/main">
                   <a:solidFill>
                     <a:srgbClr val="FFFFFF"/>
                   </a:solidFill>
                 </a14:hiddenFill>
               </a:ext>
               <a:ext uri="{91240B29-F687-4f45-9708-019B960494DF}">
-                <a14:hiddenLine xmlns:a14="http://schemas.microsoft.com/office/drawing/2010/main" xmlns="" w="9525">
+                <a14:hiddenLine xmlns="" xmlns:a14="http://schemas.microsoft.com/office/drawing/2010/main" w="9525">
                   <a:solidFill>
                     <a:srgbClr val="000000"/>
                   </a:solidFill>
@@ -11397,10 +11627,10 @@
         </p:nvGrpSpPr>
         <p:grpSpPr bwMode="auto">
           <a:xfrm>
-            <a:off x="412750" y="5292725"/>
-            <a:ext cx="3168650" cy="1290638"/>
-            <a:chOff x="-76" y="2208"/>
-            <a:chExt cx="1996" cy="813"/>
+            <a:off x="869951" y="5292725"/>
+            <a:ext cx="2711451" cy="1284288"/>
+            <a:chOff x="212" y="2208"/>
+            <a:chExt cx="1708" cy="809"/>
           </a:xfrm>
         </p:grpSpPr>
         <p:sp>
@@ -11413,8 +11643,8 @@
           </p:nvSpPr>
           <p:spPr bwMode="auto">
             <a:xfrm>
-              <a:off x="-76" y="2784"/>
-              <a:ext cx="1194" cy="237"/>
+              <a:off x="212" y="2784"/>
+              <a:ext cx="617" cy="233"/>
             </a:xfrm>
             <a:prstGeom prst="rect">
               <a:avLst/>
@@ -11430,7 +11660,7 @@
             </a:ln>
             <a:extLst>
               <a:ext uri="{909E8E84-426E-40dd-AFC4-6F175D3DCCD1}">
-                <a14:hiddenFill xmlns:a14="http://schemas.microsoft.com/office/drawing/2010/main" xmlns="">
+                <a14:hiddenFill xmlns="" xmlns:a14="http://schemas.microsoft.com/office/drawing/2010/main">
                   <a:solidFill>
                     <a:srgbClr val="FFFFFF"/>
                   </a:solidFill>
@@ -11543,13 +11773,26 @@
             <a:p>
               <a:pPr algn="ctr"/>
               <a:r>
-                <a:rPr lang="en-US">
+                <a:rPr lang="en-US" dirty="0">
                   <a:solidFill>
                     <a:srgbClr val="FF0000"/>
                   </a:solidFill>
                 </a:rPr>
-                <a:t>2D Thread Block</a:t>
+                <a:t>2D </a:t>
               </a:r>
+              <a:r>
+                <a:rPr lang="en-US" dirty="0" smtClean="0">
+                  <a:solidFill>
+                    <a:srgbClr val="FF0000"/>
+                  </a:solidFill>
+                </a:rPr>
+                <a:t>Grid</a:t>
+              </a:r>
+              <a:endParaRPr lang="en-US" dirty="0">
+                <a:solidFill>
+                  <a:srgbClr val="FF0000"/>
+                </a:solidFill>
+              </a:endParaRPr>
             </a:p>
           </p:txBody>
         </p:sp>
@@ -11580,7 +11823,7 @@
             </a:ln>
             <a:extLst>
               <a:ext uri="{909E8E84-426E-40dd-AFC4-6F175D3DCCD1}">
-                <a14:hiddenFill xmlns:a14="http://schemas.microsoft.com/office/drawing/2010/main" xmlns="">
+                <a14:hiddenFill xmlns="" xmlns:a14="http://schemas.microsoft.com/office/drawing/2010/main">
                   <a:solidFill>
                     <a:srgbClr val="FFFFFF"/>
                   </a:solidFill>
@@ -11613,7 +11856,7 @@
           <p:spPr bwMode="auto">
             <a:xfrm flipH="1">
               <a:off x="521" y="2352"/>
-              <a:ext cx="583" cy="432"/>
+              <a:ext cx="584" cy="432"/>
             </a:xfrm>
             <a:prstGeom prst="straightConnector1">
               <a:avLst/>
@@ -11629,7 +11872,7 @@
             </a:ln>
             <a:extLst>
               <a:ext uri="{909E8E84-426E-40dd-AFC4-6F175D3DCCD1}">
-                <a14:hiddenFill xmlns:a14="http://schemas.microsoft.com/office/drawing/2010/main" xmlns="">
+                <a14:hiddenFill xmlns="" xmlns:a14="http://schemas.microsoft.com/office/drawing/2010/main">
                   <a:noFill/>
                 </a14:hiddenFill>
               </a:ext>
@@ -11680,7 +11923,7 @@
             </a:ln>
             <a:extLst>
               <a:ext uri="{909E8E84-426E-40dd-AFC4-6F175D3DCCD1}">
-                <a14:hiddenFill xmlns:a14="http://schemas.microsoft.com/office/drawing/2010/main" xmlns="">
+                <a14:hiddenFill xmlns="" xmlns:a14="http://schemas.microsoft.com/office/drawing/2010/main">
                   <a:solidFill>
                     <a:srgbClr val="FFFFFF"/>
                   </a:solidFill>
@@ -11841,7 +12084,7 @@
             </a:ln>
             <a:extLst>
               <a:ext uri="{909E8E84-426E-40dd-AFC4-6F175D3DCCD1}">
-                <a14:hiddenFill xmlns:a14="http://schemas.microsoft.com/office/drawing/2010/main" xmlns="">
+                <a14:hiddenFill xmlns="" xmlns:a14="http://schemas.microsoft.com/office/drawing/2010/main">
                   <a:solidFill>
                     <a:srgbClr val="FFFFFF"/>
                   </a:solidFill>
@@ -11891,7 +12134,255 @@
             </a:ln>
             <a:extLst>
               <a:ext uri="{909E8E84-426E-40dd-AFC4-6F175D3DCCD1}">
-                <a14:hiddenFill xmlns:a14="http://schemas.microsoft.com/office/drawing/2010/main" xmlns="">
+                <a14:hiddenFill xmlns="" xmlns:a14="http://schemas.microsoft.com/office/drawing/2010/main">
+                  <a:noFill/>
+                </a14:hiddenFill>
+              </a:ext>
+            </a:extLst>
+          </p:spPr>
+        </p:cxnSp>
+      </p:grpSp>
+      <p:grpSp>
+        <p:nvGrpSpPr>
+          <p:cNvPr id="8" name="Group 7"/>
+          <p:cNvGrpSpPr/>
+          <p:nvPr/>
+        </p:nvGrpSpPr>
+        <p:grpSpPr>
+          <a:xfrm>
+            <a:off x="3657600" y="5247482"/>
+            <a:ext cx="2971800" cy="1335881"/>
+            <a:chOff x="3657600" y="5247482"/>
+            <a:chExt cx="2971800" cy="1335881"/>
+          </a:xfrm>
+        </p:grpSpPr>
+        <p:sp>
+          <p:nvSpPr>
+            <p:cNvPr id="15" name="Text Box 5"/>
+            <p:cNvSpPr txBox="1">
+              <a:spLocks noChangeArrowheads="1"/>
+            </p:cNvSpPr>
+            <p:nvPr/>
+          </p:nvSpPr>
+          <p:spPr bwMode="auto">
+            <a:xfrm>
+              <a:off x="4733925" y="6207125"/>
+              <a:ext cx="1895475" cy="376238"/>
+            </a:xfrm>
+            <a:prstGeom prst="rect">
+              <a:avLst/>
+            </a:prstGeom>
+            <a:noFill/>
+            <a:ln w="9525">
+              <a:solidFill>
+                <a:srgbClr val="FF0000"/>
+              </a:solidFill>
+              <a:miter lim="800000"/>
+              <a:headEnd/>
+              <a:tailEnd/>
+            </a:ln>
+            <a:extLst>
+              <a:ext uri="{909E8E84-426E-40dd-AFC4-6F175D3DCCD1}">
+                <a14:hiddenFill xmlns="" xmlns:a14="http://schemas.microsoft.com/office/drawing/2010/main">
+                  <a:solidFill>
+                    <a:srgbClr val="FFFFFF"/>
+                  </a:solidFill>
+                </a14:hiddenFill>
+              </a:ext>
+            </a:extLst>
+          </p:spPr>
+          <p:txBody>
+            <a:bodyPr wrap="none">
+              <a:spAutoFit/>
+            </a:bodyPr>
+            <a:lstStyle>
+              <a:lvl1pPr>
+                <a:defRPr>
+                  <a:solidFill>
+                    <a:schemeClr val="tx1"/>
+                  </a:solidFill>
+                  <a:latin typeface="Arial" charset="0"/>
+                </a:defRPr>
+              </a:lvl1pPr>
+              <a:lvl2pPr marL="742950" indent="-285750">
+                <a:defRPr>
+                  <a:solidFill>
+                    <a:schemeClr val="tx1"/>
+                  </a:solidFill>
+                  <a:latin typeface="Arial" charset="0"/>
+                </a:defRPr>
+              </a:lvl2pPr>
+              <a:lvl3pPr marL="1143000" indent="-228600">
+                <a:defRPr>
+                  <a:solidFill>
+                    <a:schemeClr val="tx1"/>
+                  </a:solidFill>
+                  <a:latin typeface="Arial" charset="0"/>
+                </a:defRPr>
+              </a:lvl3pPr>
+              <a:lvl4pPr marL="1600200" indent="-228600">
+                <a:defRPr>
+                  <a:solidFill>
+                    <a:schemeClr val="tx1"/>
+                  </a:solidFill>
+                  <a:latin typeface="Arial" charset="0"/>
+                </a:defRPr>
+              </a:lvl4pPr>
+              <a:lvl5pPr marL="2057400" indent="-228600">
+                <a:defRPr>
+                  <a:solidFill>
+                    <a:schemeClr val="tx1"/>
+                  </a:solidFill>
+                  <a:latin typeface="Arial" charset="0"/>
+                </a:defRPr>
+              </a:lvl5pPr>
+              <a:lvl6pPr marL="2514600" indent="-228600" eaLnBrk="0" fontAlgn="base" hangingPunct="0">
+                <a:spcBef>
+                  <a:spcPct val="0"/>
+                </a:spcBef>
+                <a:spcAft>
+                  <a:spcPct val="0"/>
+                </a:spcAft>
+                <a:defRPr>
+                  <a:solidFill>
+                    <a:schemeClr val="tx1"/>
+                  </a:solidFill>
+                  <a:latin typeface="Arial" charset="0"/>
+                </a:defRPr>
+              </a:lvl6pPr>
+              <a:lvl7pPr marL="2971800" indent="-228600" eaLnBrk="0" fontAlgn="base" hangingPunct="0">
+                <a:spcBef>
+                  <a:spcPct val="0"/>
+                </a:spcBef>
+                <a:spcAft>
+                  <a:spcPct val="0"/>
+                </a:spcAft>
+                <a:defRPr>
+                  <a:solidFill>
+                    <a:schemeClr val="tx1"/>
+                  </a:solidFill>
+                  <a:latin typeface="Arial" charset="0"/>
+                </a:defRPr>
+              </a:lvl7pPr>
+              <a:lvl8pPr marL="3429000" indent="-228600" eaLnBrk="0" fontAlgn="base" hangingPunct="0">
+                <a:spcBef>
+                  <a:spcPct val="0"/>
+                </a:spcBef>
+                <a:spcAft>
+                  <a:spcPct val="0"/>
+                </a:spcAft>
+                <a:defRPr>
+                  <a:solidFill>
+                    <a:schemeClr val="tx1"/>
+                  </a:solidFill>
+                  <a:latin typeface="Arial" charset="0"/>
+                </a:defRPr>
+              </a:lvl8pPr>
+              <a:lvl9pPr marL="3886200" indent="-228600" eaLnBrk="0" fontAlgn="base" hangingPunct="0">
+                <a:spcBef>
+                  <a:spcPct val="0"/>
+                </a:spcBef>
+                <a:spcAft>
+                  <a:spcPct val="0"/>
+                </a:spcAft>
+                <a:defRPr>
+                  <a:solidFill>
+                    <a:schemeClr val="tx1"/>
+                  </a:solidFill>
+                  <a:latin typeface="Arial" charset="0"/>
+                </a:defRPr>
+              </a:lvl9pPr>
+            </a:lstStyle>
+            <a:p>
+              <a:pPr algn="ctr"/>
+              <a:r>
+                <a:rPr lang="en-US" dirty="0">
+                  <a:solidFill>
+                    <a:srgbClr val="FF0000"/>
+                  </a:solidFill>
+                </a:rPr>
+                <a:t>2D Thread Block</a:t>
+              </a:r>
+            </a:p>
+          </p:txBody>
+        </p:sp>
+        <p:sp>
+          <p:nvSpPr>
+            <p:cNvPr id="16" name="Oval 6"/>
+            <p:cNvSpPr>
+              <a:spLocks noChangeArrowheads="1"/>
+            </p:cNvSpPr>
+            <p:nvPr/>
+          </p:nvSpPr>
+          <p:spPr bwMode="auto">
+            <a:xfrm>
+              <a:off x="3657600" y="5247482"/>
+              <a:ext cx="1524000" cy="457200"/>
+            </a:xfrm>
+            <a:prstGeom prst="ellipse">
+              <a:avLst/>
+            </a:prstGeom>
+            <a:noFill/>
+            <a:ln w="9525">
+              <a:solidFill>
+                <a:srgbClr val="FF0000"/>
+              </a:solidFill>
+              <a:round/>
+              <a:headEnd/>
+              <a:tailEnd/>
+            </a:ln>
+            <a:extLst>
+              <a:ext uri="{909E8E84-426E-40dd-AFC4-6F175D3DCCD1}">
+                <a14:hiddenFill xmlns="" xmlns:a14="http://schemas.microsoft.com/office/drawing/2010/main">
+                  <a:solidFill>
+                    <a:srgbClr val="FFFFFF"/>
+                  </a:solidFill>
+                </a14:hiddenFill>
+              </a:ext>
+            </a:extLst>
+          </p:spPr>
+          <p:txBody>
+            <a:bodyPr wrap="none" anchor="ctr"/>
+            <a:lstStyle/>
+            <a:p>
+              <a:endParaRPr lang="en-US">
+                <a:solidFill>
+                  <a:srgbClr val="FF0000"/>
+                </a:solidFill>
+              </a:endParaRPr>
+            </a:p>
+          </p:txBody>
+        </p:sp>
+        <p:cxnSp>
+          <p:nvCxnSpPr>
+            <p:cNvPr id="17" name="AutoShape 7"/>
+            <p:cNvCxnSpPr>
+              <a:cxnSpLocks noChangeShapeType="1"/>
+              <a:stCxn id="16" idx="6"/>
+              <a:endCxn id="15" idx="0"/>
+            </p:cNvCxnSpPr>
+            <p:nvPr/>
+          </p:nvCxnSpPr>
+          <p:spPr bwMode="auto">
+            <a:xfrm>
+              <a:off x="5181600" y="5476082"/>
+              <a:ext cx="500063" cy="731043"/>
+            </a:xfrm>
+            <a:prstGeom prst="straightConnector1">
+              <a:avLst/>
+            </a:prstGeom>
+            <a:noFill/>
+            <a:ln w="9525">
+              <a:solidFill>
+                <a:srgbClr val="FF0000"/>
+              </a:solidFill>
+              <a:round/>
+              <a:headEnd/>
+              <a:tailEnd type="triangle" w="med" len="med"/>
+            </a:ln>
+            <a:extLst>
+              <a:ext uri="{909E8E84-426E-40dd-AFC4-6F175D3DCCD1}">
+                <a14:hiddenFill xmlns="" xmlns:a14="http://schemas.microsoft.com/office/drawing/2010/main">
                   <a:noFill/>
                 </a14:hiddenFill>
               </a:ext>
@@ -11996,6 +12487,33 @@
                                   </p:childTnLst>
                                 </p:cTn>
                               </p:par>
+                              <p:par>
+                                <p:cTn id="11" presetID="1" presetClass="entr" presetSubtype="0" fill="hold" nodeType="withEffect">
+                                  <p:stCondLst>
+                                    <p:cond delay="0"/>
+                                  </p:stCondLst>
+                                  <p:childTnLst>
+                                    <p:set>
+                                      <p:cBhvr>
+                                        <p:cTn id="12" dur="1" fill="hold">
+                                          <p:stCondLst>
+                                            <p:cond delay="0"/>
+                                          </p:stCondLst>
+                                        </p:cTn>
+                                        <p:tgtEl>
+                                          <p:spTgt spid="8"/>
+                                        </p:tgtEl>
+                                        <p:attrNameLst>
+                                          <p:attrName>style.visibility</p:attrName>
+                                        </p:attrNameLst>
+                                      </p:cBhvr>
+                                      <p:to>
+                                        <p:strVal val="visible"/>
+                                      </p:to>
+                                    </p:set>
+                                  </p:childTnLst>
+                                </p:cTn>
+                              </p:par>
                             </p:childTnLst>
                           </p:cTn>
                         </p:par>
@@ -12185,14 +12703,14 @@
           </a:ln>
           <a:extLst>
             <a:ext uri="{909E8E84-426E-40dd-AFC4-6F175D3DCCD1}">
-              <a14:hiddenFill xmlns:a14="http://schemas.microsoft.com/office/drawing/2010/main" xmlns="">
+              <a14:hiddenFill xmlns="" xmlns:a14="http://schemas.microsoft.com/office/drawing/2010/main">
                 <a:solidFill>
                   <a:srgbClr val="FFFFFF"/>
                 </a:solidFill>
               </a14:hiddenFill>
             </a:ext>
             <a:ext uri="{91240B29-F687-4f45-9708-019B960494DF}">
-              <a14:hiddenLine xmlns:a14="http://schemas.microsoft.com/office/drawing/2010/main" xmlns="" w="9525">
+              <a14:hiddenLine xmlns="" xmlns:a14="http://schemas.microsoft.com/office/drawing/2010/main" w="9525">
                 <a:solidFill>
                   <a:srgbClr val="000000"/>
                 </a:solidFill>
@@ -12226,14 +12744,14 @@
           </a:ln>
           <a:extLst>
             <a:ext uri="{909E8E84-426E-40dd-AFC4-6F175D3DCCD1}">
-              <a14:hiddenFill xmlns:a14="http://schemas.microsoft.com/office/drawing/2010/main" xmlns="">
+              <a14:hiddenFill xmlns="" xmlns:a14="http://schemas.microsoft.com/office/drawing/2010/main">
                 <a:solidFill>
                   <a:srgbClr val="FFFFFF"/>
                 </a:solidFill>
               </a14:hiddenFill>
             </a:ext>
             <a:ext uri="{91240B29-F687-4f45-9708-019B960494DF}">
-              <a14:hiddenLine xmlns:a14="http://schemas.microsoft.com/office/drawing/2010/main" xmlns="" w="9525">
+              <a14:hiddenLine xmlns="" xmlns:a14="http://schemas.microsoft.com/office/drawing/2010/main" w="9525">
                 <a:solidFill>
                   <a:srgbClr val="000000"/>
                 </a:solidFill>
@@ -12455,14 +12973,14 @@
           </a:ln>
           <a:extLst>
             <a:ext uri="{909E8E84-426E-40dd-AFC4-6F175D3DCCD1}">
-              <a14:hiddenFill xmlns:a14="http://schemas.microsoft.com/office/drawing/2010/main" xmlns="">
+              <a14:hiddenFill xmlns="" xmlns:a14="http://schemas.microsoft.com/office/drawing/2010/main">
                 <a:solidFill>
                   <a:srgbClr val="FFFFFF"/>
                 </a:solidFill>
               </a14:hiddenFill>
             </a:ext>
             <a:ext uri="{91240B29-F687-4f45-9708-019B960494DF}">
-              <a14:hiddenLine xmlns:a14="http://schemas.microsoft.com/office/drawing/2010/main" xmlns="" w="9525">
+              <a14:hiddenLine xmlns="" xmlns:a14="http://schemas.microsoft.com/office/drawing/2010/main" w="9525">
                 <a:solidFill>
                   <a:srgbClr val="000000"/>
                 </a:solidFill>
@@ -12496,14 +13014,14 @@
           </a:ln>
           <a:extLst>
             <a:ext uri="{909E8E84-426E-40dd-AFC4-6F175D3DCCD1}">
-              <a14:hiddenFill xmlns:a14="http://schemas.microsoft.com/office/drawing/2010/main" xmlns="">
+              <a14:hiddenFill xmlns="" xmlns:a14="http://schemas.microsoft.com/office/drawing/2010/main">
                 <a:solidFill>
                   <a:srgbClr val="FFFFFF"/>
                 </a:solidFill>
               </a14:hiddenFill>
             </a:ext>
             <a:ext uri="{91240B29-F687-4f45-9708-019B960494DF}">
-              <a14:hiddenLine xmlns:a14="http://schemas.microsoft.com/office/drawing/2010/main" xmlns="" w="9525">
+              <a14:hiddenLine xmlns="" xmlns:a14="http://schemas.microsoft.com/office/drawing/2010/main" w="9525">
                 <a:solidFill>
                   <a:srgbClr val="000000"/>
                 </a:solidFill>
@@ -12809,14 +13327,14 @@
           </a:ln>
           <a:extLst>
             <a:ext uri="{909E8E84-426E-40dd-AFC4-6F175D3DCCD1}">
-              <a14:hiddenFill xmlns:a14="http://schemas.microsoft.com/office/drawing/2010/main" xmlns="">
+              <a14:hiddenFill xmlns="" xmlns:a14="http://schemas.microsoft.com/office/drawing/2010/main">
                 <a:solidFill>
                   <a:srgbClr val="FFFFFF"/>
                 </a:solidFill>
               </a14:hiddenFill>
             </a:ext>
             <a:ext uri="{91240B29-F687-4f45-9708-019B960494DF}">
-              <a14:hiddenLine xmlns:a14="http://schemas.microsoft.com/office/drawing/2010/main" xmlns="" w="9525">
+              <a14:hiddenLine xmlns="" xmlns:a14="http://schemas.microsoft.com/office/drawing/2010/main" w="9525">
                 <a:solidFill>
                   <a:srgbClr val="000000"/>
                 </a:solidFill>
@@ -12973,14 +13491,14 @@
           </a:ln>
           <a:extLst>
             <a:ext uri="{909E8E84-426E-40dd-AFC4-6F175D3DCCD1}">
-              <a14:hiddenFill xmlns:a14="http://schemas.microsoft.com/office/drawing/2010/main" xmlns="">
+              <a14:hiddenFill xmlns="" xmlns:a14="http://schemas.microsoft.com/office/drawing/2010/main">
                 <a:solidFill>
                   <a:srgbClr val="FFFFFF"/>
                 </a:solidFill>
               </a14:hiddenFill>
             </a:ext>
             <a:ext uri="{91240B29-F687-4f45-9708-019B960494DF}">
-              <a14:hiddenLine xmlns:a14="http://schemas.microsoft.com/office/drawing/2010/main" xmlns="" w="9525">
+              <a14:hiddenLine xmlns="" xmlns:a14="http://schemas.microsoft.com/office/drawing/2010/main" w="9525">
                 <a:solidFill>
                   <a:srgbClr val="000000"/>
                 </a:solidFill>
@@ -13120,14 +13638,14 @@
           </a:ln>
           <a:extLst>
             <a:ext uri="{909E8E84-426E-40dd-AFC4-6F175D3DCCD1}">
-              <a14:hiddenFill xmlns:a14="http://schemas.microsoft.com/office/drawing/2010/main" xmlns="">
+              <a14:hiddenFill xmlns="" xmlns:a14="http://schemas.microsoft.com/office/drawing/2010/main">
                 <a:solidFill>
                   <a:srgbClr val="FFFFFF"/>
                 </a:solidFill>
               </a14:hiddenFill>
             </a:ext>
             <a:ext uri="{91240B29-F687-4f45-9708-019B960494DF}">
-              <a14:hiddenLine xmlns:a14="http://schemas.microsoft.com/office/drawing/2010/main" xmlns="" w="9525">
+              <a14:hiddenLine xmlns="" xmlns:a14="http://schemas.microsoft.com/office/drawing/2010/main" w="9525">
                 <a:solidFill>
                   <a:srgbClr val="000000"/>
                 </a:solidFill>
@@ -13284,14 +13802,14 @@
           </a:ln>
           <a:extLst>
             <a:ext uri="{909E8E84-426E-40dd-AFC4-6F175D3DCCD1}">
-              <a14:hiddenFill xmlns:a14="http://schemas.microsoft.com/office/drawing/2010/main" xmlns="">
+              <a14:hiddenFill xmlns="" xmlns:a14="http://schemas.microsoft.com/office/drawing/2010/main">
                 <a:solidFill>
                   <a:srgbClr val="FFFFFF"/>
                 </a:solidFill>
               </a14:hiddenFill>
             </a:ext>
             <a:ext uri="{91240B29-F687-4f45-9708-019B960494DF}">
-              <a14:hiddenLine xmlns:a14="http://schemas.microsoft.com/office/drawing/2010/main" xmlns="" w="9525">
+              <a14:hiddenLine xmlns="" xmlns:a14="http://schemas.microsoft.com/office/drawing/2010/main" w="9525">
                 <a:solidFill>
                   <a:srgbClr val="000000"/>
                 </a:solidFill>
@@ -13330,7 +13848,7 @@
           </a:ln>
           <a:extLst>
             <a:ext uri="{909E8E84-426E-40dd-AFC4-6F175D3DCCD1}">
-              <a14:hiddenFill xmlns:a14="http://schemas.microsoft.com/office/drawing/2010/main" xmlns="">
+              <a14:hiddenFill xmlns="" xmlns:a14="http://schemas.microsoft.com/office/drawing/2010/main">
                 <a:solidFill>
                   <a:srgbClr val="FFFFFF"/>
                 </a:solidFill>
@@ -13551,14 +14069,14 @@
           </a:ln>
           <a:extLst>
             <a:ext uri="{909E8E84-426E-40dd-AFC4-6F175D3DCCD1}">
-              <a14:hiddenFill xmlns:a14="http://schemas.microsoft.com/office/drawing/2010/main" xmlns="">
+              <a14:hiddenFill xmlns="" xmlns:a14="http://schemas.microsoft.com/office/drawing/2010/main">
                 <a:solidFill>
                   <a:srgbClr val="FFFFFF"/>
                 </a:solidFill>
               </a14:hiddenFill>
             </a:ext>
             <a:ext uri="{91240B29-F687-4f45-9708-019B960494DF}">
-              <a14:hiddenLine xmlns:a14="http://schemas.microsoft.com/office/drawing/2010/main" xmlns="" w="9525">
+              <a14:hiddenLine xmlns="" xmlns:a14="http://schemas.microsoft.com/office/drawing/2010/main" w="9525">
                 <a:solidFill>
                   <a:srgbClr val="000000"/>
                 </a:solidFill>
@@ -13715,14 +14233,14 @@
           </a:ln>
           <a:extLst>
             <a:ext uri="{909E8E84-426E-40dd-AFC4-6F175D3DCCD1}">
-              <a14:hiddenFill xmlns:a14="http://schemas.microsoft.com/office/drawing/2010/main" xmlns="">
+              <a14:hiddenFill xmlns="" xmlns:a14="http://schemas.microsoft.com/office/drawing/2010/main">
                 <a:solidFill>
                   <a:srgbClr val="FFFFFF"/>
                 </a:solidFill>
               </a14:hiddenFill>
             </a:ext>
             <a:ext uri="{91240B29-F687-4f45-9708-019B960494DF}">
-              <a14:hiddenLine xmlns:a14="http://schemas.microsoft.com/office/drawing/2010/main" xmlns="" w="9525">
+              <a14:hiddenLine xmlns="" xmlns:a14="http://schemas.microsoft.com/office/drawing/2010/main" w="9525">
                 <a:solidFill>
                   <a:srgbClr val="000000"/>
                 </a:solidFill>
@@ -13761,7 +14279,7 @@
           </a:ln>
           <a:extLst>
             <a:ext uri="{909E8E84-426E-40dd-AFC4-6F175D3DCCD1}">
-              <a14:hiddenFill xmlns:a14="http://schemas.microsoft.com/office/drawing/2010/main" xmlns="">
+              <a14:hiddenFill xmlns="" xmlns:a14="http://schemas.microsoft.com/office/drawing/2010/main">
                 <a:solidFill>
                   <a:srgbClr val="FFFFFF"/>
                 </a:solidFill>
@@ -13853,14 +14371,14 @@
           </a:ln>
           <a:extLst>
             <a:ext uri="{909E8E84-426E-40dd-AFC4-6F175D3DCCD1}">
-              <a14:hiddenFill xmlns:a14="http://schemas.microsoft.com/office/drawing/2010/main" xmlns="">
+              <a14:hiddenFill xmlns="" xmlns:a14="http://schemas.microsoft.com/office/drawing/2010/main">
                 <a:solidFill>
                   <a:srgbClr val="FFFFFF"/>
                 </a:solidFill>
               </a14:hiddenFill>
             </a:ext>
             <a:ext uri="{91240B29-F687-4f45-9708-019B960494DF}">
-              <a14:hiddenLine xmlns:a14="http://schemas.microsoft.com/office/drawing/2010/main" xmlns="" w="9525">
+              <a14:hiddenLine xmlns="" xmlns:a14="http://schemas.microsoft.com/office/drawing/2010/main" w="9525">
                 <a:solidFill>
                   <a:srgbClr val="000000"/>
                 </a:solidFill>
@@ -14017,14 +14535,14 @@
           </a:ln>
           <a:extLst>
             <a:ext uri="{909E8E84-426E-40dd-AFC4-6F175D3DCCD1}">
-              <a14:hiddenFill xmlns:a14="http://schemas.microsoft.com/office/drawing/2010/main" xmlns="">
+              <a14:hiddenFill xmlns="" xmlns:a14="http://schemas.microsoft.com/office/drawing/2010/main">
                 <a:solidFill>
                   <a:srgbClr val="FFFFFF"/>
                 </a:solidFill>
               </a14:hiddenFill>
             </a:ext>
             <a:ext uri="{91240B29-F687-4f45-9708-019B960494DF}">
-              <a14:hiddenLine xmlns:a14="http://schemas.microsoft.com/office/drawing/2010/main" xmlns="" w="9525">
+              <a14:hiddenLine xmlns="" xmlns:a14="http://schemas.microsoft.com/office/drawing/2010/main" w="9525">
                 <a:solidFill>
                   <a:srgbClr val="000000"/>
                 </a:solidFill>
@@ -14112,14 +14630,14 @@
           </a:ln>
           <a:extLst>
             <a:ext uri="{909E8E84-426E-40dd-AFC4-6F175D3DCCD1}">
-              <a14:hiddenFill xmlns:a14="http://schemas.microsoft.com/office/drawing/2010/main" xmlns="">
+              <a14:hiddenFill xmlns="" xmlns:a14="http://schemas.microsoft.com/office/drawing/2010/main">
                 <a:solidFill>
                   <a:srgbClr val="FFFFFF"/>
                 </a:solidFill>
               </a14:hiddenFill>
             </a:ext>
             <a:ext uri="{91240B29-F687-4f45-9708-019B960494DF}">
-              <a14:hiddenLine xmlns:a14="http://schemas.microsoft.com/office/drawing/2010/main" xmlns="" w="9525">
+              <a14:hiddenLine xmlns="" xmlns:a14="http://schemas.microsoft.com/office/drawing/2010/main" w="9525">
                 <a:solidFill>
                   <a:srgbClr val="000000"/>
                 </a:solidFill>
@@ -14276,14 +14794,14 @@
           </a:ln>
           <a:extLst>
             <a:ext uri="{909E8E84-426E-40dd-AFC4-6F175D3DCCD1}">
-              <a14:hiddenFill xmlns:a14="http://schemas.microsoft.com/office/drawing/2010/main" xmlns="">
+              <a14:hiddenFill xmlns="" xmlns:a14="http://schemas.microsoft.com/office/drawing/2010/main">
                 <a:solidFill>
                   <a:srgbClr val="FFFFFF"/>
                 </a:solidFill>
               </a14:hiddenFill>
             </a:ext>
             <a:ext uri="{91240B29-F687-4f45-9708-019B960494DF}">
-              <a14:hiddenLine xmlns:a14="http://schemas.microsoft.com/office/drawing/2010/main" xmlns="" w="9525">
+              <a14:hiddenLine xmlns="" xmlns:a14="http://schemas.microsoft.com/office/drawing/2010/main" w="9525">
                 <a:solidFill>
                   <a:srgbClr val="000000"/>
                 </a:solidFill>
@@ -14360,7 +14878,7 @@
           </a:ln>
           <a:extLst>
             <a:ext uri="{909E8E84-426E-40dd-AFC4-6F175D3DCCD1}">
-              <a14:hiddenFill xmlns:a14="http://schemas.microsoft.com/office/drawing/2010/main" xmlns="">
+              <a14:hiddenFill xmlns="" xmlns:a14="http://schemas.microsoft.com/office/drawing/2010/main">
                 <a:solidFill>
                   <a:srgbClr val="FFFFFF"/>
                 </a:solidFill>
@@ -14509,7 +15027,7 @@
           </a:ln>
           <a:extLst>
             <a:ext uri="{909E8E84-426E-40dd-AFC4-6F175D3DCCD1}">
-              <a14:hiddenFill xmlns:a14="http://schemas.microsoft.com/office/drawing/2010/main" xmlns="">
+              <a14:hiddenFill xmlns="" xmlns:a14="http://schemas.microsoft.com/office/drawing/2010/main">
                 <a:noFill/>
               </a14:hiddenFill>
             </a:ext>
@@ -14588,7 +15106,7 @@
           </a:ln>
           <a:extLst>
             <a:ext uri="{909E8E84-426E-40dd-AFC4-6F175D3DCCD1}">
-              <a14:hiddenFill xmlns:a14="http://schemas.microsoft.com/office/drawing/2010/main" xmlns="">
+              <a14:hiddenFill xmlns="" xmlns:a14="http://schemas.microsoft.com/office/drawing/2010/main">
                 <a:solidFill>
                   <a:srgbClr val="FFFFFF"/>
                 </a:solidFill>
@@ -14737,7 +15255,7 @@
           </a:ln>
           <a:extLst>
             <a:ext uri="{909E8E84-426E-40dd-AFC4-6F175D3DCCD1}">
-              <a14:hiddenFill xmlns:a14="http://schemas.microsoft.com/office/drawing/2010/main" xmlns="">
+              <a14:hiddenFill xmlns="" xmlns:a14="http://schemas.microsoft.com/office/drawing/2010/main">
                 <a:noFill/>
               </a14:hiddenFill>
             </a:ext>
@@ -15611,7 +16129,7 @@
           </a:ln>
           <a:extLst>
             <a:ext uri="{909E8E84-426E-40dd-AFC4-6F175D3DCCD1}">
-              <a14:hiddenFill xmlns:a14="http://schemas.microsoft.com/office/drawing/2010/main" xmlns="">
+              <a14:hiddenFill xmlns="" xmlns:a14="http://schemas.microsoft.com/office/drawing/2010/main">
                 <a:noFill/>
               </a14:hiddenFill>
             </a:ext>
@@ -16080,7 +16598,7 @@
           </a:ln>
           <a:extLst>
             <a:ext uri="{909E8E84-426E-40dd-AFC4-6F175D3DCCD1}">
-              <a14:hiddenFill xmlns:a14="http://schemas.microsoft.com/office/drawing/2010/main" xmlns="">
+              <a14:hiddenFill xmlns="" xmlns:a14="http://schemas.microsoft.com/office/drawing/2010/main">
                 <a:noFill/>
               </a14:hiddenFill>
             </a:ext>
@@ -16549,7 +17067,7 @@
           </a:ln>
           <a:extLst>
             <a:ext uri="{909E8E84-426E-40dd-AFC4-6F175D3DCCD1}">
-              <a14:hiddenFill xmlns:a14="http://schemas.microsoft.com/office/drawing/2010/main" xmlns="">
+              <a14:hiddenFill xmlns="" xmlns:a14="http://schemas.microsoft.com/office/drawing/2010/main">
                 <a:noFill/>
               </a14:hiddenFill>
             </a:ext>
@@ -17021,7 +17539,7 @@
           </a:ln>
           <a:extLst>
             <a:ext uri="{909E8E84-426E-40dd-AFC4-6F175D3DCCD1}">
-              <a14:hiddenFill xmlns:a14="http://schemas.microsoft.com/office/drawing/2010/main" xmlns="">
+              <a14:hiddenFill xmlns="" xmlns:a14="http://schemas.microsoft.com/office/drawing/2010/main">
                 <a:noFill/>
               </a14:hiddenFill>
             </a:ext>
@@ -17076,9 +17594,14 @@
           <a:lstStyle/>
           <a:p>
             <a:r>
-              <a:rPr lang="en-US" smtClean="0"/>
-              <a:t>GPU Computing History</a:t>
-            </a:r>
+              <a:rPr lang="en-US" dirty="0" smtClean="0"/>
+              <a:t>GPU Computing </a:t>
+            </a:r>
+            <a:r>
+              <a:rPr lang="en-US" dirty="0" smtClean="0"/>
+              <a:t>History: APIs</a:t>
+            </a:r>
+            <a:endParaRPr lang="en-US" dirty="0" smtClean="0"/>
           </a:p>
         </p:txBody>
       </p:sp>
@@ -17103,18 +17626,22 @@
           <a:lstStyle/>
           <a:p>
             <a:r>
-              <a:rPr lang="en-US" sz="2800" dirty="0" smtClean="0"/>
-              <a:t>2001/2002 – researchers see GPU as data-parallel coprocessor</a:t>
+              <a:rPr lang="en-US" sz="2400" b="1" dirty="0" smtClean="0"/>
+              <a:t>2001/2002</a:t>
+            </a:r>
+            <a:r>
+              <a:rPr lang="en-US" sz="2400" dirty="0" smtClean="0"/>
+              <a:t> – researchers see GPU as data-parallel coprocessor</a:t>
             </a:r>
           </a:p>
           <a:p>
             <a:pPr lvl="1"/>
             <a:r>
-              <a:rPr lang="en-US" sz="2400" dirty="0" smtClean="0"/>
+              <a:rPr lang="en-US" sz="2000" dirty="0" smtClean="0"/>
               <a:t>The </a:t>
             </a:r>
             <a:r>
-              <a:rPr lang="en-US" sz="2400" i="1" dirty="0" smtClean="0">
+              <a:rPr lang="en-US" sz="2000" i="1" dirty="0" smtClean="0">
                 <a:solidFill>
                   <a:srgbClr val="FF0000"/>
                 </a:solidFill>
@@ -17122,20 +17649,24 @@
               <a:t>GPGPU</a:t>
             </a:r>
             <a:r>
+              <a:rPr lang="en-US" sz="2000" dirty="0" smtClean="0"/>
+              <a:t> field is born</a:t>
+            </a:r>
+          </a:p>
+          <a:p>
+            <a:r>
+              <a:rPr lang="en-US" sz="2400" b="1" dirty="0" smtClean="0"/>
+              <a:t>2007</a:t>
+            </a:r>
+            <a:r>
               <a:rPr lang="en-US" sz="2400" dirty="0" smtClean="0"/>
-              <a:t> field is born</a:t>
-            </a:r>
-          </a:p>
-          <a:p>
-            <a:r>
-              <a:rPr lang="en-US" sz="2800" dirty="0" smtClean="0"/>
-              <a:t>2007 – NVIDIA releases CUDA</a:t>
+              <a:t> – NVIDIA releases CUDA</a:t>
             </a:r>
           </a:p>
           <a:p>
             <a:pPr lvl="1"/>
             <a:r>
-              <a:rPr lang="en-US" sz="2400" i="1" dirty="0" smtClean="0">
+              <a:rPr lang="en-US" sz="2000" i="1" dirty="0" smtClean="0">
                 <a:solidFill>
                   <a:srgbClr val="FF0000"/>
                 </a:solidFill>
@@ -17143,18 +17674,18 @@
               <a:t>CUDA</a:t>
             </a:r>
             <a:r>
-              <a:rPr lang="en-US" sz="2400" dirty="0" smtClean="0"/>
+              <a:rPr lang="en-US" sz="2000" dirty="0" smtClean="0"/>
               <a:t> – Compute Uniform Device Architecture</a:t>
             </a:r>
           </a:p>
           <a:p>
             <a:pPr lvl="1"/>
             <a:r>
-              <a:rPr lang="en-US" sz="2400" dirty="0" smtClean="0"/>
+              <a:rPr lang="en-US" sz="2000" dirty="0" smtClean="0"/>
               <a:t>GPGPU shifts to </a:t>
             </a:r>
             <a:r>
-              <a:rPr lang="en-US" sz="2400" i="1" dirty="0" smtClean="0">
+              <a:rPr lang="en-US" sz="2000" i="1" dirty="0" smtClean="0">
                 <a:solidFill>
                   <a:srgbClr val="FF0000"/>
                 </a:solidFill>
@@ -17164,11 +17695,15 @@
           </a:p>
           <a:p>
             <a:r>
-              <a:rPr lang="en-US" sz="2800" dirty="0" smtClean="0"/>
-              <a:t>2008 – Khronos releases </a:t>
-            </a:r>
-            <a:r>
-              <a:rPr lang="en-US" sz="2800" i="1" dirty="0" smtClean="0">
+              <a:rPr lang="en-US" sz="2400" b="1" dirty="0" smtClean="0"/>
+              <a:t>2008</a:t>
+            </a:r>
+            <a:r>
+              <a:rPr lang="en-US" sz="2400" dirty="0" smtClean="0"/>
+              <a:t> – Khronos releases </a:t>
+            </a:r>
+            <a:r>
+              <a:rPr lang="en-US" sz="2400" i="1" dirty="0" smtClean="0">
                 <a:solidFill>
                   <a:srgbClr val="FF0000"/>
                 </a:solidFill>
@@ -17176,21 +17711,25 @@
               <a:t>OpenCL</a:t>
             </a:r>
             <a:r>
-              <a:rPr lang="en-US" sz="2800" dirty="0" smtClean="0"/>
+              <a:rPr lang="en-US" sz="2400" dirty="0" smtClean="0"/>
               <a:t> specification</a:t>
             </a:r>
           </a:p>
           <a:p>
             <a:r>
-              <a:rPr lang="en-US" sz="2800" dirty="0" smtClean="0"/>
-              <a:t>2013 </a:t>
-            </a:r>
-            <a:r>
-              <a:rPr lang="en-US" sz="2800" dirty="0"/>
+              <a:rPr lang="en-US" sz="2400" b="1" dirty="0" smtClean="0"/>
+              <a:t>2013</a:t>
+            </a:r>
+            <a:r>
+              <a:rPr lang="en-US" sz="2400" dirty="0" smtClean="0"/>
+              <a:t> </a:t>
+            </a:r>
+            <a:r>
+              <a:rPr lang="en-US" sz="2400" dirty="0"/>
               <a:t>– Khronos releases </a:t>
             </a:r>
             <a:r>
-              <a:rPr lang="en-US" sz="2800" i="1" dirty="0" smtClean="0">
+              <a:rPr lang="en-US" sz="2400" i="1" dirty="0" smtClean="0">
                 <a:solidFill>
                   <a:srgbClr val="FF0000"/>
                 </a:solidFill>
@@ -17198,33 +17737,33 @@
               <a:t>OpenGL</a:t>
             </a:r>
             <a:r>
-              <a:rPr lang="en-US" sz="2800" dirty="0" smtClean="0"/>
+              <a:rPr lang="en-US" sz="2400" dirty="0" smtClean="0"/>
               <a:t> compute shaders</a:t>
             </a:r>
           </a:p>
           <a:p>
             <a:r>
-              <a:rPr lang="en-US" sz="2800" dirty="0" smtClean="0"/>
-              <a:t>2015 </a:t>
-            </a:r>
-            <a:r>
-              <a:rPr lang="en-US" sz="2800" dirty="0" smtClean="0"/>
-              <a:t>- </a:t>
-            </a:r>
-            <a:r>
-              <a:rPr lang="en-US" sz="2800" dirty="0" err="1"/>
+              <a:rPr lang="en-US" sz="2400" b="1" dirty="0" smtClean="0"/>
+              <a:t>2015</a:t>
+            </a:r>
+            <a:r>
+              <a:rPr lang="en-US" sz="2400" dirty="0" smtClean="0"/>
+              <a:t> - </a:t>
+            </a:r>
+            <a:r>
+              <a:rPr lang="en-US" sz="2400" dirty="0" err="1"/>
               <a:t>Khronos</a:t>
             </a:r>
             <a:r>
-              <a:rPr lang="en-US" sz="2800" dirty="0"/>
+              <a:rPr lang="en-US" sz="2400" dirty="0"/>
               <a:t> </a:t>
             </a:r>
             <a:r>
-              <a:rPr lang="en-US" sz="2800" dirty="0" smtClean="0"/>
+              <a:rPr lang="en-US" sz="2400" dirty="0" smtClean="0"/>
               <a:t>releases </a:t>
             </a:r>
             <a:r>
-              <a:rPr lang="en-US" sz="2800" i="1" dirty="0" smtClean="0">
+              <a:rPr lang="en-US" sz="2400" i="1" dirty="0" smtClean="0">
                 <a:solidFill>
                   <a:srgbClr val="FF0000"/>
                 </a:solidFill>
@@ -17232,18 +17771,18 @@
               <a:t>Vulkan</a:t>
             </a:r>
             <a:r>
-              <a:rPr lang="en-US" sz="2800" dirty="0" smtClean="0"/>
+              <a:rPr lang="en-US" sz="2400" dirty="0" smtClean="0"/>
               <a:t> and </a:t>
             </a:r>
             <a:r>
-              <a:rPr lang="en-US" sz="2800" i="1" dirty="0" smtClean="0">
+              <a:rPr lang="en-US" sz="2400" i="1" dirty="0" smtClean="0">
                 <a:solidFill>
                   <a:srgbClr val="FF0000"/>
                 </a:solidFill>
               </a:rPr>
               <a:t>SPIR-V</a:t>
             </a:r>
-            <a:endParaRPr lang="en-US" sz="2800" i="1" dirty="0">
+            <a:endParaRPr lang="en-US" sz="2400" i="1" dirty="0">
               <a:solidFill>
                 <a:srgbClr val="FF0000"/>
               </a:solidFill>
@@ -17504,14 +18043,14 @@
           </a:ln>
           <a:extLst>
             <a:ext uri="{909E8E84-426E-40dd-AFC4-6F175D3DCCD1}">
-              <a14:hiddenFill xmlns:a14="http://schemas.microsoft.com/office/drawing/2010/main" xmlns="">
+              <a14:hiddenFill xmlns="" xmlns:a14="http://schemas.microsoft.com/office/drawing/2010/main">
                 <a:solidFill>
                   <a:srgbClr val="FFFFFF"/>
                 </a:solidFill>
               </a14:hiddenFill>
             </a:ext>
             <a:ext uri="{91240B29-F687-4f45-9708-019B960494DF}">
-              <a14:hiddenLine xmlns:a14="http://schemas.microsoft.com/office/drawing/2010/main" xmlns="" w="9525">
+              <a14:hiddenLine xmlns="" xmlns:a14="http://schemas.microsoft.com/office/drawing/2010/main" w="9525">
                 <a:solidFill>
                   <a:srgbClr val="000000"/>
                 </a:solidFill>
@@ -17567,14 +18106,14 @@
           </a:ln>
           <a:extLst>
             <a:ext uri="{909E8E84-426E-40dd-AFC4-6F175D3DCCD1}">
-              <a14:hiddenFill xmlns:a14="http://schemas.microsoft.com/office/drawing/2010/main" xmlns="">
+              <a14:hiddenFill xmlns="" xmlns:a14="http://schemas.microsoft.com/office/drawing/2010/main">
                 <a:solidFill>
                   <a:srgbClr val="FFFFFF"/>
                 </a:solidFill>
               </a14:hiddenFill>
             </a:ext>
             <a:ext uri="{91240B29-F687-4f45-9708-019B960494DF}">
-              <a14:hiddenLine xmlns:a14="http://schemas.microsoft.com/office/drawing/2010/main" xmlns="" w="9525">
+              <a14:hiddenLine xmlns="" xmlns:a14="http://schemas.microsoft.com/office/drawing/2010/main" w="9525">
                 <a:solidFill>
                   <a:srgbClr val="000000"/>
                 </a:solidFill>
@@ -18024,7 +18563,7 @@
           </a:ln>
           <a:extLst>
             <a:ext uri="{909E8E84-426E-40dd-AFC4-6F175D3DCCD1}">
-              <a14:hiddenFill xmlns:a14="http://schemas.microsoft.com/office/drawing/2010/main" xmlns="">
+              <a14:hiddenFill xmlns="" xmlns:a14="http://schemas.microsoft.com/office/drawing/2010/main">
                 <a:noFill/>
               </a14:hiddenFill>
             </a:ext>
@@ -18058,7 +18597,7 @@
           </a:ln>
           <a:extLst>
             <a:ext uri="{909E8E84-426E-40dd-AFC4-6F175D3DCCD1}">
-              <a14:hiddenFill xmlns:a14="http://schemas.microsoft.com/office/drawing/2010/main" xmlns="">
+              <a14:hiddenFill xmlns="" xmlns:a14="http://schemas.microsoft.com/office/drawing/2010/main">
                 <a:solidFill>
                   <a:srgbClr val="FFFFFF"/>
                 </a:solidFill>
@@ -18207,7 +18746,7 @@
           </a:ln>
           <a:extLst>
             <a:ext uri="{909E8E84-426E-40dd-AFC4-6F175D3DCCD1}">
-              <a14:hiddenFill xmlns:a14="http://schemas.microsoft.com/office/drawing/2010/main" xmlns="">
+              <a14:hiddenFill xmlns="" xmlns:a14="http://schemas.microsoft.com/office/drawing/2010/main">
                 <a:noFill/>
               </a14:hiddenFill>
             </a:ext>
@@ -18286,7 +18825,7 @@
           </a:ln>
           <a:extLst>
             <a:ext uri="{909E8E84-426E-40dd-AFC4-6F175D3DCCD1}">
-              <a14:hiddenFill xmlns:a14="http://schemas.microsoft.com/office/drawing/2010/main" xmlns="">
+              <a14:hiddenFill xmlns="" xmlns:a14="http://schemas.microsoft.com/office/drawing/2010/main">
                 <a:solidFill>
                   <a:srgbClr val="FFFFFF"/>
                 </a:solidFill>
@@ -18435,7 +18974,7 @@
           </a:ln>
           <a:extLst>
             <a:ext uri="{909E8E84-426E-40dd-AFC4-6F175D3DCCD1}">
-              <a14:hiddenFill xmlns:a14="http://schemas.microsoft.com/office/drawing/2010/main" xmlns="">
+              <a14:hiddenFill xmlns="" xmlns:a14="http://schemas.microsoft.com/office/drawing/2010/main">
                 <a:noFill/>
               </a14:hiddenFill>
             </a:ext>
@@ -18514,7 +19053,7 @@
           </a:ln>
           <a:extLst>
             <a:ext uri="{909E8E84-426E-40dd-AFC4-6F175D3DCCD1}">
-              <a14:hiddenFill xmlns:a14="http://schemas.microsoft.com/office/drawing/2010/main" xmlns="">
+              <a14:hiddenFill xmlns="" xmlns:a14="http://schemas.microsoft.com/office/drawing/2010/main">
                 <a:solidFill>
                   <a:srgbClr val="FFFFFF"/>
                 </a:solidFill>
@@ -18663,7 +19202,7 @@
           </a:ln>
           <a:extLst>
             <a:ext uri="{909E8E84-426E-40dd-AFC4-6F175D3DCCD1}">
-              <a14:hiddenFill xmlns:a14="http://schemas.microsoft.com/office/drawing/2010/main" xmlns="">
+              <a14:hiddenFill xmlns="" xmlns:a14="http://schemas.microsoft.com/office/drawing/2010/main">
                 <a:noFill/>
               </a14:hiddenFill>
             </a:ext>
@@ -18744,14 +19283,14 @@
           </a:ln>
           <a:extLst>
             <a:ext uri="{909E8E84-426E-40dd-AFC4-6F175D3DCCD1}">
-              <a14:hiddenFill xmlns:a14="http://schemas.microsoft.com/office/drawing/2010/main" xmlns="">
+              <a14:hiddenFill xmlns="" xmlns:a14="http://schemas.microsoft.com/office/drawing/2010/main">
                 <a:solidFill>
                   <a:srgbClr val="FFFFFF"/>
                 </a:solidFill>
               </a14:hiddenFill>
             </a:ext>
             <a:ext uri="{91240B29-F687-4f45-9708-019B960494DF}">
-              <a14:hiddenLine xmlns:a14="http://schemas.microsoft.com/office/drawing/2010/main" xmlns="" w="9525">
+              <a14:hiddenLine xmlns="" xmlns:a14="http://schemas.microsoft.com/office/drawing/2010/main" w="9525">
                 <a:solidFill>
                   <a:srgbClr val="000000"/>
                 </a:solidFill>
@@ -18807,14 +19346,14 @@
           </a:ln>
           <a:extLst>
             <a:ext uri="{909E8E84-426E-40dd-AFC4-6F175D3DCCD1}">
-              <a14:hiddenFill xmlns:a14="http://schemas.microsoft.com/office/drawing/2010/main" xmlns="">
+              <a14:hiddenFill xmlns="" xmlns:a14="http://schemas.microsoft.com/office/drawing/2010/main">
                 <a:solidFill>
                   <a:srgbClr val="FFFFFF"/>
                 </a:solidFill>
               </a14:hiddenFill>
             </a:ext>
             <a:ext uri="{91240B29-F687-4f45-9708-019B960494DF}">
-              <a14:hiddenLine xmlns:a14="http://schemas.microsoft.com/office/drawing/2010/main" xmlns="" w="9525">
+              <a14:hiddenLine xmlns="" xmlns:a14="http://schemas.microsoft.com/office/drawing/2010/main" w="9525">
                 <a:solidFill>
                   <a:srgbClr val="000000"/>
                 </a:solidFill>
@@ -19264,7 +19803,7 @@
           </a:ln>
           <a:extLst>
             <a:ext uri="{909E8E84-426E-40dd-AFC4-6F175D3DCCD1}">
-              <a14:hiddenFill xmlns:a14="http://schemas.microsoft.com/office/drawing/2010/main" xmlns="">
+              <a14:hiddenFill xmlns="" xmlns:a14="http://schemas.microsoft.com/office/drawing/2010/main">
                 <a:noFill/>
               </a14:hiddenFill>
             </a:ext>
@@ -19375,6 +19914,13 @@
   <p:clrMapOvr>
     <a:masterClrMapping/>
   </p:clrMapOvr>
+  <p:timing>
+    <p:tnLst>
+      <p:par>
+        <p:cTn id="1" dur="indefinite" restart="never" nodeType="tmRoot"/>
+      </p:par>
+    </p:tnLst>
+  </p:timing>
 </p:sld>
 </file>
 
@@ -19452,14 +19998,14 @@
           </a:ln>
           <a:extLst>
             <a:ext uri="{909E8E84-426E-40dd-AFC4-6F175D3DCCD1}">
-              <a14:hiddenFill xmlns:a14="http://schemas.microsoft.com/office/drawing/2010/main" xmlns="">
+              <a14:hiddenFill xmlns="" xmlns:a14="http://schemas.microsoft.com/office/drawing/2010/main">
                 <a:solidFill>
                   <a:srgbClr val="FFFFFF"/>
                 </a:solidFill>
               </a14:hiddenFill>
             </a:ext>
             <a:ext uri="{91240B29-F687-4f45-9708-019B960494DF}">
-              <a14:hiddenLine xmlns:a14="http://schemas.microsoft.com/office/drawing/2010/main" xmlns="" w="9525">
+              <a14:hiddenLine xmlns="" xmlns:a14="http://schemas.microsoft.com/office/drawing/2010/main" w="9525">
                 <a:solidFill>
                   <a:srgbClr val="000000"/>
                 </a:solidFill>
@@ -19493,14 +20039,14 @@
           </a:ln>
           <a:extLst>
             <a:ext uri="{909E8E84-426E-40dd-AFC4-6F175D3DCCD1}">
-              <a14:hiddenFill xmlns:a14="http://schemas.microsoft.com/office/drawing/2010/main" xmlns="">
+              <a14:hiddenFill xmlns="" xmlns:a14="http://schemas.microsoft.com/office/drawing/2010/main">
                 <a:solidFill>
                   <a:srgbClr val="FFFFFF"/>
                 </a:solidFill>
               </a14:hiddenFill>
             </a:ext>
             <a:ext uri="{91240B29-F687-4f45-9708-019B960494DF}">
-              <a14:hiddenLine xmlns:a14="http://schemas.microsoft.com/office/drawing/2010/main" xmlns="" w="9525">
+              <a14:hiddenLine xmlns="" xmlns:a14="http://schemas.microsoft.com/office/drawing/2010/main" w="9525">
                 <a:solidFill>
                   <a:srgbClr val="000000"/>
                 </a:solidFill>
@@ -20046,14 +20592,14 @@
           </a:ln>
           <a:extLst>
             <a:ext uri="{909E8E84-426E-40dd-AFC4-6F175D3DCCD1}">
-              <a14:hiddenFill xmlns:a14="http://schemas.microsoft.com/office/drawing/2010/main" xmlns="">
+              <a14:hiddenFill xmlns="" xmlns:a14="http://schemas.microsoft.com/office/drawing/2010/main">
                 <a:solidFill>
                   <a:srgbClr val="FFFFFF"/>
                 </a:solidFill>
               </a14:hiddenFill>
             </a:ext>
             <a:ext uri="{91240B29-F687-4f45-9708-019B960494DF}">
-              <a14:hiddenLine xmlns:a14="http://schemas.microsoft.com/office/drawing/2010/main" xmlns="" w="9525">
+              <a14:hiddenLine xmlns="" xmlns:a14="http://schemas.microsoft.com/office/drawing/2010/main" w="9525">
                 <a:solidFill>
                   <a:srgbClr val="000000"/>
                 </a:solidFill>
@@ -21164,14 +21710,14 @@
           </a:ln>
           <a:extLst>
             <a:ext uri="{909E8E84-426E-40dd-AFC4-6F175D3DCCD1}">
-              <a14:hiddenFill xmlns:a14="http://schemas.microsoft.com/office/drawing/2010/main" xmlns="">
+              <a14:hiddenFill xmlns="" xmlns:a14="http://schemas.microsoft.com/office/drawing/2010/main">
                 <a:solidFill>
                   <a:srgbClr val="FFFFFF"/>
                 </a:solidFill>
               </a14:hiddenFill>
             </a:ext>
             <a:ext uri="{91240B29-F687-4f45-9708-019B960494DF}">
-              <a14:hiddenLine xmlns:a14="http://schemas.microsoft.com/office/drawing/2010/main" xmlns="" w="9525">
+              <a14:hiddenLine xmlns="" xmlns:a14="http://schemas.microsoft.com/office/drawing/2010/main" w="9525">
                 <a:solidFill>
                   <a:srgbClr val="000000"/>
                 </a:solidFill>
@@ -21259,14 +21805,14 @@
           </a:ln>
           <a:extLst>
             <a:ext uri="{909E8E84-426E-40dd-AFC4-6F175D3DCCD1}">
-              <a14:hiddenFill xmlns:a14="http://schemas.microsoft.com/office/drawing/2010/main" xmlns="">
+              <a14:hiddenFill xmlns="" xmlns:a14="http://schemas.microsoft.com/office/drawing/2010/main">
                 <a:solidFill>
                   <a:srgbClr val="FFFFFF"/>
                 </a:solidFill>
               </a14:hiddenFill>
             </a:ext>
             <a:ext uri="{91240B29-F687-4f45-9708-019B960494DF}">
-              <a14:hiddenLine xmlns:a14="http://schemas.microsoft.com/office/drawing/2010/main" xmlns="" w="9525">
+              <a14:hiddenLine xmlns="" xmlns:a14="http://schemas.microsoft.com/office/drawing/2010/main" w="9525">
                 <a:solidFill>
                   <a:srgbClr val="000000"/>
                 </a:solidFill>
@@ -21423,14 +21969,14 @@
           </a:ln>
           <a:extLst>
             <a:ext uri="{909E8E84-426E-40dd-AFC4-6F175D3DCCD1}">
-              <a14:hiddenFill xmlns:a14="http://schemas.microsoft.com/office/drawing/2010/main" xmlns="">
+              <a14:hiddenFill xmlns="" xmlns:a14="http://schemas.microsoft.com/office/drawing/2010/main">
                 <a:solidFill>
                   <a:srgbClr val="FFFFFF"/>
                 </a:solidFill>
               </a14:hiddenFill>
             </a:ext>
             <a:ext uri="{91240B29-F687-4f45-9708-019B960494DF}">
-              <a14:hiddenLine xmlns:a14="http://schemas.microsoft.com/office/drawing/2010/main" xmlns="" w="9525">
+              <a14:hiddenLine xmlns="" xmlns:a14="http://schemas.microsoft.com/office/drawing/2010/main" w="9525">
                 <a:solidFill>
                   <a:srgbClr val="000000"/>
                 </a:solidFill>
@@ -21594,7 +22140,7 @@
           <a:lstStyle/>
           <a:p>
             <a:r>
-              <a:rPr lang="en-US" smtClean="0"/>
+              <a:rPr lang="en-US" dirty="0" smtClean="0"/>
               <a:t>Matrix Multiply:  Data Transfer</a:t>
             </a:r>
           </a:p>
@@ -21622,14 +22168,14 @@
           </a:ln>
           <a:extLst>
             <a:ext uri="{909E8E84-426E-40dd-AFC4-6F175D3DCCD1}">
-              <a14:hiddenFill xmlns:a14="http://schemas.microsoft.com/office/drawing/2010/main" xmlns="">
+              <a14:hiddenFill xmlns="" xmlns:a14="http://schemas.microsoft.com/office/drawing/2010/main">
                 <a:solidFill>
                   <a:srgbClr val="FFFFFF"/>
                 </a:solidFill>
               </a14:hiddenFill>
             </a:ext>
             <a:ext uri="{91240B29-F687-4f45-9708-019B960494DF}">
-              <a14:hiddenLine xmlns:a14="http://schemas.microsoft.com/office/drawing/2010/main" xmlns="" w="9525">
+              <a14:hiddenLine xmlns="" xmlns:a14="http://schemas.microsoft.com/office/drawing/2010/main" w="9525">
                 <a:solidFill>
                   <a:srgbClr val="000000"/>
                 </a:solidFill>
@@ -21760,7 +22306,7 @@
           <p:nvPr/>
         </p:nvPicPr>
         <p:blipFill>
-          <a:blip r:embed="rId2">
+          <a:blip r:embed="rId3">
             <a:extLst>
               <a:ext uri="{28A0092B-C50C-407E-A947-70E740481C1C}">
                 <a14:useLocalDpi xmlns:a14="http://schemas.microsoft.com/office/drawing/2010/main" val="0"/>
@@ -21786,14 +22332,14 @@
           </a:ln>
           <a:extLst>
             <a:ext uri="{909E8E84-426E-40dd-AFC4-6F175D3DCCD1}">
-              <a14:hiddenFill xmlns:a14="http://schemas.microsoft.com/office/drawing/2010/main" xmlns="">
+              <a14:hiddenFill xmlns="" xmlns:a14="http://schemas.microsoft.com/office/drawing/2010/main">
                 <a:solidFill>
                   <a:srgbClr val="FFFFFF"/>
                 </a:solidFill>
               </a14:hiddenFill>
             </a:ext>
             <a:ext uri="{91240B29-F687-4f45-9708-019B960494DF}">
-              <a14:hiddenLine xmlns:a14="http://schemas.microsoft.com/office/drawing/2010/main" xmlns="" w="9525">
+              <a14:hiddenLine xmlns="" xmlns:a14="http://schemas.microsoft.com/office/drawing/2010/main" w="9525">
                 <a:solidFill>
                   <a:srgbClr val="000000"/>
                 </a:solidFill>
@@ -21870,7 +22416,7 @@
           </a:ln>
           <a:extLst>
             <a:ext uri="{909E8E84-426E-40dd-AFC4-6F175D3DCCD1}">
-              <a14:hiddenFill xmlns:a14="http://schemas.microsoft.com/office/drawing/2010/main" xmlns="">
+              <a14:hiddenFill xmlns="" xmlns:a14="http://schemas.microsoft.com/office/drawing/2010/main">
                 <a:solidFill>
                   <a:srgbClr val="FFFFFF"/>
                 </a:solidFill>
@@ -22019,7 +22565,7 @@
           </a:ln>
           <a:extLst>
             <a:ext uri="{909E8E84-426E-40dd-AFC4-6F175D3DCCD1}">
-              <a14:hiddenFill xmlns:a14="http://schemas.microsoft.com/office/drawing/2010/main" xmlns="">
+              <a14:hiddenFill xmlns="" xmlns:a14="http://schemas.microsoft.com/office/drawing/2010/main">
                 <a:noFill/>
               </a14:hiddenFill>
             </a:ext>
@@ -22109,14 +22655,14 @@
           </a:ln>
           <a:extLst>
             <a:ext uri="{909E8E84-426E-40dd-AFC4-6F175D3DCCD1}">
-              <a14:hiddenFill xmlns:a14="http://schemas.microsoft.com/office/drawing/2010/main" xmlns="">
+              <a14:hiddenFill xmlns="" xmlns:a14="http://schemas.microsoft.com/office/drawing/2010/main">
                 <a:solidFill>
                   <a:srgbClr val="FFFFFF"/>
                 </a:solidFill>
               </a14:hiddenFill>
             </a:ext>
             <a:ext uri="{91240B29-F687-4f45-9708-019B960494DF}">
-              <a14:hiddenLine xmlns:a14="http://schemas.microsoft.com/office/drawing/2010/main" xmlns="" w="9525">
+              <a14:hiddenLine xmlns="" xmlns:a14="http://schemas.microsoft.com/office/drawing/2010/main" w="9525">
                 <a:solidFill>
                   <a:srgbClr val="000000"/>
                 </a:solidFill>
@@ -22273,14 +22819,14 @@
           </a:ln>
           <a:extLst>
             <a:ext uri="{909E8E84-426E-40dd-AFC4-6F175D3DCCD1}">
-              <a14:hiddenFill xmlns:a14="http://schemas.microsoft.com/office/drawing/2010/main" xmlns="">
+              <a14:hiddenFill xmlns="" xmlns:a14="http://schemas.microsoft.com/office/drawing/2010/main">
                 <a:solidFill>
                   <a:srgbClr val="FFFFFF"/>
                 </a:solidFill>
               </a14:hiddenFill>
             </a:ext>
             <a:ext uri="{91240B29-F687-4f45-9708-019B960494DF}">
-              <a14:hiddenLine xmlns:a14="http://schemas.microsoft.com/office/drawing/2010/main" xmlns="" w="9525">
+              <a14:hiddenLine xmlns="" xmlns:a14="http://schemas.microsoft.com/office/drawing/2010/main" w="9525">
                 <a:solidFill>
                   <a:srgbClr val="000000"/>
                 </a:solidFill>
@@ -22357,7 +22903,7 @@
           </a:ln>
           <a:extLst>
             <a:ext uri="{909E8E84-426E-40dd-AFC4-6F175D3DCCD1}">
-              <a14:hiddenFill xmlns:a14="http://schemas.microsoft.com/office/drawing/2010/main" xmlns="">
+              <a14:hiddenFill xmlns="" xmlns:a14="http://schemas.microsoft.com/office/drawing/2010/main">
                 <a:solidFill>
                   <a:srgbClr val="FFFFFF"/>
                 </a:solidFill>
@@ -22506,7 +23052,7 @@
           </a:ln>
           <a:extLst>
             <a:ext uri="{909E8E84-426E-40dd-AFC4-6F175D3DCCD1}">
-              <a14:hiddenFill xmlns:a14="http://schemas.microsoft.com/office/drawing/2010/main" xmlns="">
+              <a14:hiddenFill xmlns="" xmlns:a14="http://schemas.microsoft.com/office/drawing/2010/main">
                 <a:noFill/>
               </a14:hiddenFill>
             </a:ext>
@@ -22661,8 +23207,26 @@
             </a:pPr>
             <a:r>
               <a:rPr lang="en-US" dirty="0" smtClean="0"/>
-              <a:t>Host and device have separate memories</a:t>
-            </a:r>
+              <a:t>Host and device have separate </a:t>
+            </a:r>
+            <a:r>
+              <a:rPr lang="en-US" dirty="0" smtClean="0"/>
+              <a:t>memories</a:t>
+            </a:r>
+          </a:p>
+          <a:p>
+            <a:pPr lvl="1">
+              <a:defRPr/>
+            </a:pPr>
+            <a:r>
+              <a:rPr lang="en-US" sz="1600" dirty="0" smtClean="0"/>
+              <a:t>Except for </a:t>
+            </a:r>
+            <a:r>
+              <a:rPr lang="en-US" sz="1600" dirty="0" err="1" smtClean="0"/>
+              <a:t>SoC</a:t>
+            </a:r>
+            <a:endParaRPr lang="en-US" sz="1600" dirty="0" smtClean="0"/>
           </a:p>
           <a:p>
             <a:pPr>
@@ -22670,7 +23234,11 @@
             </a:pPr>
             <a:r>
               <a:rPr lang="en-US" dirty="0" smtClean="0"/>
-              <a:t>CUDA Program</a:t>
+              <a:t>CUDA </a:t>
+            </a:r>
+            <a:r>
+              <a:rPr lang="en-US" dirty="0" smtClean="0"/>
+              <a:t>Program</a:t>
             </a:r>
           </a:p>
           <a:p>
@@ -22761,14 +23329,14 @@
           </a:ln>
           <a:extLst>
             <a:ext uri="{909E8E84-426E-40dd-AFC4-6F175D3DCCD1}">
-              <a14:hiddenFill xmlns:a14="http://schemas.microsoft.com/office/drawing/2010/main" xmlns="">
+              <a14:hiddenFill xmlns="" xmlns:a14="http://schemas.microsoft.com/office/drawing/2010/main">
                 <a:solidFill>
                   <a:srgbClr val="FFFFFF"/>
                 </a:solidFill>
               </a14:hiddenFill>
             </a:ext>
             <a:ext uri="{91240B29-F687-4f45-9708-019B960494DF}">
-              <a14:hiddenLine xmlns:a14="http://schemas.microsoft.com/office/drawing/2010/main" xmlns="" w="9525">
+              <a14:hiddenLine xmlns="" xmlns:a14="http://schemas.microsoft.com/office/drawing/2010/main" w="9525">
                 <a:solidFill>
                   <a:srgbClr val="000000"/>
                 </a:solidFill>
@@ -22925,14 +23493,14 @@
           </a:ln>
           <a:extLst>
             <a:ext uri="{909E8E84-426E-40dd-AFC4-6F175D3DCCD1}">
-              <a14:hiddenFill xmlns:a14="http://schemas.microsoft.com/office/drawing/2010/main" xmlns="">
+              <a14:hiddenFill xmlns="" xmlns:a14="http://schemas.microsoft.com/office/drawing/2010/main">
                 <a:solidFill>
                   <a:srgbClr val="FFFFFF"/>
                 </a:solidFill>
               </a14:hiddenFill>
             </a:ext>
             <a:ext uri="{91240B29-F687-4f45-9708-019B960494DF}">
-              <a14:hiddenLine xmlns:a14="http://schemas.microsoft.com/office/drawing/2010/main" xmlns="" w="9525">
+              <a14:hiddenLine xmlns="" xmlns:a14="http://schemas.microsoft.com/office/drawing/2010/main" w="9525">
                 <a:solidFill>
                   <a:srgbClr val="000000"/>
                 </a:solidFill>
@@ -23058,14 +23626,14 @@
           </a:ln>
           <a:extLst>
             <a:ext uri="{909E8E84-426E-40dd-AFC4-6F175D3DCCD1}">
-              <a14:hiddenFill xmlns:a14="http://schemas.microsoft.com/office/drawing/2010/main" xmlns="">
+              <a14:hiddenFill xmlns="" xmlns:a14="http://schemas.microsoft.com/office/drawing/2010/main">
                 <a:solidFill>
                   <a:srgbClr val="FFFFFF"/>
                 </a:solidFill>
               </a14:hiddenFill>
             </a:ext>
             <a:ext uri="{91240B29-F687-4f45-9708-019B960494DF}">
-              <a14:hiddenLine xmlns:a14="http://schemas.microsoft.com/office/drawing/2010/main" xmlns="" w="9525">
+              <a14:hiddenLine xmlns="" xmlns:a14="http://schemas.microsoft.com/office/drawing/2010/main" w="9525">
                 <a:solidFill>
                   <a:srgbClr val="000000"/>
                 </a:solidFill>
@@ -23222,14 +23790,14 @@
           </a:ln>
           <a:extLst>
             <a:ext uri="{909E8E84-426E-40dd-AFC4-6F175D3DCCD1}">
-              <a14:hiddenFill xmlns:a14="http://schemas.microsoft.com/office/drawing/2010/main" xmlns="">
+              <a14:hiddenFill xmlns="" xmlns:a14="http://schemas.microsoft.com/office/drawing/2010/main">
                 <a:solidFill>
                   <a:srgbClr val="FFFFFF"/>
                 </a:solidFill>
               </a14:hiddenFill>
             </a:ext>
             <a:ext uri="{91240B29-F687-4f45-9708-019B960494DF}">
-              <a14:hiddenLine xmlns:a14="http://schemas.microsoft.com/office/drawing/2010/main" xmlns="" w="9525">
+              <a14:hiddenLine xmlns="" xmlns:a14="http://schemas.microsoft.com/office/drawing/2010/main" w="9525">
                 <a:solidFill>
                   <a:srgbClr val="000000"/>
                 </a:solidFill>
@@ -23306,7 +23874,7 @@
           </a:ln>
           <a:extLst>
             <a:ext uri="{909E8E84-426E-40dd-AFC4-6F175D3DCCD1}">
-              <a14:hiddenFill xmlns:a14="http://schemas.microsoft.com/office/drawing/2010/main" xmlns="">
+              <a14:hiddenFill xmlns="" xmlns:a14="http://schemas.microsoft.com/office/drawing/2010/main">
                 <a:solidFill>
                   <a:srgbClr val="FFFFFF"/>
                 </a:solidFill>
@@ -23455,7 +24023,7 @@
           </a:ln>
           <a:extLst>
             <a:ext uri="{909E8E84-426E-40dd-AFC4-6F175D3DCCD1}">
-              <a14:hiddenFill xmlns:a14="http://schemas.microsoft.com/office/drawing/2010/main" xmlns="">
+              <a14:hiddenFill xmlns="" xmlns:a14="http://schemas.microsoft.com/office/drawing/2010/main">
                 <a:noFill/>
               </a14:hiddenFill>
             </a:ext>
@@ -23662,14 +24230,14 @@
           </a:ln>
           <a:extLst>
             <a:ext uri="{909E8E84-426E-40dd-AFC4-6F175D3DCCD1}">
-              <a14:hiddenFill xmlns:a14="http://schemas.microsoft.com/office/drawing/2010/main" xmlns="">
+              <a14:hiddenFill xmlns="" xmlns:a14="http://schemas.microsoft.com/office/drawing/2010/main">
                 <a:solidFill>
                   <a:srgbClr val="FFFFFF"/>
                 </a:solidFill>
               </a14:hiddenFill>
             </a:ext>
             <a:ext uri="{91240B29-F687-4f45-9708-019B960494DF}">
-              <a14:hiddenLine xmlns:a14="http://schemas.microsoft.com/office/drawing/2010/main" xmlns="" w="9525">
+              <a14:hiddenLine xmlns="" xmlns:a14="http://schemas.microsoft.com/office/drawing/2010/main" w="9525">
                 <a:solidFill>
                   <a:srgbClr val="000000"/>
                 </a:solidFill>
@@ -23703,14 +24271,14 @@
           </a:ln>
           <a:extLst>
             <a:ext uri="{909E8E84-426E-40dd-AFC4-6F175D3DCCD1}">
-              <a14:hiddenFill xmlns:a14="http://schemas.microsoft.com/office/drawing/2010/main" xmlns="">
+              <a14:hiddenFill xmlns="" xmlns:a14="http://schemas.microsoft.com/office/drawing/2010/main">
                 <a:solidFill>
                   <a:srgbClr val="FFFFFF"/>
                 </a:solidFill>
               </a14:hiddenFill>
             </a:ext>
             <a:ext uri="{91240B29-F687-4f45-9708-019B960494DF}">
-              <a14:hiddenLine xmlns:a14="http://schemas.microsoft.com/office/drawing/2010/main" xmlns="" w="9525">
+              <a14:hiddenLine xmlns="" xmlns:a14="http://schemas.microsoft.com/office/drawing/2010/main" w="9525">
                 <a:solidFill>
                   <a:srgbClr val="000000"/>
                 </a:solidFill>
@@ -23897,7 +24465,7 @@
           </a:ln>
           <a:extLst>
             <a:ext uri="{909E8E84-426E-40dd-AFC4-6F175D3DCCD1}">
-              <a14:hiddenFill xmlns:a14="http://schemas.microsoft.com/office/drawing/2010/main" xmlns="">
+              <a14:hiddenFill xmlns="" xmlns:a14="http://schemas.microsoft.com/office/drawing/2010/main">
                 <a:solidFill>
                   <a:srgbClr val="FFFFFF"/>
                 </a:solidFill>
@@ -24046,7 +24614,7 @@
           </a:ln>
           <a:extLst>
             <a:ext uri="{909E8E84-426E-40dd-AFC4-6F175D3DCCD1}">
-              <a14:hiddenFill xmlns:a14="http://schemas.microsoft.com/office/drawing/2010/main" xmlns="">
+              <a14:hiddenFill xmlns="" xmlns:a14="http://schemas.microsoft.com/office/drawing/2010/main">
                 <a:noFill/>
               </a14:hiddenFill>
             </a:ext>
@@ -24149,14 +24717,14 @@
           </a:ln>
           <a:extLst>
             <a:ext uri="{909E8E84-426E-40dd-AFC4-6F175D3DCCD1}">
-              <a14:hiddenFill xmlns:a14="http://schemas.microsoft.com/office/drawing/2010/main" xmlns="">
+              <a14:hiddenFill xmlns="" xmlns:a14="http://schemas.microsoft.com/office/drawing/2010/main">
                 <a:solidFill>
                   <a:srgbClr val="FFFFFF"/>
                 </a:solidFill>
               </a14:hiddenFill>
             </a:ext>
             <a:ext uri="{91240B29-F687-4f45-9708-019B960494DF}">
-              <a14:hiddenLine xmlns:a14="http://schemas.microsoft.com/office/drawing/2010/main" xmlns="" w="9525">
+              <a14:hiddenLine xmlns="" xmlns:a14="http://schemas.microsoft.com/office/drawing/2010/main" w="9525">
                 <a:solidFill>
                   <a:srgbClr val="000000"/>
                 </a:solidFill>
@@ -24190,14 +24758,14 @@
           </a:ln>
           <a:extLst>
             <a:ext uri="{909E8E84-426E-40dd-AFC4-6F175D3DCCD1}">
-              <a14:hiddenFill xmlns:a14="http://schemas.microsoft.com/office/drawing/2010/main" xmlns="">
+              <a14:hiddenFill xmlns="" xmlns:a14="http://schemas.microsoft.com/office/drawing/2010/main">
                 <a:solidFill>
                   <a:srgbClr val="FFFFFF"/>
                 </a:solidFill>
               </a14:hiddenFill>
             </a:ext>
             <a:ext uri="{91240B29-F687-4f45-9708-019B960494DF}">
-              <a14:hiddenLine xmlns:a14="http://schemas.microsoft.com/office/drawing/2010/main" xmlns="" w="9525">
+              <a14:hiddenLine xmlns="" xmlns:a14="http://schemas.microsoft.com/office/drawing/2010/main" w="9525">
                 <a:solidFill>
                   <a:srgbClr val="000000"/>
                 </a:solidFill>
@@ -24384,7 +24952,7 @@
           </a:ln>
           <a:extLst>
             <a:ext uri="{909E8E84-426E-40dd-AFC4-6F175D3DCCD1}">
-              <a14:hiddenFill xmlns:a14="http://schemas.microsoft.com/office/drawing/2010/main" xmlns="">
+              <a14:hiddenFill xmlns="" xmlns:a14="http://schemas.microsoft.com/office/drawing/2010/main">
                 <a:solidFill>
                   <a:srgbClr val="FFFFFF"/>
                 </a:solidFill>
@@ -24533,7 +25101,7 @@
           </a:ln>
           <a:extLst>
             <a:ext uri="{909E8E84-426E-40dd-AFC4-6F175D3DCCD1}">
-              <a14:hiddenFill xmlns:a14="http://schemas.microsoft.com/office/drawing/2010/main" xmlns="">
+              <a14:hiddenFill xmlns="" xmlns:a14="http://schemas.microsoft.com/office/drawing/2010/main">
                 <a:noFill/>
               </a14:hiddenFill>
             </a:ext>
@@ -24636,14 +25204,14 @@
           </a:ln>
           <a:extLst>
             <a:ext uri="{909E8E84-426E-40dd-AFC4-6F175D3DCCD1}">
-              <a14:hiddenFill xmlns:a14="http://schemas.microsoft.com/office/drawing/2010/main" xmlns="">
+              <a14:hiddenFill xmlns="" xmlns:a14="http://schemas.microsoft.com/office/drawing/2010/main">
                 <a:solidFill>
                   <a:srgbClr val="FFFFFF"/>
                 </a:solidFill>
               </a14:hiddenFill>
             </a:ext>
             <a:ext uri="{91240B29-F687-4f45-9708-019B960494DF}">
-              <a14:hiddenLine xmlns:a14="http://schemas.microsoft.com/office/drawing/2010/main" xmlns="" w="9525">
+              <a14:hiddenLine xmlns="" xmlns:a14="http://schemas.microsoft.com/office/drawing/2010/main" w="9525">
                 <a:solidFill>
                   <a:srgbClr val="000000"/>
                 </a:solidFill>
@@ -24677,14 +25245,14 @@
           </a:ln>
           <a:extLst>
             <a:ext uri="{909E8E84-426E-40dd-AFC4-6F175D3DCCD1}">
-              <a14:hiddenFill xmlns:a14="http://schemas.microsoft.com/office/drawing/2010/main" xmlns="">
+              <a14:hiddenFill xmlns="" xmlns:a14="http://schemas.microsoft.com/office/drawing/2010/main">
                 <a:solidFill>
                   <a:srgbClr val="FFFFFF"/>
                 </a:solidFill>
               </a14:hiddenFill>
             </a:ext>
             <a:ext uri="{91240B29-F687-4f45-9708-019B960494DF}">
-              <a14:hiddenLine xmlns:a14="http://schemas.microsoft.com/office/drawing/2010/main" xmlns="" w="9525">
+              <a14:hiddenLine xmlns="" xmlns:a14="http://schemas.microsoft.com/office/drawing/2010/main" w="9525">
                 <a:solidFill>
                   <a:srgbClr val="000000"/>
                 </a:solidFill>
@@ -24871,7 +25439,7 @@
           </a:ln>
           <a:extLst>
             <a:ext uri="{909E8E84-426E-40dd-AFC4-6F175D3DCCD1}">
-              <a14:hiddenFill xmlns:a14="http://schemas.microsoft.com/office/drawing/2010/main" xmlns="">
+              <a14:hiddenFill xmlns="" xmlns:a14="http://schemas.microsoft.com/office/drawing/2010/main">
                 <a:solidFill>
                   <a:srgbClr val="FFFFFF"/>
                 </a:solidFill>
@@ -25020,7 +25588,7 @@
           </a:ln>
           <a:extLst>
             <a:ext uri="{909E8E84-426E-40dd-AFC4-6F175D3DCCD1}">
-              <a14:hiddenFill xmlns:a14="http://schemas.microsoft.com/office/drawing/2010/main" xmlns="">
+              <a14:hiddenFill xmlns="" xmlns:a14="http://schemas.microsoft.com/office/drawing/2010/main">
                 <a:noFill/>
               </a14:hiddenFill>
             </a:ext>
@@ -25123,14 +25691,14 @@
           </a:ln>
           <a:extLst>
             <a:ext uri="{909E8E84-426E-40dd-AFC4-6F175D3DCCD1}">
-              <a14:hiddenFill xmlns:a14="http://schemas.microsoft.com/office/drawing/2010/main" xmlns="">
+              <a14:hiddenFill xmlns="" xmlns:a14="http://schemas.microsoft.com/office/drawing/2010/main">
                 <a:solidFill>
                   <a:srgbClr val="FFFFFF"/>
                 </a:solidFill>
               </a14:hiddenFill>
             </a:ext>
             <a:ext uri="{91240B29-F687-4f45-9708-019B960494DF}">
-              <a14:hiddenLine xmlns:a14="http://schemas.microsoft.com/office/drawing/2010/main" xmlns="" w="9525">
+              <a14:hiddenLine xmlns="" xmlns:a14="http://schemas.microsoft.com/office/drawing/2010/main" w="9525">
                 <a:solidFill>
                   <a:srgbClr val="000000"/>
                 </a:solidFill>
@@ -25164,14 +25732,14 @@
           </a:ln>
           <a:extLst>
             <a:ext uri="{909E8E84-426E-40dd-AFC4-6F175D3DCCD1}">
-              <a14:hiddenFill xmlns:a14="http://schemas.microsoft.com/office/drawing/2010/main" xmlns="">
+              <a14:hiddenFill xmlns="" xmlns:a14="http://schemas.microsoft.com/office/drawing/2010/main">
                 <a:solidFill>
                   <a:srgbClr val="FFFFFF"/>
                 </a:solidFill>
               </a14:hiddenFill>
             </a:ext>
             <a:ext uri="{91240B29-F687-4f45-9708-019B960494DF}">
-              <a14:hiddenLine xmlns:a14="http://schemas.microsoft.com/office/drawing/2010/main" xmlns="" w="9525">
+              <a14:hiddenLine xmlns="" xmlns:a14="http://schemas.microsoft.com/office/drawing/2010/main" w="9525">
                 <a:solidFill>
                   <a:srgbClr val="000000"/>
                 </a:solidFill>
@@ -25320,7 +25888,7 @@
           </a:ln>
           <a:extLst>
             <a:ext uri="{909E8E84-426E-40dd-AFC4-6F175D3DCCD1}">
-              <a14:hiddenFill xmlns:a14="http://schemas.microsoft.com/office/drawing/2010/main" xmlns="">
+              <a14:hiddenFill xmlns="" xmlns:a14="http://schemas.microsoft.com/office/drawing/2010/main">
                 <a:solidFill>
                   <a:srgbClr val="FFFFFF"/>
                 </a:solidFill>
@@ -25613,14 +26181,14 @@
           </a:ln>
           <a:extLst>
             <a:ext uri="{909E8E84-426E-40dd-AFC4-6F175D3DCCD1}">
-              <a14:hiddenFill xmlns:a14="http://schemas.microsoft.com/office/drawing/2010/main" xmlns="">
+              <a14:hiddenFill xmlns="" xmlns:a14="http://schemas.microsoft.com/office/drawing/2010/main">
                 <a:solidFill>
                   <a:srgbClr val="FFFFFF"/>
                 </a:solidFill>
               </a14:hiddenFill>
             </a:ext>
             <a:ext uri="{91240B29-F687-4f45-9708-019B960494DF}">
-              <a14:hiddenLine xmlns:a14="http://schemas.microsoft.com/office/drawing/2010/main" xmlns="" w="9525">
+              <a14:hiddenLine xmlns="" xmlns:a14="http://schemas.microsoft.com/office/drawing/2010/main" w="9525">
                 <a:solidFill>
                   <a:srgbClr val="000000"/>
                 </a:solidFill>
@@ -25676,14 +26244,14 @@
           </a:ln>
           <a:extLst>
             <a:ext uri="{909E8E84-426E-40dd-AFC4-6F175D3DCCD1}">
-              <a14:hiddenFill xmlns:a14="http://schemas.microsoft.com/office/drawing/2010/main" xmlns="">
+              <a14:hiddenFill xmlns="" xmlns:a14="http://schemas.microsoft.com/office/drawing/2010/main">
                 <a:solidFill>
                   <a:srgbClr val="FFFFFF"/>
                 </a:solidFill>
               </a14:hiddenFill>
             </a:ext>
             <a:ext uri="{91240B29-F687-4f45-9708-019B960494DF}">
-              <a14:hiddenLine xmlns:a14="http://schemas.microsoft.com/office/drawing/2010/main" xmlns="" w="9525">
+              <a14:hiddenLine xmlns="" xmlns:a14="http://schemas.microsoft.com/office/drawing/2010/main" w="9525">
                 <a:solidFill>
                   <a:srgbClr val="000000"/>
                 </a:solidFill>
@@ -25870,7 +26438,7 @@
           </a:ln>
           <a:extLst>
             <a:ext uri="{909E8E84-426E-40dd-AFC4-6F175D3DCCD1}">
-              <a14:hiddenFill xmlns:a14="http://schemas.microsoft.com/office/drawing/2010/main" xmlns="">
+              <a14:hiddenFill xmlns="" xmlns:a14="http://schemas.microsoft.com/office/drawing/2010/main">
                 <a:solidFill>
                   <a:srgbClr val="FFFFFF"/>
                 </a:solidFill>
@@ -26019,7 +26587,7 @@
           </a:ln>
           <a:extLst>
             <a:ext uri="{909E8E84-426E-40dd-AFC4-6F175D3DCCD1}">
-              <a14:hiddenFill xmlns:a14="http://schemas.microsoft.com/office/drawing/2010/main" xmlns="">
+              <a14:hiddenFill xmlns="" xmlns:a14="http://schemas.microsoft.com/office/drawing/2010/main">
                 <a:noFill/>
               </a14:hiddenFill>
             </a:ext>
@@ -26278,7 +26846,7 @@
               <a:rPr lang="en-US" sz="2800" kern="0" dirty="0" smtClean="0">
                 <a:latin typeface="+mn-lt"/>
               </a:rPr>
-              <a:t>OpenGL.</a:t>
+              <a:t>OpenGL/WebGL/Vulkan.</a:t>
             </a:r>
             <a:endParaRPr lang="en-US" sz="2800" i="1" kern="0" dirty="0">
               <a:solidFill>
@@ -26362,14 +26930,14 @@
           <a:ln/>
           <a:extLst>
             <a:ext uri="{909E8E84-426E-40dd-AFC4-6F175D3DCCD1}">
-              <a14:hiddenFill xmlns:a14="http://schemas.microsoft.com/office/drawing/2010/main" xmlns="">
+              <a14:hiddenFill xmlns="" xmlns:a14="http://schemas.microsoft.com/office/drawing/2010/main">
                 <a:solidFill>
                   <a:srgbClr val="FFFFFF"/>
                 </a:solidFill>
               </a14:hiddenFill>
             </a:ext>
             <a:ext uri="{91240B29-F687-4f45-9708-019B960494DF}">
-              <a14:hiddenLine xmlns:a14="http://schemas.microsoft.com/office/drawing/2010/main" xmlns="" w="9525">
+              <a14:hiddenLine xmlns="" xmlns:a14="http://schemas.microsoft.com/office/drawing/2010/main" w="9525">
                 <a:solidFill>
                   <a:srgbClr val="000000"/>
                 </a:solidFill>
@@ -27380,14 +27948,14 @@
           </a:ln>
           <a:extLst>
             <a:ext uri="{909E8E84-426E-40dd-AFC4-6F175D3DCCD1}">
-              <a14:hiddenFill xmlns:a14="http://schemas.microsoft.com/office/drawing/2010/main" xmlns="">
+              <a14:hiddenFill xmlns="" xmlns:a14="http://schemas.microsoft.com/office/drawing/2010/main">
                 <a:solidFill>
                   <a:srgbClr val="FFFFFF"/>
                 </a:solidFill>
               </a14:hiddenFill>
             </a:ext>
             <a:ext uri="{91240B29-F687-4f45-9708-019B960494DF}">
-              <a14:hiddenLine xmlns:a14="http://schemas.microsoft.com/office/drawing/2010/main" xmlns="" w="9525">
+              <a14:hiddenLine xmlns="" xmlns:a14="http://schemas.microsoft.com/office/drawing/2010/main" w="9525">
                 <a:solidFill>
                   <a:srgbClr val="000000"/>
                 </a:solidFill>
@@ -27434,14 +28002,14 @@
           </a:ln>
           <a:extLst>
             <a:ext uri="{909E8E84-426E-40dd-AFC4-6F175D3DCCD1}">
-              <a14:hiddenFill xmlns:a14="http://schemas.microsoft.com/office/drawing/2010/main" xmlns="">
+              <a14:hiddenFill xmlns="" xmlns:a14="http://schemas.microsoft.com/office/drawing/2010/main">
                 <a:solidFill>
                   <a:srgbClr val="FFFFFF"/>
                 </a:solidFill>
               </a14:hiddenFill>
             </a:ext>
             <a:ext uri="{91240B29-F687-4f45-9708-019B960494DF}">
-              <a14:hiddenLine xmlns:a14="http://schemas.microsoft.com/office/drawing/2010/main" xmlns="" w="9525">
+              <a14:hiddenLine xmlns="" xmlns:a14="http://schemas.microsoft.com/office/drawing/2010/main" w="9525">
                 <a:solidFill>
                   <a:srgbClr val="000000"/>
                 </a:solidFill>
@@ -27488,14 +28056,14 @@
           </a:ln>
           <a:extLst>
             <a:ext uri="{909E8E84-426E-40dd-AFC4-6F175D3DCCD1}">
-              <a14:hiddenFill xmlns:a14="http://schemas.microsoft.com/office/drawing/2010/main" xmlns="">
+              <a14:hiddenFill xmlns="" xmlns:a14="http://schemas.microsoft.com/office/drawing/2010/main">
                 <a:solidFill>
                   <a:srgbClr val="FFFFFF"/>
                 </a:solidFill>
               </a14:hiddenFill>
             </a:ext>
             <a:ext uri="{91240B29-F687-4f45-9708-019B960494DF}">
-              <a14:hiddenLine xmlns:a14="http://schemas.microsoft.com/office/drawing/2010/main" xmlns="" w="9525">
+              <a14:hiddenLine xmlns="" xmlns:a14="http://schemas.microsoft.com/office/drawing/2010/main" w="9525">
                 <a:solidFill>
                   <a:srgbClr val="000000"/>
                 </a:solidFill>
@@ -27542,14 +28110,14 @@
           </a:ln>
           <a:extLst>
             <a:ext uri="{909E8E84-426E-40dd-AFC4-6F175D3DCCD1}">
-              <a14:hiddenFill xmlns:a14="http://schemas.microsoft.com/office/drawing/2010/main" xmlns="">
+              <a14:hiddenFill xmlns="" xmlns:a14="http://schemas.microsoft.com/office/drawing/2010/main">
                 <a:solidFill>
                   <a:srgbClr val="FFFFFF"/>
                 </a:solidFill>
               </a14:hiddenFill>
             </a:ext>
             <a:ext uri="{91240B29-F687-4f45-9708-019B960494DF}">
-              <a14:hiddenLine xmlns:a14="http://schemas.microsoft.com/office/drawing/2010/main" xmlns="" w="9525">
+              <a14:hiddenLine xmlns="" xmlns:a14="http://schemas.microsoft.com/office/drawing/2010/main" w="9525">
                 <a:solidFill>
                   <a:srgbClr val="000000"/>
                 </a:solidFill>
@@ -27824,14 +28392,14 @@
           </a:ln>
           <a:extLst>
             <a:ext uri="{909E8E84-426E-40dd-AFC4-6F175D3DCCD1}">
-              <a14:hiddenFill xmlns:a14="http://schemas.microsoft.com/office/drawing/2010/main" xmlns="">
+              <a14:hiddenFill xmlns="" xmlns:a14="http://schemas.microsoft.com/office/drawing/2010/main">
                 <a:solidFill>
                   <a:srgbClr val="FFFFFF"/>
                 </a:solidFill>
               </a14:hiddenFill>
             </a:ext>
             <a:ext uri="{91240B29-F687-4f45-9708-019B960494DF}">
-              <a14:hiddenLine xmlns:a14="http://schemas.microsoft.com/office/drawing/2010/main" xmlns="" w="9525">
+              <a14:hiddenLine xmlns="" xmlns:a14="http://schemas.microsoft.com/office/drawing/2010/main" w="9525">
                 <a:solidFill>
                   <a:srgbClr val="000000"/>
                 </a:solidFill>
@@ -27992,14 +28560,14 @@
           </a:ln>
           <a:extLst>
             <a:ext uri="{909E8E84-426E-40dd-AFC4-6F175D3DCCD1}">
-              <a14:hiddenFill xmlns:a14="http://schemas.microsoft.com/office/drawing/2010/main" xmlns="">
+              <a14:hiddenFill xmlns="" xmlns:a14="http://schemas.microsoft.com/office/drawing/2010/main">
                 <a:solidFill>
                   <a:srgbClr val="FFFFFF"/>
                 </a:solidFill>
               </a14:hiddenFill>
             </a:ext>
             <a:ext uri="{91240B29-F687-4f45-9708-019B960494DF}">
-              <a14:hiddenLine xmlns:a14="http://schemas.microsoft.com/office/drawing/2010/main" xmlns="" w="9525">
+              <a14:hiddenLine xmlns="" xmlns:a14="http://schemas.microsoft.com/office/drawing/2010/main" w="9525">
                 <a:solidFill>
                   <a:srgbClr val="000000"/>
                 </a:solidFill>
@@ -28160,14 +28728,14 @@
           </a:ln>
           <a:extLst>
             <a:ext uri="{909E8E84-426E-40dd-AFC4-6F175D3DCCD1}">
-              <a14:hiddenFill xmlns:a14="http://schemas.microsoft.com/office/drawing/2010/main" xmlns="">
+              <a14:hiddenFill xmlns="" xmlns:a14="http://schemas.microsoft.com/office/drawing/2010/main">
                 <a:solidFill>
                   <a:srgbClr val="FFFFFF"/>
                 </a:solidFill>
               </a14:hiddenFill>
             </a:ext>
             <a:ext uri="{91240B29-F687-4f45-9708-019B960494DF}">
-              <a14:hiddenLine xmlns:a14="http://schemas.microsoft.com/office/drawing/2010/main" xmlns="" w="9525">
+              <a14:hiddenLine xmlns="" xmlns:a14="http://schemas.microsoft.com/office/drawing/2010/main" w="9525">
                 <a:solidFill>
                   <a:srgbClr val="000000"/>
                 </a:solidFill>
@@ -28328,14 +28896,14 @@
           </a:ln>
           <a:extLst>
             <a:ext uri="{909E8E84-426E-40dd-AFC4-6F175D3DCCD1}">
-              <a14:hiddenFill xmlns:a14="http://schemas.microsoft.com/office/drawing/2010/main" xmlns="">
+              <a14:hiddenFill xmlns="" xmlns:a14="http://schemas.microsoft.com/office/drawing/2010/main">
                 <a:solidFill>
                   <a:srgbClr val="FFFFFF"/>
                 </a:solidFill>
               </a14:hiddenFill>
             </a:ext>
             <a:ext uri="{91240B29-F687-4f45-9708-019B960494DF}">
-              <a14:hiddenLine xmlns:a14="http://schemas.microsoft.com/office/drawing/2010/main" xmlns="" w="9525">
+              <a14:hiddenLine xmlns="" xmlns:a14="http://schemas.microsoft.com/office/drawing/2010/main" w="9525">
                 <a:solidFill>
                   <a:srgbClr val="000000"/>
                 </a:solidFill>
@@ -29738,7 +30306,7 @@
           </a:ln>
           <a:extLst>
             <a:ext uri="{909E8E84-426E-40dd-AFC4-6F175D3DCCD1}">
-              <a14:hiddenFill xmlns:a14="http://schemas.microsoft.com/office/drawing/2010/main" xmlns="">
+              <a14:hiddenFill xmlns="" xmlns:a14="http://schemas.microsoft.com/office/drawing/2010/main">
                 <a:noFill/>
               </a14:hiddenFill>
             </a:ext>
@@ -29780,7 +30348,7 @@
           </a:ln>
           <a:extLst>
             <a:ext uri="{909E8E84-426E-40dd-AFC4-6F175D3DCCD1}">
-              <a14:hiddenFill xmlns:a14="http://schemas.microsoft.com/office/drawing/2010/main" xmlns="">
+              <a14:hiddenFill xmlns="" xmlns:a14="http://schemas.microsoft.com/office/drawing/2010/main">
                 <a:noFill/>
               </a14:hiddenFill>
             </a:ext>
@@ -29821,7 +30389,7 @@
           </a:ln>
           <a:extLst>
             <a:ext uri="{909E8E84-426E-40dd-AFC4-6F175D3DCCD1}">
-              <a14:hiddenFill xmlns:a14="http://schemas.microsoft.com/office/drawing/2010/main" xmlns="">
+              <a14:hiddenFill xmlns="" xmlns:a14="http://schemas.microsoft.com/office/drawing/2010/main">
                 <a:noFill/>
               </a14:hiddenFill>
             </a:ext>
@@ -29857,14 +30425,14 @@
           </a:ln>
           <a:extLst>
             <a:ext uri="{909E8E84-426E-40dd-AFC4-6F175D3DCCD1}">
-              <a14:hiddenFill xmlns:a14="http://schemas.microsoft.com/office/drawing/2010/main" xmlns="">
+              <a14:hiddenFill xmlns="" xmlns:a14="http://schemas.microsoft.com/office/drawing/2010/main">
                 <a:solidFill>
                   <a:srgbClr val="FFFFFF"/>
                 </a:solidFill>
               </a14:hiddenFill>
             </a:ext>
             <a:ext uri="{91240B29-F687-4f45-9708-019B960494DF}">
-              <a14:hiddenLine xmlns:a14="http://schemas.microsoft.com/office/drawing/2010/main" xmlns="" w="9525">
+              <a14:hiddenLine xmlns="" xmlns:a14="http://schemas.microsoft.com/office/drawing/2010/main" w="9525">
                 <a:solidFill>
                   <a:srgbClr val="000000"/>
                 </a:solidFill>
@@ -30146,14 +30714,14 @@
           </a:ln>
           <a:extLst>
             <a:ext uri="{909E8E84-426E-40dd-AFC4-6F175D3DCCD1}">
-              <a14:hiddenFill xmlns:a14="http://schemas.microsoft.com/office/drawing/2010/main" xmlns="">
+              <a14:hiddenFill xmlns="" xmlns:a14="http://schemas.microsoft.com/office/drawing/2010/main">
                 <a:solidFill>
                   <a:srgbClr val="FFFFFF"/>
                 </a:solidFill>
               </a14:hiddenFill>
             </a:ext>
             <a:ext uri="{91240B29-F687-4f45-9708-019B960494DF}">
-              <a14:hiddenLine xmlns:a14="http://schemas.microsoft.com/office/drawing/2010/main" xmlns="" w="9525">
+              <a14:hiddenLine xmlns="" xmlns:a14="http://schemas.microsoft.com/office/drawing/2010/main" w="9525">
                 <a:solidFill>
                   <a:srgbClr val="000000"/>
                 </a:solidFill>
@@ -30435,14 +31003,14 @@
           </a:ln>
           <a:extLst>
             <a:ext uri="{909E8E84-426E-40dd-AFC4-6F175D3DCCD1}">
-              <a14:hiddenFill xmlns:a14="http://schemas.microsoft.com/office/drawing/2010/main" xmlns="">
+              <a14:hiddenFill xmlns="" xmlns:a14="http://schemas.microsoft.com/office/drawing/2010/main">
                 <a:solidFill>
                   <a:srgbClr val="FFFFFF"/>
                 </a:solidFill>
               </a14:hiddenFill>
             </a:ext>
             <a:ext uri="{91240B29-F687-4f45-9708-019B960494DF}">
-              <a14:hiddenLine xmlns:a14="http://schemas.microsoft.com/office/drawing/2010/main" xmlns="" w="9525">
+              <a14:hiddenLine xmlns="" xmlns:a14="http://schemas.microsoft.com/office/drawing/2010/main" w="9525">
                 <a:solidFill>
                   <a:srgbClr val="000000"/>
                 </a:solidFill>
@@ -30724,14 +31292,14 @@
           </a:ln>
           <a:extLst>
             <a:ext uri="{909E8E84-426E-40dd-AFC4-6F175D3DCCD1}">
-              <a14:hiddenFill xmlns:a14="http://schemas.microsoft.com/office/drawing/2010/main" xmlns="">
+              <a14:hiddenFill xmlns="" xmlns:a14="http://schemas.microsoft.com/office/drawing/2010/main">
                 <a:solidFill>
                   <a:srgbClr val="FFFFFF"/>
                 </a:solidFill>
               </a14:hiddenFill>
             </a:ext>
             <a:ext uri="{91240B29-F687-4f45-9708-019B960494DF}">
-              <a14:hiddenLine xmlns:a14="http://schemas.microsoft.com/office/drawing/2010/main" xmlns="" w="9525">
+              <a14:hiddenLine xmlns="" xmlns:a14="http://schemas.microsoft.com/office/drawing/2010/main" w="9525">
                 <a:solidFill>
                   <a:srgbClr val="000000"/>
                 </a:solidFill>
@@ -31010,14 +31578,14 @@
           <a:ln/>
           <a:extLst>
             <a:ext uri="{909E8E84-426E-40dd-AFC4-6F175D3DCCD1}">
-              <a14:hiddenFill xmlns:a14="http://schemas.microsoft.com/office/drawing/2010/main" xmlns="">
+              <a14:hiddenFill xmlns="" xmlns:a14="http://schemas.microsoft.com/office/drawing/2010/main">
                 <a:solidFill>
                   <a:srgbClr val="FFFFFF"/>
                 </a:solidFill>
               </a14:hiddenFill>
             </a:ext>
             <a:ext uri="{91240B29-F687-4f45-9708-019B960494DF}">
-              <a14:hiddenLine xmlns:a14="http://schemas.microsoft.com/office/drawing/2010/main" xmlns="" w="9525">
+              <a14:hiddenLine xmlns="" xmlns:a14="http://schemas.microsoft.com/office/drawing/2010/main" w="9525">
                 <a:solidFill>
                   <a:srgbClr val="000000"/>
                 </a:solidFill>
@@ -31164,14 +31732,14 @@
           </a:ln>
           <a:extLst>
             <a:ext uri="{909E8E84-426E-40dd-AFC4-6F175D3DCCD1}">
-              <a14:hiddenFill xmlns:a14="http://schemas.microsoft.com/office/drawing/2010/main" xmlns="">
+              <a14:hiddenFill xmlns="" xmlns:a14="http://schemas.microsoft.com/office/drawing/2010/main">
                 <a:solidFill>
                   <a:srgbClr val="FFFFFF"/>
                 </a:solidFill>
               </a14:hiddenFill>
             </a:ext>
             <a:ext uri="{91240B29-F687-4f45-9708-019B960494DF}">
-              <a14:hiddenLine xmlns:a14="http://schemas.microsoft.com/office/drawing/2010/main" xmlns="" w="9525">
+              <a14:hiddenLine xmlns="" xmlns:a14="http://schemas.microsoft.com/office/drawing/2010/main" w="9525">
                 <a:solidFill>
                   <a:srgbClr val="000000"/>
                 </a:solidFill>
@@ -31413,14 +31981,14 @@
           </a:ln>
           <a:extLst>
             <a:ext uri="{909E8E84-426E-40dd-AFC4-6F175D3DCCD1}">
-              <a14:hiddenFill xmlns:a14="http://schemas.microsoft.com/office/drawing/2010/main" xmlns="">
+              <a14:hiddenFill xmlns="" xmlns:a14="http://schemas.microsoft.com/office/drawing/2010/main">
                 <a:solidFill>
                   <a:srgbClr val="FFFFFF"/>
                 </a:solidFill>
               </a14:hiddenFill>
             </a:ext>
             <a:ext uri="{91240B29-F687-4f45-9708-019B960494DF}">
-              <a14:hiddenLine xmlns:a14="http://schemas.microsoft.com/office/drawing/2010/main" xmlns="" w="9525">
+              <a14:hiddenLine xmlns="" xmlns:a14="http://schemas.microsoft.com/office/drawing/2010/main" w="9525">
                 <a:solidFill>
                   <a:srgbClr val="000000"/>
                 </a:solidFill>
@@ -31475,7 +32043,7 @@
             </a:ln>
             <a:extLst>
               <a:ext uri="{909E8E84-426E-40dd-AFC4-6F175D3DCCD1}">
-                <a14:hiddenFill xmlns:a14="http://schemas.microsoft.com/office/drawing/2010/main" xmlns="">
+                <a14:hiddenFill xmlns="" xmlns:a14="http://schemas.microsoft.com/office/drawing/2010/main">
                   <a:solidFill>
                     <a:srgbClr val="FFFFFF"/>
                   </a:solidFill>
@@ -31637,7 +32205,7 @@
             </a:ln>
             <a:extLst>
               <a:ext uri="{909E8E84-426E-40dd-AFC4-6F175D3DCCD1}">
-                <a14:hiddenFill xmlns:a14="http://schemas.microsoft.com/office/drawing/2010/main" xmlns="">
+                <a14:hiddenFill xmlns="" xmlns:a14="http://schemas.microsoft.com/office/drawing/2010/main">
                   <a:solidFill>
                     <a:srgbClr val="FFFFFF"/>
                   </a:solidFill>
@@ -31686,7 +32254,7 @@
             </a:ln>
             <a:extLst>
               <a:ext uri="{909E8E84-426E-40dd-AFC4-6F175D3DCCD1}">
-                <a14:hiddenFill xmlns:a14="http://schemas.microsoft.com/office/drawing/2010/main" xmlns="">
+                <a14:hiddenFill xmlns="" xmlns:a14="http://schemas.microsoft.com/office/drawing/2010/main">
                   <a:noFill/>
                 </a14:hiddenFill>
               </a:ext>
@@ -31737,7 +32305,7 @@
             </a:ln>
             <a:extLst>
               <a:ext uri="{909E8E84-426E-40dd-AFC4-6F175D3DCCD1}">
-                <a14:hiddenFill xmlns:a14="http://schemas.microsoft.com/office/drawing/2010/main" xmlns="">
+                <a14:hiddenFill xmlns="" xmlns:a14="http://schemas.microsoft.com/office/drawing/2010/main">
                   <a:solidFill>
                     <a:srgbClr val="FFFFFF"/>
                   </a:solidFill>
@@ -31898,7 +32466,7 @@
             </a:ln>
             <a:extLst>
               <a:ext uri="{909E8E84-426E-40dd-AFC4-6F175D3DCCD1}">
-                <a14:hiddenFill xmlns:a14="http://schemas.microsoft.com/office/drawing/2010/main" xmlns="">
+                <a14:hiddenFill xmlns="" xmlns:a14="http://schemas.microsoft.com/office/drawing/2010/main">
                   <a:solidFill>
                     <a:srgbClr val="FFFFFF"/>
                   </a:solidFill>
@@ -31947,7 +32515,7 @@
             </a:ln>
             <a:extLst>
               <a:ext uri="{909E8E84-426E-40dd-AFC4-6F175D3DCCD1}">
-                <a14:hiddenFill xmlns:a14="http://schemas.microsoft.com/office/drawing/2010/main" xmlns="">
+                <a14:hiddenFill xmlns="" xmlns:a14="http://schemas.microsoft.com/office/drawing/2010/main">
                   <a:noFill/>
                 </a14:hiddenFill>
               </a:ext>
@@ -31998,7 +32566,7 @@
             </a:ln>
             <a:extLst>
               <a:ext uri="{909E8E84-426E-40dd-AFC4-6F175D3DCCD1}">
-                <a14:hiddenFill xmlns:a14="http://schemas.microsoft.com/office/drawing/2010/main" xmlns="">
+                <a14:hiddenFill xmlns="" xmlns:a14="http://schemas.microsoft.com/office/drawing/2010/main">
                   <a:solidFill>
                     <a:srgbClr val="FFFFFF"/>
                   </a:solidFill>
@@ -32159,7 +32727,7 @@
             </a:ln>
             <a:extLst>
               <a:ext uri="{909E8E84-426E-40dd-AFC4-6F175D3DCCD1}">
-                <a14:hiddenFill xmlns:a14="http://schemas.microsoft.com/office/drawing/2010/main" xmlns="">
+                <a14:hiddenFill xmlns="" xmlns:a14="http://schemas.microsoft.com/office/drawing/2010/main">
                   <a:solidFill>
                     <a:srgbClr val="FFFFFF"/>
                   </a:solidFill>
@@ -32208,7 +32776,7 @@
             </a:ln>
             <a:extLst>
               <a:ext uri="{909E8E84-426E-40dd-AFC4-6F175D3DCCD1}">
-                <a14:hiddenFill xmlns:a14="http://schemas.microsoft.com/office/drawing/2010/main" xmlns="">
+                <a14:hiddenFill xmlns="" xmlns:a14="http://schemas.microsoft.com/office/drawing/2010/main">
                   <a:noFill/>
                 </a14:hiddenFill>
               </a:ext>
@@ -32463,14 +33031,14 @@
           </a:ln>
           <a:extLst>
             <a:ext uri="{909E8E84-426E-40dd-AFC4-6F175D3DCCD1}">
-              <a14:hiddenFill xmlns:a14="http://schemas.microsoft.com/office/drawing/2010/main" xmlns="">
+              <a14:hiddenFill xmlns="" xmlns:a14="http://schemas.microsoft.com/office/drawing/2010/main">
                 <a:solidFill>
                   <a:srgbClr val="FFFFFF"/>
                 </a:solidFill>
               </a14:hiddenFill>
             </a:ext>
             <a:ext uri="{91240B29-F687-4f45-9708-019B960494DF}">
-              <a14:hiddenLine xmlns:a14="http://schemas.microsoft.com/office/drawing/2010/main" xmlns="" w="9525">
+              <a14:hiddenLine xmlns="" xmlns:a14="http://schemas.microsoft.com/office/drawing/2010/main" w="9525">
                 <a:solidFill>
                   <a:srgbClr val="000000"/>
                 </a:solidFill>
@@ -32504,14 +33072,14 @@
           </a:ln>
           <a:extLst>
             <a:ext uri="{909E8E84-426E-40dd-AFC4-6F175D3DCCD1}">
-              <a14:hiddenFill xmlns:a14="http://schemas.microsoft.com/office/drawing/2010/main" xmlns="">
+              <a14:hiddenFill xmlns="" xmlns:a14="http://schemas.microsoft.com/office/drawing/2010/main">
                 <a:solidFill>
                   <a:srgbClr val="FFFFFF"/>
                 </a:solidFill>
               </a14:hiddenFill>
             </a:ext>
             <a:ext uri="{91240B29-F687-4f45-9708-019B960494DF}">
-              <a14:hiddenLine xmlns:a14="http://schemas.microsoft.com/office/drawing/2010/main" xmlns="" w="9525">
+              <a14:hiddenLine xmlns="" xmlns:a14="http://schemas.microsoft.com/office/drawing/2010/main" w="9525">
                 <a:solidFill>
                   <a:srgbClr val="000000"/>
                 </a:solidFill>
@@ -32873,14 +33441,14 @@
           </a:ln>
           <a:extLst>
             <a:ext uri="{909E8E84-426E-40dd-AFC4-6F175D3DCCD1}">
-              <a14:hiddenFill xmlns:a14="http://schemas.microsoft.com/office/drawing/2010/main" xmlns="">
+              <a14:hiddenFill xmlns="" xmlns:a14="http://schemas.microsoft.com/office/drawing/2010/main">
                 <a:solidFill>
                   <a:srgbClr val="FFFFFF"/>
                 </a:solidFill>
               </a14:hiddenFill>
             </a:ext>
             <a:ext uri="{91240B29-F687-4f45-9708-019B960494DF}">
-              <a14:hiddenLine xmlns:a14="http://schemas.microsoft.com/office/drawing/2010/main" xmlns="" w="9525">
+              <a14:hiddenLine xmlns="" xmlns:a14="http://schemas.microsoft.com/office/drawing/2010/main" w="9525">
                 <a:solidFill>
                   <a:srgbClr val="000000"/>
                 </a:solidFill>
@@ -32914,14 +33482,14 @@
           </a:ln>
           <a:extLst>
             <a:ext uri="{909E8E84-426E-40dd-AFC4-6F175D3DCCD1}">
-              <a14:hiddenFill xmlns:a14="http://schemas.microsoft.com/office/drawing/2010/main" xmlns="">
+              <a14:hiddenFill xmlns="" xmlns:a14="http://schemas.microsoft.com/office/drawing/2010/main">
                 <a:solidFill>
                   <a:srgbClr val="FFFFFF"/>
                 </a:solidFill>
               </a14:hiddenFill>
             </a:ext>
             <a:ext uri="{91240B29-F687-4f45-9708-019B960494DF}">
-              <a14:hiddenLine xmlns:a14="http://schemas.microsoft.com/office/drawing/2010/main" xmlns="" w="9525">
+              <a14:hiddenLine xmlns="" xmlns:a14="http://schemas.microsoft.com/office/drawing/2010/main" w="9525">
                 <a:solidFill>
                   <a:srgbClr val="000000"/>
                 </a:solidFill>

</xml_diff>